<commit_message>
Ajustei a apresentação na parte do OpenSTA
</commit_message>
<xml_diff>
--- a/Docs/Apresentação TSW.pptx
+++ b/Docs/Apresentação TSW.pptx
@@ -5,10 +5,10 @@
     <p:sldMasterId id="2147483660" r:id="rId4"/>
   </p:sldMasterIdLst>
   <p:notesMasterIdLst>
-    <p:notesMasterId r:id="rId24"/>
+    <p:notesMasterId r:id="rId28"/>
   </p:notesMasterIdLst>
   <p:handoutMasterIdLst>
-    <p:handoutMasterId r:id="rId25"/>
+    <p:handoutMasterId r:id="rId29"/>
   </p:handoutMasterIdLst>
   <p:sldIdLst>
     <p:sldId id="257" r:id="rId5"/>
@@ -18,24 +18,28 @@
     <p:sldId id="269" r:id="rId9"/>
     <p:sldId id="270" r:id="rId10"/>
     <p:sldId id="273" r:id="rId11"/>
-    <p:sldId id="275" r:id="rId12"/>
-    <p:sldId id="262" r:id="rId13"/>
-    <p:sldId id="263" r:id="rId14"/>
-    <p:sldId id="271" r:id="rId15"/>
-    <p:sldId id="265" r:id="rId16"/>
-    <p:sldId id="274" r:id="rId17"/>
-    <p:sldId id="276" r:id="rId18"/>
-    <p:sldId id="277" r:id="rId19"/>
-    <p:sldId id="278" r:id="rId20"/>
-    <p:sldId id="279" r:id="rId21"/>
-    <p:sldId id="281" r:id="rId22"/>
-    <p:sldId id="280" r:id="rId23"/>
+    <p:sldId id="281" r:id="rId12"/>
+    <p:sldId id="275" r:id="rId13"/>
+    <p:sldId id="279" r:id="rId14"/>
+    <p:sldId id="282" r:id="rId15"/>
+    <p:sldId id="285" r:id="rId16"/>
+    <p:sldId id="283" r:id="rId17"/>
+    <p:sldId id="284" r:id="rId18"/>
+    <p:sldId id="286" r:id="rId19"/>
+    <p:sldId id="262" r:id="rId20"/>
+    <p:sldId id="263" r:id="rId21"/>
+    <p:sldId id="271" r:id="rId22"/>
+    <p:sldId id="265" r:id="rId23"/>
+    <p:sldId id="274" r:id="rId24"/>
+    <p:sldId id="276" r:id="rId25"/>
+    <p:sldId id="277" r:id="rId26"/>
+    <p:sldId id="278" r:id="rId27"/>
   </p:sldIdLst>
   <p:sldSz cx="12188825" cy="6858000"/>
   <p:notesSz cx="6858000" cy="9144000"/>
   <p:defaultTextStyle>
     <a:defPPr rtl="0">
-      <a:defRPr lang="pt-br"/>
+      <a:defRPr lang="pt-BR"/>
     </a:defPPr>
     <a:lvl1pPr marL="0" algn="l" defTabSz="1218987" rtl="0" eaLnBrk="1" latinLnBrk="0" hangingPunct="1">
       <a:defRPr sz="2400" kern="1200">
@@ -130,7 +134,7 @@
   </p:defaultTextStyle>
   <p:extLst>
     <p:ext uri="{EFAFB233-063F-42B5-8137-9DF3F51BA10A}">
-      <p15:sldGuideLst xmlns:p15="http://schemas.microsoft.com/office/powerpoint/2012/main">
+      <p15:sldGuideLst xmlns="" xmlns:p15="http://schemas.microsoft.com/office/powerpoint/2012/main">
         <p15:guide id="1" orient="horz" pos="2160">
           <p15:clr>
             <a:srgbClr val="A4A3A4"/>
@@ -144,7 +148,7 @@
       </p15:sldGuideLst>
     </p:ext>
     <p:ext uri="{2D200454-40CA-4A62-9FC3-DE9A4176ACB9}">
-      <p15:notesGuideLst xmlns:p15="http://schemas.microsoft.com/office/powerpoint/2012/main">
+      <p15:notesGuideLst xmlns="" xmlns:p15="http://schemas.microsoft.com/office/powerpoint/2012/main">
         <p15:guide id="1" orient="horz" pos="2880">
           <p15:clr>
             <a:srgbClr val="A4A3A4"/>
@@ -159,10 +163,6 @@
     </p:ext>
   </p:extLst>
 </p:presentation>
-</file>
-
-<file path=ppt/revisionInfo.xml><?xml version="1.0" encoding="utf-8"?>
-<p1510:revInfo xmlns:a="http://schemas.openxmlformats.org/drawingml/2006/main" xmlns:r="http://schemas.openxmlformats.org/officeDocument/2006/relationships" xmlns:p1510="http://schemas.microsoft.com/office/powerpoint/2015/10/main"/>
 </file>
 
 <file path=ppt/handoutMasters/handoutMaster1.xml><?xml version="1.0" encoding="utf-8"?>
@@ -317,7 +317,7 @@
             <a:pPr rtl="0"/>
             <a:fld id="{79429053-DC2A-4342-ADD4-2FD729D91E2C}" type="slidenum">
               <a:rPr/>
-              <a:t>‹nº›</a:t>
+              <a:t>‹#›</a:t>
             </a:fld>
             <a:endParaRPr/>
           </a:p>
@@ -574,7 +574,7 @@
             <a:pPr rtl="0"/>
             <a:fld id="{3EBA5BD7-F043-4D1B-AA17-CD412FC534DE}" type="slidenum">
               <a:rPr/>
-              <a:t>‹nº›</a:t>
+              <a:t>‹#›</a:t>
             </a:fld>
             <a:endParaRPr/>
           </a:p>
@@ -1572,7 +1572,7 @@
             <a:pPr rtl="0"/>
             <a:fld id="{C014DD1E-5D91-48A3-AD6D-45FBA980D106}" type="slidenum">
               <a:rPr/>
-              <a:t>‹nº›</a:t>
+              <a:t>‹#›</a:t>
             </a:fld>
             <a:endParaRPr/>
           </a:p>
@@ -1774,7 +1774,7 @@
             <a:pPr rtl="0"/>
             <a:fld id="{C014DD1E-5D91-48A3-AD6D-45FBA980D106}" type="slidenum">
               <a:rPr/>
-              <a:t>‹nº›</a:t>
+              <a:t>‹#›</a:t>
             </a:fld>
             <a:endParaRPr/>
           </a:p>
@@ -1986,7 +1986,7 @@
             <a:pPr rtl="0"/>
             <a:fld id="{C014DD1E-5D91-48A3-AD6D-45FBA980D106}" type="slidenum">
               <a:rPr/>
-              <a:t>‹nº›</a:t>
+              <a:t>‹#›</a:t>
             </a:fld>
             <a:endParaRPr/>
           </a:p>
@@ -2188,7 +2188,7 @@
             <a:pPr rtl="0"/>
             <a:fld id="{C014DD1E-5D91-48A3-AD6D-45FBA980D106}" type="slidenum">
               <a:rPr/>
-              <a:t>‹nº›</a:t>
+              <a:t>‹#›</a:t>
             </a:fld>
             <a:endParaRPr/>
           </a:p>
@@ -2624,7 +2624,7 @@
             <a:pPr rtl="0"/>
             <a:fld id="{C014DD1E-5D91-48A3-AD6D-45FBA980D106}" type="slidenum">
               <a:rPr/>
-              <a:t>‹nº›</a:t>
+              <a:t>‹#›</a:t>
             </a:fld>
             <a:endParaRPr/>
           </a:p>
@@ -2932,7 +2932,7 @@
             <a:pPr rtl="0"/>
             <a:fld id="{C014DD1E-5D91-48A3-AD6D-45FBA980D106}" type="slidenum">
               <a:rPr/>
-              <a:t>‹nº›</a:t>
+              <a:t>‹#›</a:t>
             </a:fld>
             <a:endParaRPr/>
           </a:p>
@@ -3392,7 +3392,7 @@
             <a:pPr rtl="0"/>
             <a:fld id="{C014DD1E-5D91-48A3-AD6D-45FBA980D106}" type="slidenum">
               <a:rPr/>
-              <a:t>‹nº›</a:t>
+              <a:t>‹#›</a:t>
             </a:fld>
             <a:endParaRPr/>
           </a:p>
@@ -3526,7 +3526,7 @@
             <a:pPr rtl="0"/>
             <a:fld id="{C014DD1E-5D91-48A3-AD6D-45FBA980D106}" type="slidenum">
               <a:rPr/>
-              <a:t>‹nº›</a:t>
+              <a:t>‹#›</a:t>
             </a:fld>
             <a:endParaRPr/>
           </a:p>
@@ -3636,7 +3636,7 @@
             <a:pPr rtl="0"/>
             <a:fld id="{C014DD1E-5D91-48A3-AD6D-45FBA980D106}" type="slidenum">
               <a:rPr/>
-              <a:t>‹nº›</a:t>
+              <a:t>‹#›</a:t>
             </a:fld>
             <a:endParaRPr/>
           </a:p>
@@ -3939,7 +3939,7 @@
             <a:pPr rtl="0"/>
             <a:fld id="{C014DD1E-5D91-48A3-AD6D-45FBA980D106}" type="slidenum">
               <a:rPr/>
-              <a:t>‹nº›</a:t>
+              <a:t>‹#›</a:t>
             </a:fld>
             <a:endParaRPr/>
           </a:p>
@@ -4232,7 +4232,7 @@
             <a:pPr rtl="0"/>
             <a:fld id="{C014DD1E-5D91-48A3-AD6D-45FBA980D106}" type="slidenum">
               <a:rPr/>
-              <a:t>‹nº›</a:t>
+              <a:t>‹#›</a:t>
             </a:fld>
             <a:endParaRPr/>
           </a:p>
@@ -4709,7 +4709,7 @@
           <a:p>
             <a:pPr rtl="0"/>
             <a:r>
-              <a:rPr lang="pt-br"/>
+              <a:rPr lang="pt-BR"/>
               <a:t>Clique para editar o estilo de título Mestre</a:t>
             </a:r>
             <a:endParaRPr/>
@@ -4743,35 +4743,35 @@
           <a:p>
             <a:pPr lvl="0" rtl="0"/>
             <a:r>
-              <a:rPr lang="pt-br"/>
+              <a:rPr lang="pt-BR"/>
               <a:t>Editar estilos de texto Mestre</a:t>
             </a:r>
           </a:p>
           <a:p>
             <a:pPr lvl="1" rtl="0"/>
             <a:r>
-              <a:rPr lang="pt-br"/>
+              <a:rPr lang="pt-BR"/>
               <a:t>Segundo nível</a:t>
             </a:r>
           </a:p>
           <a:p>
             <a:pPr lvl="2" rtl="0"/>
             <a:r>
-              <a:rPr lang="pt-br"/>
+              <a:rPr lang="pt-BR"/>
               <a:t>Terceiro nível</a:t>
             </a:r>
           </a:p>
           <a:p>
             <a:pPr lvl="3" rtl="0"/>
             <a:r>
-              <a:rPr lang="pt-br"/>
+              <a:rPr lang="pt-BR"/>
               <a:t>Quarto nível</a:t>
             </a:r>
           </a:p>
           <a:p>
             <a:pPr lvl="4" rtl="0"/>
             <a:r>
-              <a:rPr lang="pt-br"/>
+              <a:rPr lang="pt-BR"/>
               <a:t>Quinto nível</a:t>
             </a:r>
             <a:endParaRPr/>
@@ -4895,7 +4895,7 @@
             <a:fld id="{C014DD1E-5D91-48A3-AD6D-45FBA980D106}" type="slidenum">
               <a:rPr/>
               <a:pPr rtl="0"/>
-              <a:t>‹nº›</a:t>
+              <a:t>‹#›</a:t>
             </a:fld>
             <a:endParaRPr/>
           </a:p>
@@ -5252,7 +5252,7 @@
   </p:txStyles>
   <p:extLst>
     <p:ext uri="{27BBF7A9-308A-43DC-89C8-2F10F3537804}">
-      <p15:sldGuideLst xmlns:p15="http://schemas.microsoft.com/office/powerpoint/2012/main">
+      <p15:sldGuideLst xmlns="" xmlns:p15="http://schemas.microsoft.com/office/powerpoint/2012/main">
         <p15:guide id="1" orient="horz" pos="2160" userDrawn="1">
           <p15:clr>
             <a:srgbClr val="F26B43"/>
@@ -5363,7 +5363,7 @@
       </p:grpSpPr>
       <p:sp>
         <p:nvSpPr>
-          <p:cNvPr id="2" name="Título 1"/>
+          <p:cNvPr id="2" name="Title 1"/>
           <p:cNvSpPr>
             <a:spLocks noGrp="1"/>
           </p:cNvSpPr>
@@ -5378,14 +5378,19 @@
           <a:p>
             <a:r>
               <a:rPr lang="pt-BR" dirty="0"/>
-              <a:t>Componentes </a:t>
-            </a:r>
-          </a:p>
-        </p:txBody>
-      </p:sp>
-      <p:sp>
-        <p:nvSpPr>
-          <p:cNvPr id="3" name="Espaço Reservado para Conteúdo 2"/>
+              <a:t>Introdução - </a:t>
+            </a:r>
+            <a:r>
+              <a:rPr lang="pt-BR" dirty="0" smtClean="0"/>
+              <a:t>OpenSTA</a:t>
+            </a:r>
+            <a:endParaRPr lang="pt-BR" dirty="0"/>
+          </a:p>
+        </p:txBody>
+      </p:sp>
+      <p:sp>
+        <p:nvSpPr>
+          <p:cNvPr id="3" name="Content Placeholder 2"/>
           <p:cNvSpPr>
             <a:spLocks noGrp="1"/>
           </p:cNvSpPr>
@@ -5393,49 +5398,111 @@
             <p:ph idx="1"/>
           </p:nvPr>
         </p:nvSpPr>
-        <p:spPr>
-          <a:xfrm>
-            <a:off x="1218883" y="1701796"/>
-            <a:ext cx="10360501" cy="5039571"/>
-          </a:xfrm>
-        </p:spPr>
+        <p:spPr/>
         <p:txBody>
           <a:bodyPr>
-            <a:normAutofit lnSpcReduction="10000"/>
+            <a:normAutofit/>
           </a:bodyPr>
           <a:lstStyle/>
           <a:p>
             <a:r>
+              <a:rPr lang="pt-PT" dirty="0"/>
+              <a:t>Teste </a:t>
+            </a:r>
+            <a:r>
+              <a:rPr lang="pt-PT" dirty="0" smtClean="0"/>
+              <a:t>são executados utilizando a metáfora do “The record and replay”. </a:t>
+            </a:r>
+            <a:r>
+              <a:rPr lang="pt-PT" dirty="0"/>
+              <a:t>C</a:t>
+            </a:r>
+            <a:r>
+              <a:rPr lang="pt-PT" dirty="0" smtClean="0"/>
+              <a:t>omum </a:t>
+            </a:r>
+            <a:r>
+              <a:rPr lang="pt-PT" dirty="0"/>
+              <a:t>na maioria dos outros Disponíveis no </a:t>
+            </a:r>
+            <a:r>
+              <a:rPr lang="pt-PT" dirty="0" smtClean="0"/>
+              <a:t>mercado.</a:t>
+            </a:r>
+            <a:endParaRPr lang="pt-BR" dirty="0"/>
+          </a:p>
+          <a:p>
+            <a:r>
               <a:rPr lang="pt-BR" dirty="0"/>
-              <a:t>Agentes (agents)</a:t>
-            </a:r>
-          </a:p>
-          <a:p>
-            <a:pPr marL="0" indent="0">
-              <a:buNone/>
-            </a:pPr>
+              <a:t>As gravações são feitas no próprio navegador dos testadores produzindo scripts simples que </a:t>
+            </a:r>
+            <a:r>
+              <a:rPr lang="pt-BR" dirty="0" smtClean="0"/>
+              <a:t>podem </a:t>
+            </a:r>
             <a:r>
               <a:rPr lang="pt-BR" dirty="0"/>
-              <a:t>Geralmente um único agente em cada máquina injetora de carga, que irá iniciar um número configurado de processos de trabalho.</a:t>
+              <a:t>ser </a:t>
+            </a:r>
+            <a:r>
+              <a:rPr lang="pt-BR" dirty="0" smtClean="0"/>
+              <a:t>editados </a:t>
+            </a:r>
+            <a:r>
+              <a:rPr lang="pt-BR" dirty="0"/>
+              <a:t>e </a:t>
+            </a:r>
+            <a:r>
+              <a:rPr lang="pt-BR" dirty="0" smtClean="0"/>
+              <a:t>controlados com </a:t>
+            </a:r>
+            <a:r>
+              <a:rPr lang="pt-BR" dirty="0"/>
+              <a:t>uma linguagem de script especial de alto nível</a:t>
+            </a:r>
+            <a:r>
+              <a:rPr lang="pt-BR" dirty="0" smtClean="0"/>
+              <a:t>.</a:t>
+            </a:r>
+          </a:p>
+          <a:p>
+            <a:r>
+              <a:rPr lang="pt-BR" dirty="0"/>
+              <a:t>Essas sessões com script podem ser reproduzidas para simular muitos usuários por um </a:t>
+            </a:r>
+            <a:r>
+              <a:rPr lang="pt-BR" dirty="0" smtClean="0"/>
+              <a:t>motor </a:t>
+            </a:r>
+            <a:r>
+              <a:rPr lang="pt-BR" dirty="0"/>
+              <a:t>de geração de carga de </a:t>
+            </a:r>
+            <a:r>
+              <a:rPr lang="pt-BR" dirty="0" smtClean="0"/>
+              <a:t>perfomance.</a:t>
+            </a:r>
+          </a:p>
+          <a:p>
+            <a:r>
+              <a:rPr lang="pt-BR" dirty="0" smtClean="0"/>
+              <a:t>Usando </a:t>
+            </a:r>
+            <a:r>
+              <a:rPr lang="pt-BR" dirty="0"/>
+              <a:t>esta metodologia, um usuário pode gerar </a:t>
+            </a:r>
+            <a:r>
+              <a:rPr lang="pt-BR" dirty="0" smtClean="0"/>
+              <a:t>cargas pesadas, simulando </a:t>
+            </a:r>
+            <a:r>
+              <a:rPr lang="pt-BR" dirty="0"/>
+              <a:t>a atividade de centenas a milhares de usuários virtuais.</a:t>
             </a:r>
           </a:p>
           <a:p>
             <a:endParaRPr lang="pt-BR" dirty="0"/>
-          </a:p>
-          <a:p>
-            <a:r>
-              <a:rPr lang="pt-BR" dirty="0"/>
-              <a:t>Trabalhadores (workers)</a:t>
-            </a:r>
-          </a:p>
-          <a:p>
-            <a:pPr marL="0" indent="0">
-              <a:buNone/>
-            </a:pPr>
-            <a:r>
-              <a:rPr lang="pt-BR" dirty="0"/>
-              <a:t>Fazem o trabalho de teste, ou seja, eles realmente executam os scripts de teste de carga. O arquivo grinder.Properties que é passado para o trabalhador pelo agente define, entre outras coisas, o script que o trabalhador irá executar contra o alvo, quantos threads o trabalhador vai gerar, e quantas vezes cada um desses tópicos ira executar o script.</a:t>
-            </a:r>
           </a:p>
           <a:p>
             <a:endParaRPr lang="pt-BR" dirty="0"/>
@@ -5445,7 +5512,7 @@
     </p:spTree>
     <p:extLst>
       <p:ext uri="{BB962C8B-B14F-4D97-AF65-F5344CB8AC3E}">
-        <p14:creationId xmlns:p14="http://schemas.microsoft.com/office/powerpoint/2010/main" val="1405850135"/>
+        <p14:creationId xmlns:p14="http://schemas.microsoft.com/office/powerpoint/2010/main" val="2339948077"/>
       </p:ext>
     </p:extLst>
   </p:cSld>
@@ -5486,6 +5553,1143 @@
       </p:grpSpPr>
       <p:sp>
         <p:nvSpPr>
+          <p:cNvPr id="2" name="Title 1"/>
+          <p:cNvSpPr>
+            <a:spLocks noGrp="1"/>
+          </p:cNvSpPr>
+          <p:nvPr>
+            <p:ph type="title"/>
+          </p:nvPr>
+        </p:nvSpPr>
+        <p:spPr/>
+        <p:txBody>
+          <a:bodyPr/>
+          <a:lstStyle/>
+          <a:p>
+            <a:r>
+              <a:rPr lang="pt-BR" dirty="0" smtClean="0"/>
+              <a:t>Trabalhando com a ferramenta </a:t>
+            </a:r>
+            <a:r>
+              <a:rPr lang="pt-BR" dirty="0"/>
+              <a:t>- </a:t>
+            </a:r>
+            <a:r>
+              <a:rPr lang="pt-BR" dirty="0" smtClean="0"/>
+              <a:t>OpenSTA</a:t>
+            </a:r>
+            <a:endParaRPr lang="pt-BR" dirty="0"/>
+          </a:p>
+        </p:txBody>
+      </p:sp>
+      <p:sp>
+        <p:nvSpPr>
+          <p:cNvPr id="3" name="Content Placeholder 2"/>
+          <p:cNvSpPr>
+            <a:spLocks noGrp="1"/>
+          </p:cNvSpPr>
+          <p:nvPr>
+            <p:ph idx="1"/>
+          </p:nvPr>
+        </p:nvSpPr>
+        <p:spPr/>
+        <p:txBody>
+          <a:bodyPr>
+            <a:normAutofit/>
+          </a:bodyPr>
+          <a:lstStyle/>
+          <a:p>
+            <a:r>
+              <a:rPr lang="pt-BR" dirty="0"/>
+              <a:t>Scripts formam o conteúdo de um teste de desempenho </a:t>
+            </a:r>
+            <a:r>
+              <a:rPr lang="pt-BR" dirty="0" smtClean="0"/>
+              <a:t>HTTP/HTTPS </a:t>
+            </a:r>
+            <a:r>
+              <a:rPr lang="pt-BR" dirty="0"/>
+              <a:t>usando o OpenSTA. </a:t>
+            </a:r>
+            <a:endParaRPr lang="pt-BR" dirty="0" smtClean="0"/>
+          </a:p>
+          <a:p>
+            <a:r>
+              <a:rPr lang="pt-BR" dirty="0" smtClean="0"/>
+              <a:t>Depois </a:t>
+            </a:r>
+            <a:r>
+              <a:rPr lang="pt-BR" dirty="0"/>
+              <a:t>de ter Planejado um teste o próximo passo é desenvolver seu conteúdo, criando os scripts que você precisa</a:t>
+            </a:r>
+            <a:r>
+              <a:rPr lang="pt-BR" dirty="0" smtClean="0"/>
+              <a:t>.</a:t>
+            </a:r>
+          </a:p>
+          <a:p>
+            <a:r>
+              <a:rPr lang="pt-BR" dirty="0" smtClean="0"/>
+              <a:t>Criação de um script envolve:</a:t>
+            </a:r>
+          </a:p>
+          <a:p>
+            <a:pPr lvl="1"/>
+            <a:r>
+              <a:rPr lang="pt-PT" dirty="0" smtClean="0"/>
+              <a:t>Planejar </a:t>
+            </a:r>
+            <a:r>
+              <a:rPr lang="pt-PT" dirty="0"/>
+              <a:t>seu </a:t>
+            </a:r>
+            <a:r>
+              <a:rPr lang="pt-PT" dirty="0" smtClean="0"/>
+              <a:t>script;</a:t>
+            </a:r>
+          </a:p>
+          <a:p>
+            <a:pPr lvl="1"/>
+            <a:r>
+              <a:rPr lang="pt-PT" dirty="0" smtClean="0"/>
+              <a:t>Configurar o modelador de script para a criação </a:t>
+            </a:r>
+            <a:r>
+              <a:rPr lang="pt-PT" dirty="0"/>
+              <a:t>de </a:t>
+            </a:r>
+            <a:r>
+              <a:rPr lang="pt-PT" dirty="0" smtClean="0"/>
+              <a:t>um novo scripts.</a:t>
+            </a:r>
+          </a:p>
+          <a:p>
+            <a:pPr lvl="1"/>
+            <a:r>
+              <a:rPr lang="pt-PT" dirty="0" smtClean="0"/>
+              <a:t>Gravar um comando em um site.</a:t>
+            </a:r>
+            <a:endParaRPr lang="pt-PT" dirty="0"/>
+          </a:p>
+        </p:txBody>
+      </p:sp>
+    </p:spTree>
+    <p:extLst>
+      <p:ext uri="{BB962C8B-B14F-4D97-AF65-F5344CB8AC3E}">
+        <p14:creationId xmlns:p14="http://schemas.microsoft.com/office/powerpoint/2010/main" val="1020741510"/>
+      </p:ext>
+    </p:extLst>
+  </p:cSld>
+  <p:clrMapOvr>
+    <a:masterClrMapping/>
+  </p:clrMapOvr>
+  <mc:AlternateContent xmlns:mc="http://schemas.openxmlformats.org/markup-compatibility/2006" xmlns:p14="http://schemas.microsoft.com/office/powerpoint/2010/main">
+    <mc:Choice Requires="p14">
+      <p:transition spd="med" p14:dur="700">
+        <p:fade/>
+      </p:transition>
+    </mc:Choice>
+    <mc:Fallback xmlns="">
+      <p:transition spd="med">
+        <p:fade/>
+      </p:transition>
+    </mc:Fallback>
+  </mc:AlternateContent>
+  <p:timing>
+    <p:tnLst>
+      <p:par>
+        <p:cTn id="1" dur="indefinite" restart="never" nodeType="tmRoot"/>
+      </p:par>
+    </p:tnLst>
+  </p:timing>
+</p:sld>
+</file>
+
+<file path=ppt/slides/slide12.xml><?xml version="1.0" encoding="utf-8"?>
+<p:sld xmlns:a="http://schemas.openxmlformats.org/drawingml/2006/main" xmlns:r="http://schemas.openxmlformats.org/officeDocument/2006/relationships" xmlns:p="http://schemas.openxmlformats.org/presentationml/2006/main">
+  <p:cSld>
+    <p:spTree>
+      <p:nvGrpSpPr>
+        <p:cNvPr id="1" name=""/>
+        <p:cNvGrpSpPr/>
+        <p:nvPr/>
+      </p:nvGrpSpPr>
+      <p:grpSpPr>
+        <a:xfrm>
+          <a:off x="0" y="0"/>
+          <a:ext cx="0" cy="0"/>
+          <a:chOff x="0" y="0"/>
+          <a:chExt cx="0" cy="0"/>
+        </a:xfrm>
+      </p:grpSpPr>
+      <p:sp>
+        <p:nvSpPr>
+          <p:cNvPr id="2" name="Title 1"/>
+          <p:cNvSpPr>
+            <a:spLocks noGrp="1"/>
+          </p:cNvSpPr>
+          <p:nvPr>
+            <p:ph type="title"/>
+          </p:nvPr>
+        </p:nvSpPr>
+        <p:spPr/>
+        <p:txBody>
+          <a:bodyPr/>
+          <a:lstStyle/>
+          <a:p>
+            <a:r>
+              <a:rPr lang="pt-BR" dirty="0" smtClean="0"/>
+              <a:t>Gravando um comando em um site - OpenSTA</a:t>
+            </a:r>
+            <a:endParaRPr lang="pt-BR" dirty="0"/>
+          </a:p>
+        </p:txBody>
+      </p:sp>
+      <p:sp>
+        <p:nvSpPr>
+          <p:cNvPr id="3" name="Content Placeholder 2"/>
+          <p:cNvSpPr>
+            <a:spLocks noGrp="1"/>
+          </p:cNvSpPr>
+          <p:nvPr>
+            <p:ph idx="1"/>
+          </p:nvPr>
+        </p:nvSpPr>
+        <p:spPr>
+          <a:xfrm>
+            <a:off x="1197868" y="1628800"/>
+            <a:ext cx="10360501" cy="4462272"/>
+          </a:xfrm>
+        </p:spPr>
+        <p:txBody>
+          <a:bodyPr>
+            <a:normAutofit/>
+          </a:bodyPr>
+          <a:lstStyle/>
+          <a:p>
+            <a:r>
+              <a:rPr lang="pt-PT" dirty="0"/>
+              <a:t>Depois de ter </a:t>
+            </a:r>
+            <a:r>
+              <a:rPr lang="pt-PT" dirty="0" smtClean="0"/>
+              <a:t>selecionado </a:t>
+            </a:r>
+            <a:r>
+              <a:rPr lang="pt-PT" dirty="0"/>
+              <a:t>um </a:t>
+            </a:r>
+            <a:r>
+              <a:rPr lang="pt-PT" dirty="0" smtClean="0"/>
+              <a:t>navegador e </a:t>
+            </a:r>
+            <a:r>
+              <a:rPr lang="pt-PT" dirty="0"/>
+              <a:t>configurado o gateway, está pronto para gravar um </a:t>
+            </a:r>
+            <a:r>
+              <a:rPr lang="pt-PT" dirty="0" smtClean="0"/>
+              <a:t>site </a:t>
+            </a:r>
+            <a:r>
+              <a:rPr lang="pt-PT" dirty="0"/>
+              <a:t>e criar um </a:t>
+            </a:r>
+            <a:r>
+              <a:rPr lang="pt-PT" dirty="0" smtClean="0"/>
+              <a:t>script.</a:t>
+            </a:r>
+          </a:p>
+          <a:p>
+            <a:r>
+              <a:rPr lang="pt-PT" dirty="0"/>
+              <a:t>Quando você começar a gravar uma sessão </a:t>
+            </a:r>
+            <a:r>
+              <a:rPr lang="pt-PT" dirty="0" smtClean="0"/>
+              <a:t>em um site, </a:t>
+            </a:r>
+            <a:r>
+              <a:rPr lang="pt-PT" dirty="0"/>
+              <a:t>use o navegador </a:t>
+            </a:r>
+            <a:r>
+              <a:rPr lang="pt-PT" dirty="0" smtClean="0"/>
+              <a:t>como se você estivesse usando ele normalmente e execute as etapas que você deseja que sejam repetidas pelo programa. </a:t>
+            </a:r>
+          </a:p>
+        </p:txBody>
+      </p:sp>
+    </p:spTree>
+    <p:extLst>
+      <p:ext uri="{BB962C8B-B14F-4D97-AF65-F5344CB8AC3E}">
+        <p14:creationId xmlns:p14="http://schemas.microsoft.com/office/powerpoint/2010/main" val="92517078"/>
+      </p:ext>
+    </p:extLst>
+  </p:cSld>
+  <p:clrMapOvr>
+    <a:masterClrMapping/>
+  </p:clrMapOvr>
+  <mc:AlternateContent xmlns:mc="http://schemas.openxmlformats.org/markup-compatibility/2006" xmlns:p14="http://schemas.microsoft.com/office/powerpoint/2010/main">
+    <mc:Choice Requires="p14">
+      <p:transition spd="med" p14:dur="700">
+        <p:fade/>
+      </p:transition>
+    </mc:Choice>
+    <mc:Fallback xmlns="">
+      <p:transition spd="med">
+        <p:fade/>
+      </p:transition>
+    </mc:Fallback>
+  </mc:AlternateContent>
+  <p:timing>
+    <p:tnLst>
+      <p:par>
+        <p:cTn id="1" dur="indefinite" restart="never" nodeType="tmRoot"/>
+      </p:par>
+    </p:tnLst>
+  </p:timing>
+</p:sld>
+</file>
+
+<file path=ppt/slides/slide13.xml><?xml version="1.0" encoding="utf-8"?>
+<p:sld xmlns:a="http://schemas.openxmlformats.org/drawingml/2006/main" xmlns:r="http://schemas.openxmlformats.org/officeDocument/2006/relationships" xmlns:p="http://schemas.openxmlformats.org/presentationml/2006/main">
+  <p:cSld>
+    <p:spTree>
+      <p:nvGrpSpPr>
+        <p:cNvPr id="1" name=""/>
+        <p:cNvGrpSpPr/>
+        <p:nvPr/>
+      </p:nvGrpSpPr>
+      <p:grpSpPr>
+        <a:xfrm>
+          <a:off x="0" y="0"/>
+          <a:ext cx="0" cy="0"/>
+          <a:chOff x="0" y="0"/>
+          <a:chExt cx="0" cy="0"/>
+        </a:xfrm>
+      </p:grpSpPr>
+      <p:sp>
+        <p:nvSpPr>
+          <p:cNvPr id="2" name="Title 1"/>
+          <p:cNvSpPr>
+            <a:spLocks noGrp="1"/>
+          </p:cNvSpPr>
+          <p:nvPr>
+            <p:ph type="title"/>
+          </p:nvPr>
+        </p:nvSpPr>
+        <p:spPr/>
+        <p:txBody>
+          <a:bodyPr/>
+          <a:lstStyle/>
+          <a:p>
+            <a:r>
+              <a:rPr lang="pt-BR" dirty="0" smtClean="0"/>
+              <a:t>Modelador de script (Script Modeler) - OpenSTA</a:t>
+            </a:r>
+            <a:endParaRPr lang="pt-BR" dirty="0"/>
+          </a:p>
+        </p:txBody>
+      </p:sp>
+      <p:sp>
+        <p:nvSpPr>
+          <p:cNvPr id="3" name="Content Placeholder 2"/>
+          <p:cNvSpPr>
+            <a:spLocks noGrp="1"/>
+          </p:cNvSpPr>
+          <p:nvPr>
+            <p:ph idx="1"/>
+          </p:nvPr>
+        </p:nvSpPr>
+        <p:spPr>
+          <a:xfrm>
+            <a:off x="477788" y="1700808"/>
+            <a:ext cx="11576025" cy="4462272"/>
+          </a:xfrm>
+        </p:spPr>
+        <p:txBody>
+          <a:bodyPr>
+            <a:normAutofit fontScale="92500" lnSpcReduction="10000"/>
+          </a:bodyPr>
+          <a:lstStyle/>
+          <a:p>
+            <a:r>
+              <a:rPr lang="pt-PT" dirty="0"/>
+              <a:t>Depois de criar um script ou quando você abre um, ele é exibido no painel de script </a:t>
+            </a:r>
+            <a:r>
+              <a:rPr lang="pt-PT" dirty="0" smtClean="0"/>
+              <a:t>no </a:t>
+            </a:r>
+            <a:r>
+              <a:rPr lang="pt-PT" dirty="0"/>
+              <a:t>lado </a:t>
+            </a:r>
+            <a:r>
+              <a:rPr lang="pt-PT" dirty="0" smtClean="0"/>
+              <a:t/>
+            </a:r>
+            <a:br>
+              <a:rPr lang="pt-PT" dirty="0" smtClean="0"/>
+            </a:br>
+            <a:r>
+              <a:rPr lang="pt-PT" dirty="0" smtClean="0"/>
+              <a:t>esquerdo da janela </a:t>
+            </a:r>
+            <a:br>
+              <a:rPr lang="pt-PT" dirty="0" smtClean="0"/>
+            </a:br>
+            <a:r>
+              <a:rPr lang="pt-PT" dirty="0" smtClean="0"/>
+              <a:t>principal</a:t>
+            </a:r>
+            <a:r>
+              <a:rPr lang="pt-PT" dirty="0"/>
+              <a:t>. </a:t>
+            </a:r>
+            <a:r>
+              <a:rPr lang="pt-PT" dirty="0" smtClean="0"/>
+              <a:t/>
+            </a:r>
+            <a:br>
+              <a:rPr lang="pt-PT" dirty="0" smtClean="0"/>
+            </a:br>
+            <a:r>
+              <a:rPr lang="pt-PT" dirty="0" smtClean="0"/>
+              <a:t>É </a:t>
+            </a:r>
+            <a:r>
+              <a:rPr lang="pt-PT" dirty="0"/>
+              <a:t>representado </a:t>
+            </a:r>
+            <a:r>
+              <a:rPr lang="pt-PT" dirty="0" smtClean="0"/>
+              <a:t/>
+            </a:r>
+            <a:br>
+              <a:rPr lang="pt-PT" dirty="0" smtClean="0"/>
+            </a:br>
+            <a:r>
+              <a:rPr lang="pt-PT" dirty="0" smtClean="0"/>
+              <a:t>usando </a:t>
+            </a:r>
+            <a:r>
+              <a:rPr lang="pt-PT" dirty="0"/>
+              <a:t>código SCL </a:t>
+            </a:r>
+            <a:r>
+              <a:rPr lang="pt-PT" dirty="0" smtClean="0"/>
+              <a:t/>
+            </a:r>
+            <a:br>
+              <a:rPr lang="pt-PT" dirty="0" smtClean="0"/>
+            </a:br>
+            <a:r>
+              <a:rPr lang="pt-PT" dirty="0" smtClean="0"/>
+              <a:t>que Permite</a:t>
+            </a:r>
+            <a:br>
+              <a:rPr lang="pt-PT" dirty="0" smtClean="0"/>
+            </a:br>
+            <a:r>
+              <a:rPr lang="pt-PT" dirty="0" smtClean="0"/>
+              <a:t>modelá-lo </a:t>
+            </a:r>
+            <a:r>
+              <a:rPr lang="pt-PT" dirty="0"/>
+              <a:t>usando as </a:t>
+            </a:r>
+            <a:r>
+              <a:rPr lang="pt-PT" dirty="0" smtClean="0"/>
+              <a:t/>
+            </a:r>
+            <a:br>
+              <a:rPr lang="pt-PT" dirty="0" smtClean="0"/>
+            </a:br>
+            <a:r>
+              <a:rPr lang="pt-PT" dirty="0" smtClean="0"/>
+              <a:t>opções </a:t>
+            </a:r>
+            <a:r>
+              <a:rPr lang="pt-PT" dirty="0"/>
+              <a:t>do menu ou </a:t>
+            </a:r>
+            <a:r>
+              <a:rPr lang="pt-PT" dirty="0" smtClean="0"/>
+              <a:t/>
+            </a:r>
+            <a:br>
+              <a:rPr lang="pt-PT" dirty="0" smtClean="0"/>
+            </a:br>
+            <a:r>
+              <a:rPr lang="pt-PT" dirty="0" smtClean="0"/>
+              <a:t>diretamente</a:t>
+            </a:r>
+            <a:r>
+              <a:rPr lang="pt-PT" dirty="0"/>
+              <a:t>, </a:t>
+            </a:r>
+            <a:r>
+              <a:rPr lang="pt-PT" dirty="0" smtClean="0"/>
+              <a:t/>
+            </a:r>
+            <a:br>
+              <a:rPr lang="pt-PT" dirty="0" smtClean="0"/>
+            </a:br>
+            <a:r>
+              <a:rPr lang="pt-PT" dirty="0" smtClean="0"/>
+              <a:t>digitando </a:t>
+            </a:r>
+            <a:r>
+              <a:rPr lang="pt-PT" dirty="0"/>
+              <a:t>o SCL </a:t>
+            </a:r>
+            <a:r>
+              <a:rPr lang="pt-PT" dirty="0" smtClean="0"/>
+              <a:t/>
+            </a:r>
+            <a:br>
+              <a:rPr lang="pt-PT" dirty="0" smtClean="0"/>
+            </a:br>
+            <a:r>
+              <a:rPr lang="pt-PT" dirty="0" smtClean="0"/>
+              <a:t>Comandos </a:t>
+            </a:r>
+            <a:br>
+              <a:rPr lang="pt-PT" dirty="0" smtClean="0"/>
+            </a:br>
+            <a:r>
+              <a:rPr lang="pt-PT" dirty="0" smtClean="0"/>
+              <a:t>necessários</a:t>
+            </a:r>
+            <a:r>
+              <a:rPr lang="pt-PT" dirty="0"/>
+              <a:t>.</a:t>
+            </a:r>
+          </a:p>
+        </p:txBody>
+      </p:sp>
+      <p:pic>
+        <p:nvPicPr>
+          <p:cNvPr id="2052" name="Picture 4" descr="C:\Users\Bruno\Desktop\OpenSTA - Copia (3).png"/>
+          <p:cNvPicPr>
+            <a:picLocks noChangeAspect="1" noChangeArrowheads="1"/>
+          </p:cNvPicPr>
+          <p:nvPr/>
+        </p:nvPicPr>
+        <p:blipFill>
+          <a:blip r:embed="rId2">
+            <a:extLst>
+              <a:ext uri="{28A0092B-C50C-407E-A947-70E740481C1C}">
+                <a14:useLocalDpi xmlns:a14="http://schemas.microsoft.com/office/drawing/2010/main" val="0"/>
+              </a:ext>
+            </a:extLst>
+          </a:blip>
+          <a:srcRect/>
+          <a:stretch>
+            <a:fillRect/>
+          </a:stretch>
+        </p:blipFill>
+        <p:spPr bwMode="auto">
+          <a:xfrm>
+            <a:off x="3790156" y="2204862"/>
+            <a:ext cx="8263657" cy="4471843"/>
+          </a:xfrm>
+          <a:prstGeom prst="rect">
+            <a:avLst/>
+          </a:prstGeom>
+          <a:noFill/>
+          <a:extLst>
+            <a:ext uri="{909E8E84-426E-40DD-AFC4-6F175D3DCCD1}">
+              <a14:hiddenFill xmlns:a14="http://schemas.microsoft.com/office/drawing/2010/main">
+                <a:solidFill>
+                  <a:srgbClr val="FFFFFF"/>
+                </a:solidFill>
+              </a14:hiddenFill>
+            </a:ext>
+          </a:extLst>
+        </p:spPr>
+      </p:pic>
+    </p:spTree>
+    <p:extLst>
+      <p:ext uri="{BB962C8B-B14F-4D97-AF65-F5344CB8AC3E}">
+        <p14:creationId xmlns:p14="http://schemas.microsoft.com/office/powerpoint/2010/main" val="1797662810"/>
+      </p:ext>
+    </p:extLst>
+  </p:cSld>
+  <p:clrMapOvr>
+    <a:masterClrMapping/>
+  </p:clrMapOvr>
+  <mc:AlternateContent xmlns:mc="http://schemas.openxmlformats.org/markup-compatibility/2006" xmlns:p14="http://schemas.microsoft.com/office/powerpoint/2010/main">
+    <mc:Choice Requires="p14">
+      <p:transition spd="med" p14:dur="700">
+        <p:fade/>
+      </p:transition>
+    </mc:Choice>
+    <mc:Fallback xmlns="">
+      <p:transition spd="med">
+        <p:fade/>
+      </p:transition>
+    </mc:Fallback>
+  </mc:AlternateContent>
+  <p:timing>
+    <p:tnLst>
+      <p:par>
+        <p:cTn id="1" dur="indefinite" restart="never" nodeType="tmRoot"/>
+      </p:par>
+    </p:tnLst>
+  </p:timing>
+</p:sld>
+</file>
+
+<file path=ppt/slides/slide14.xml><?xml version="1.0" encoding="utf-8"?>
+<p:sld xmlns:a="http://schemas.openxmlformats.org/drawingml/2006/main" xmlns:r="http://schemas.openxmlformats.org/officeDocument/2006/relationships" xmlns:p="http://schemas.openxmlformats.org/presentationml/2006/main">
+  <p:cSld>
+    <p:spTree>
+      <p:nvGrpSpPr>
+        <p:cNvPr id="1" name=""/>
+        <p:cNvGrpSpPr/>
+        <p:nvPr/>
+      </p:nvGrpSpPr>
+      <p:grpSpPr>
+        <a:xfrm>
+          <a:off x="0" y="0"/>
+          <a:ext cx="0" cy="0"/>
+          <a:chOff x="0" y="0"/>
+          <a:chExt cx="0" cy="0"/>
+        </a:xfrm>
+      </p:grpSpPr>
+      <p:sp>
+        <p:nvSpPr>
+          <p:cNvPr id="2" name="Title 1"/>
+          <p:cNvSpPr>
+            <a:spLocks noGrp="1"/>
+          </p:cNvSpPr>
+          <p:nvPr>
+            <p:ph type="title"/>
+          </p:nvPr>
+        </p:nvSpPr>
+        <p:spPr/>
+        <p:txBody>
+          <a:bodyPr/>
+          <a:lstStyle/>
+          <a:p>
+            <a:r>
+              <a:rPr lang="pt-BR" dirty="0" smtClean="0"/>
+              <a:t>Modelador de script (Script Modeler) - OpenSTA</a:t>
+            </a:r>
+            <a:endParaRPr lang="pt-BR" dirty="0"/>
+          </a:p>
+        </p:txBody>
+      </p:sp>
+      <p:sp>
+        <p:nvSpPr>
+          <p:cNvPr id="3" name="Content Placeholder 2"/>
+          <p:cNvSpPr>
+            <a:spLocks noGrp="1"/>
+          </p:cNvSpPr>
+          <p:nvPr>
+            <p:ph idx="1"/>
+          </p:nvPr>
+        </p:nvSpPr>
+        <p:spPr>
+          <a:xfrm>
+            <a:off x="477788" y="1700808"/>
+            <a:ext cx="10360501" cy="4462272"/>
+          </a:xfrm>
+        </p:spPr>
+        <p:txBody>
+          <a:bodyPr>
+            <a:normAutofit/>
+          </a:bodyPr>
+          <a:lstStyle/>
+          <a:p>
+            <a:r>
+              <a:rPr lang="pt-PT" dirty="0"/>
+              <a:t>O painel de resultados da consulta é usado para exibir as respostas do site.</a:t>
+            </a:r>
+          </a:p>
+        </p:txBody>
+      </p:sp>
+      <p:pic>
+        <p:nvPicPr>
+          <p:cNvPr id="5" name="Picture 4" descr="C:\Users\Bruno\Desktop\OpenSTA - Copia.png"/>
+          <p:cNvPicPr>
+            <a:picLocks noChangeAspect="1" noChangeArrowheads="1"/>
+          </p:cNvPicPr>
+          <p:nvPr/>
+        </p:nvPicPr>
+        <p:blipFill>
+          <a:blip r:embed="rId2">
+            <a:extLst>
+              <a:ext uri="{28A0092B-C50C-407E-A947-70E740481C1C}">
+                <a14:useLocalDpi xmlns:a14="http://schemas.microsoft.com/office/drawing/2010/main" val="0"/>
+              </a:ext>
+            </a:extLst>
+          </a:blip>
+          <a:srcRect/>
+          <a:stretch>
+            <a:fillRect/>
+          </a:stretch>
+        </p:blipFill>
+        <p:spPr bwMode="auto">
+          <a:xfrm>
+            <a:off x="4222203" y="2350778"/>
+            <a:ext cx="7848873" cy="4245344"/>
+          </a:xfrm>
+          <a:prstGeom prst="rect">
+            <a:avLst/>
+          </a:prstGeom>
+          <a:noFill/>
+          <a:extLst>
+            <a:ext uri="{909E8E84-426E-40DD-AFC4-6F175D3DCCD1}">
+              <a14:hiddenFill xmlns:a14="http://schemas.microsoft.com/office/drawing/2010/main">
+                <a:solidFill>
+                  <a:srgbClr val="FFFFFF"/>
+                </a:solidFill>
+              </a14:hiddenFill>
+            </a:ext>
+          </a:extLst>
+        </p:spPr>
+      </p:pic>
+    </p:spTree>
+    <p:extLst>
+      <p:ext uri="{BB962C8B-B14F-4D97-AF65-F5344CB8AC3E}">
+        <p14:creationId xmlns:p14="http://schemas.microsoft.com/office/powerpoint/2010/main" val="262736356"/>
+      </p:ext>
+    </p:extLst>
+  </p:cSld>
+  <p:clrMapOvr>
+    <a:masterClrMapping/>
+  </p:clrMapOvr>
+  <mc:AlternateContent xmlns:mc="http://schemas.openxmlformats.org/markup-compatibility/2006" xmlns:p14="http://schemas.microsoft.com/office/powerpoint/2010/main">
+    <mc:Choice Requires="p14">
+      <p:transition spd="med" p14:dur="700">
+        <p:fade/>
+      </p:transition>
+    </mc:Choice>
+    <mc:Fallback xmlns="">
+      <p:transition spd="med">
+        <p:fade/>
+      </p:transition>
+    </mc:Fallback>
+  </mc:AlternateContent>
+  <p:timing>
+    <p:tnLst>
+      <p:par>
+        <p:cTn id="1" dur="indefinite" restart="never" nodeType="tmRoot"/>
+      </p:par>
+    </p:tnLst>
+  </p:timing>
+</p:sld>
+</file>
+
+<file path=ppt/slides/slide15.xml><?xml version="1.0" encoding="utf-8"?>
+<p:sld xmlns:a="http://schemas.openxmlformats.org/drawingml/2006/main" xmlns:r="http://schemas.openxmlformats.org/officeDocument/2006/relationships" xmlns:p="http://schemas.openxmlformats.org/presentationml/2006/main">
+  <p:cSld>
+    <p:spTree>
+      <p:nvGrpSpPr>
+        <p:cNvPr id="1" name=""/>
+        <p:cNvGrpSpPr/>
+        <p:nvPr/>
+      </p:nvGrpSpPr>
+      <p:grpSpPr>
+        <a:xfrm>
+          <a:off x="0" y="0"/>
+          <a:ext cx="0" cy="0"/>
+          <a:chOff x="0" y="0"/>
+          <a:chExt cx="0" cy="0"/>
+        </a:xfrm>
+      </p:grpSpPr>
+      <p:sp>
+        <p:nvSpPr>
+          <p:cNvPr id="2" name="Title 1"/>
+          <p:cNvSpPr>
+            <a:spLocks noGrp="1"/>
+          </p:cNvSpPr>
+          <p:nvPr>
+            <p:ph type="title"/>
+          </p:nvPr>
+        </p:nvSpPr>
+        <p:spPr/>
+        <p:txBody>
+          <a:bodyPr/>
+          <a:lstStyle/>
+          <a:p>
+            <a:r>
+              <a:rPr lang="pt-BR" dirty="0" smtClean="0"/>
+              <a:t>Gerando um teste - OpenSTA</a:t>
+            </a:r>
+            <a:endParaRPr lang="pt-BR" dirty="0"/>
+          </a:p>
+        </p:txBody>
+      </p:sp>
+      <p:sp>
+        <p:nvSpPr>
+          <p:cNvPr id="3" name="Content Placeholder 2"/>
+          <p:cNvSpPr>
+            <a:spLocks noGrp="1"/>
+          </p:cNvSpPr>
+          <p:nvPr>
+            <p:ph idx="1"/>
+          </p:nvPr>
+        </p:nvSpPr>
+        <p:spPr>
+          <a:xfrm>
+            <a:off x="1197868" y="1700808"/>
+            <a:ext cx="10360501" cy="4462272"/>
+          </a:xfrm>
+        </p:spPr>
+        <p:txBody>
+          <a:bodyPr>
+            <a:normAutofit/>
+          </a:bodyPr>
+          <a:lstStyle/>
+          <a:p>
+            <a:r>
+              <a:rPr lang="pt-PT" dirty="0" smtClean="0"/>
+              <a:t>Após gravar um ou mais scripts de teste.</a:t>
+            </a:r>
+          </a:p>
+          <a:p>
+            <a:r>
+              <a:rPr lang="pt-PT" dirty="0" smtClean="0"/>
+              <a:t>Selecionar a ordem de exeção de cada um</a:t>
+            </a:r>
+            <a:r>
+              <a:rPr lang="pt-PT" dirty="0" smtClean="0"/>
+              <a:t>.</a:t>
+            </a:r>
+          </a:p>
+          <a:p>
+            <a:endParaRPr lang="pt-PT" dirty="0" smtClean="0"/>
+          </a:p>
+        </p:txBody>
+      </p:sp>
+      <p:pic>
+        <p:nvPicPr>
+          <p:cNvPr id="3074" name="Picture 2" descr="C:\Users\Bruno\Desktop\Sem título.png"/>
+          <p:cNvPicPr>
+            <a:picLocks noChangeAspect="1" noChangeArrowheads="1"/>
+          </p:cNvPicPr>
+          <p:nvPr/>
+        </p:nvPicPr>
+        <p:blipFill>
+          <a:blip r:embed="rId2">
+            <a:extLst>
+              <a:ext uri="{28A0092B-C50C-407E-A947-70E740481C1C}">
+                <a14:useLocalDpi xmlns:a14="http://schemas.microsoft.com/office/drawing/2010/main" val="0"/>
+              </a:ext>
+            </a:extLst>
+          </a:blip>
+          <a:srcRect/>
+          <a:stretch>
+            <a:fillRect/>
+          </a:stretch>
+        </p:blipFill>
+        <p:spPr bwMode="auto">
+          <a:xfrm>
+            <a:off x="2277988" y="2801818"/>
+            <a:ext cx="7568670" cy="3826371"/>
+          </a:xfrm>
+          <a:prstGeom prst="rect">
+            <a:avLst/>
+          </a:prstGeom>
+          <a:noFill/>
+          <a:extLst>
+            <a:ext uri="{909E8E84-426E-40DD-AFC4-6F175D3DCCD1}">
+              <a14:hiddenFill xmlns:a14="http://schemas.microsoft.com/office/drawing/2010/main">
+                <a:solidFill>
+                  <a:srgbClr val="FFFFFF"/>
+                </a:solidFill>
+              </a14:hiddenFill>
+            </a:ext>
+          </a:extLst>
+        </p:spPr>
+      </p:pic>
+    </p:spTree>
+    <p:extLst>
+      <p:ext uri="{BB962C8B-B14F-4D97-AF65-F5344CB8AC3E}">
+        <p14:creationId xmlns:p14="http://schemas.microsoft.com/office/powerpoint/2010/main" val="4141869526"/>
+      </p:ext>
+    </p:extLst>
+  </p:cSld>
+  <p:clrMapOvr>
+    <a:masterClrMapping/>
+  </p:clrMapOvr>
+  <mc:AlternateContent xmlns:mc="http://schemas.openxmlformats.org/markup-compatibility/2006" xmlns:p14="http://schemas.microsoft.com/office/powerpoint/2010/main">
+    <mc:Choice Requires="p14">
+      <p:transition spd="med" p14:dur="700">
+        <p:fade/>
+      </p:transition>
+    </mc:Choice>
+    <mc:Fallback xmlns="">
+      <p:transition spd="med">
+        <p:fade/>
+      </p:transition>
+    </mc:Fallback>
+  </mc:AlternateContent>
+  <p:timing>
+    <p:tnLst>
+      <p:par>
+        <p:cTn id="1" dur="indefinite" restart="never" nodeType="tmRoot"/>
+      </p:par>
+    </p:tnLst>
+  </p:timing>
+</p:sld>
+</file>
+
+<file path=ppt/slides/slide16.xml><?xml version="1.0" encoding="utf-8"?>
+<p:sld xmlns:a="http://schemas.openxmlformats.org/drawingml/2006/main" xmlns:r="http://schemas.openxmlformats.org/officeDocument/2006/relationships" xmlns:p="http://schemas.openxmlformats.org/presentationml/2006/main">
+  <p:cSld>
+    <p:spTree>
+      <p:nvGrpSpPr>
+        <p:cNvPr id="1" name=""/>
+        <p:cNvGrpSpPr/>
+        <p:nvPr/>
+      </p:nvGrpSpPr>
+      <p:grpSpPr>
+        <a:xfrm>
+          <a:off x="0" y="0"/>
+          <a:ext cx="0" cy="0"/>
+          <a:chOff x="0" y="0"/>
+          <a:chExt cx="0" cy="0"/>
+        </a:xfrm>
+      </p:grpSpPr>
+      <p:sp>
+        <p:nvSpPr>
+          <p:cNvPr id="3" name="Título 2"/>
+          <p:cNvSpPr>
+            <a:spLocks noGrp="1"/>
+          </p:cNvSpPr>
+          <p:nvPr>
+            <p:ph type="title"/>
+          </p:nvPr>
+        </p:nvSpPr>
+        <p:spPr/>
+        <p:txBody>
+          <a:bodyPr rtlCol="0"/>
+          <a:lstStyle/>
+          <a:p>
+            <a:r>
+              <a:rPr lang="pt-BR" dirty="0">
+                <a:latin typeface="Arial Rounded MT Bold" panose="020F0704030504030204" pitchFamily="34" charset="0"/>
+              </a:rPr>
+              <a:t>The Grinder</a:t>
+            </a:r>
+            <a:endParaRPr lang="pt-BR" dirty="0"/>
+          </a:p>
+        </p:txBody>
+      </p:sp>
+      <p:sp>
+        <p:nvSpPr>
+          <p:cNvPr id="2" name="Espaço Reservado para Conteúdo 1"/>
+          <p:cNvSpPr>
+            <a:spLocks noGrp="1"/>
+          </p:cNvSpPr>
+          <p:nvPr>
+            <p:ph idx="1"/>
+          </p:nvPr>
+        </p:nvSpPr>
+        <p:spPr/>
+        <p:txBody>
+          <a:bodyPr/>
+          <a:lstStyle/>
+          <a:p>
+            <a:r>
+              <a:rPr lang="pt-BR" dirty="0"/>
+              <a:t>É um framework de testes de carga que facilita a execução de testes de carga distribuídas entre vários servidores.</a:t>
+            </a:r>
+            <a:br>
+              <a:rPr lang="pt-BR" dirty="0"/>
+            </a:br>
+            <a:r>
+              <a:rPr lang="pt-BR" dirty="0"/>
+              <a:t>Os scripts de teste são escritos em Jython ou Cloujure, fornecendo suporte para testar uma ampla gama de protocolos de rede.</a:t>
+            </a:r>
+          </a:p>
+          <a:p>
+            <a:r>
+              <a:rPr lang="pt-BR" dirty="0"/>
+              <a:t>O The Grinder também vem com um plug-in para testar serviços HTTP.</a:t>
+            </a:r>
+          </a:p>
+          <a:p>
+            <a:pPr marL="0" indent="0">
+              <a:buNone/>
+            </a:pPr>
+            <a:endParaRPr lang="pt-BR" dirty="0"/>
+          </a:p>
+        </p:txBody>
+      </p:sp>
+    </p:spTree>
+    <p:extLst>
+      <p:ext uri="{BB962C8B-B14F-4D97-AF65-F5344CB8AC3E}">
+        <p14:creationId xmlns:p14="http://schemas.microsoft.com/office/powerpoint/2010/main" val="397710800"/>
+      </p:ext>
+    </p:extLst>
+  </p:cSld>
+  <p:clrMapOvr>
+    <a:masterClrMapping/>
+  </p:clrMapOvr>
+  <mc:AlternateContent xmlns:mc="http://schemas.openxmlformats.org/markup-compatibility/2006" xmlns:p14="http://schemas.microsoft.com/office/powerpoint/2010/main">
+    <mc:Choice Requires="p14">
+      <p:transition spd="med" p14:dur="700">
+        <p:fade/>
+      </p:transition>
+    </mc:Choice>
+    <mc:Fallback xmlns="">
+      <p:transition spd="med">
+        <p:fade/>
+      </p:transition>
+    </mc:Fallback>
+  </mc:AlternateContent>
+</p:sld>
+</file>
+
+<file path=ppt/slides/slide17.xml><?xml version="1.0" encoding="utf-8"?>
+<p:sld xmlns:a="http://schemas.openxmlformats.org/drawingml/2006/main" xmlns:r="http://schemas.openxmlformats.org/officeDocument/2006/relationships" xmlns:p="http://schemas.openxmlformats.org/presentationml/2006/main">
+  <p:cSld>
+    <p:spTree>
+      <p:nvGrpSpPr>
+        <p:cNvPr id="1" name=""/>
+        <p:cNvGrpSpPr/>
+        <p:nvPr/>
+      </p:nvGrpSpPr>
+      <p:grpSpPr>
+        <a:xfrm>
+          <a:off x="0" y="0"/>
+          <a:ext cx="0" cy="0"/>
+          <a:chOff x="0" y="0"/>
+          <a:chExt cx="0" cy="0"/>
+        </a:xfrm>
+      </p:grpSpPr>
+      <p:sp>
+        <p:nvSpPr>
+          <p:cNvPr id="2" name="Título 1"/>
+          <p:cNvSpPr>
+            <a:spLocks noGrp="1"/>
+          </p:cNvSpPr>
+          <p:nvPr>
+            <p:ph type="title"/>
+          </p:nvPr>
+        </p:nvSpPr>
+        <p:spPr/>
+        <p:txBody>
+          <a:bodyPr/>
+          <a:lstStyle/>
+          <a:p>
+            <a:r>
+              <a:rPr lang="pt-BR" dirty="0"/>
+              <a:t>Componentes </a:t>
+            </a:r>
+          </a:p>
+        </p:txBody>
+      </p:sp>
+      <p:sp>
+        <p:nvSpPr>
+          <p:cNvPr id="3" name="Espaço Reservado para Conteúdo 2"/>
+          <p:cNvSpPr>
+            <a:spLocks noGrp="1"/>
+          </p:cNvSpPr>
+          <p:nvPr>
+            <p:ph idx="1"/>
+          </p:nvPr>
+        </p:nvSpPr>
+        <p:spPr>
+          <a:xfrm>
+            <a:off x="1218883" y="1701796"/>
+            <a:ext cx="10360501" cy="5039571"/>
+          </a:xfrm>
+        </p:spPr>
+        <p:txBody>
+          <a:bodyPr>
+            <a:normAutofit lnSpcReduction="10000"/>
+          </a:bodyPr>
+          <a:lstStyle/>
+          <a:p>
+            <a:r>
+              <a:rPr lang="pt-BR" dirty="0"/>
+              <a:t>Agentes (agents)</a:t>
+            </a:r>
+          </a:p>
+          <a:p>
+            <a:pPr marL="0" indent="0">
+              <a:buNone/>
+            </a:pPr>
+            <a:r>
+              <a:rPr lang="pt-BR" dirty="0"/>
+              <a:t>Geralmente um único agente em cada máquina injetora de carga, que irá iniciar um número configurado de processos de trabalho.</a:t>
+            </a:r>
+          </a:p>
+          <a:p>
+            <a:endParaRPr lang="pt-BR" dirty="0"/>
+          </a:p>
+          <a:p>
+            <a:r>
+              <a:rPr lang="pt-BR" dirty="0"/>
+              <a:t>Trabalhadores (workers)</a:t>
+            </a:r>
+          </a:p>
+          <a:p>
+            <a:pPr marL="0" indent="0">
+              <a:buNone/>
+            </a:pPr>
+            <a:r>
+              <a:rPr lang="pt-BR" dirty="0"/>
+              <a:t>Fazem o trabalho de teste, ou seja, eles realmente executam os scripts de teste de carga. O arquivo grinder.Properties que é passado para o trabalhador pelo agente define, entre outras coisas, o script que o trabalhador irá executar contra o alvo, quantos threads o trabalhador vai gerar, e quantas vezes cada um desses tópicos ira executar o script.</a:t>
+            </a:r>
+          </a:p>
+          <a:p>
+            <a:endParaRPr lang="pt-BR" dirty="0"/>
+          </a:p>
+        </p:txBody>
+      </p:sp>
+    </p:spTree>
+    <p:extLst>
+      <p:ext uri="{BB962C8B-B14F-4D97-AF65-F5344CB8AC3E}">
+        <p14:creationId xmlns:p14="http://schemas.microsoft.com/office/powerpoint/2010/main" val="1405850135"/>
+      </p:ext>
+    </p:extLst>
+  </p:cSld>
+  <p:clrMapOvr>
+    <a:masterClrMapping/>
+  </p:clrMapOvr>
+  <mc:AlternateContent xmlns:mc="http://schemas.openxmlformats.org/markup-compatibility/2006" xmlns:p14="http://schemas.microsoft.com/office/powerpoint/2010/main">
+    <mc:Choice Requires="p14">
+      <p:transition spd="med" p14:dur="700">
+        <p:fade/>
+      </p:transition>
+    </mc:Choice>
+    <mc:Fallback xmlns="">
+      <p:transition spd="med">
+        <p:fade/>
+      </p:transition>
+    </mc:Fallback>
+  </mc:AlternateContent>
+</p:sld>
+</file>
+
+<file path=ppt/slides/slide18.xml><?xml version="1.0" encoding="utf-8"?>
+<p:sld xmlns:a="http://schemas.openxmlformats.org/drawingml/2006/main" xmlns:r="http://schemas.openxmlformats.org/officeDocument/2006/relationships" xmlns:p="http://schemas.openxmlformats.org/presentationml/2006/main">
+  <p:cSld>
+    <p:spTree>
+      <p:nvGrpSpPr>
+        <p:cNvPr id="1" name=""/>
+        <p:cNvGrpSpPr/>
+        <p:nvPr/>
+      </p:nvGrpSpPr>
+      <p:grpSpPr>
+        <a:xfrm>
+          <a:off x="0" y="0"/>
+          <a:ext cx="0" cy="0"/>
+          <a:chOff x="0" y="0"/>
+          <a:chExt cx="0" cy="0"/>
+        </a:xfrm>
+      </p:grpSpPr>
+      <p:sp>
+        <p:nvSpPr>
           <p:cNvPr id="8" name="Espaço Reservado para Conteúdo 7"/>
           <p:cNvSpPr>
             <a:spLocks noGrp="1"/>
@@ -5565,7 +6769,7 @@
 </p:sld>
 </file>
 
-<file path=ppt/slides/slide12.xml><?xml version="1.0" encoding="utf-8"?>
+<file path=ppt/slides/slide19.xml><?xml version="1.0" encoding="utf-8"?>
 <p:sld xmlns:a="http://schemas.openxmlformats.org/drawingml/2006/main" xmlns:r="http://schemas.openxmlformats.org/officeDocument/2006/relationships" xmlns:p="http://schemas.openxmlformats.org/presentationml/2006/main">
   <p:cSld>
     <p:spTree>
@@ -5643,1195 +6847,6 @@
     <p:extLst>
       <p:ext uri="{BB962C8B-B14F-4D97-AF65-F5344CB8AC3E}">
         <p14:creationId xmlns:p14="http://schemas.microsoft.com/office/powerpoint/2010/main" val="3480339974"/>
-      </p:ext>
-    </p:extLst>
-  </p:cSld>
-  <p:clrMapOvr>
-    <a:masterClrMapping/>
-  </p:clrMapOvr>
-  <mc:AlternateContent xmlns:mc="http://schemas.openxmlformats.org/markup-compatibility/2006" xmlns:p14="http://schemas.microsoft.com/office/powerpoint/2010/main">
-    <mc:Choice Requires="p14">
-      <p:transition spd="med" p14:dur="700">
-        <p:fade/>
-      </p:transition>
-    </mc:Choice>
-    <mc:Fallback xmlns="">
-      <p:transition spd="med">
-        <p:fade/>
-      </p:transition>
-    </mc:Fallback>
-  </mc:AlternateContent>
-</p:sld>
-</file>
-
-<file path=ppt/slides/slide13.xml><?xml version="1.0" encoding="utf-8"?>
-<p:sld xmlns:a="http://schemas.openxmlformats.org/drawingml/2006/main" xmlns:r="http://schemas.openxmlformats.org/officeDocument/2006/relationships" xmlns:p="http://schemas.openxmlformats.org/presentationml/2006/main">
-  <p:cSld>
-    <p:spTree>
-      <p:nvGrpSpPr>
-        <p:cNvPr id="1" name=""/>
-        <p:cNvGrpSpPr/>
-        <p:nvPr/>
-      </p:nvGrpSpPr>
-      <p:grpSpPr>
-        <a:xfrm>
-          <a:off x="0" y="0"/>
-          <a:ext cx="0" cy="0"/>
-          <a:chOff x="0" y="0"/>
-          <a:chExt cx="0" cy="0"/>
-        </a:xfrm>
-      </p:grpSpPr>
-      <p:sp>
-        <p:nvSpPr>
-          <p:cNvPr id="2" name="Título 1"/>
-          <p:cNvSpPr>
-            <a:spLocks noGrp="1"/>
-          </p:cNvSpPr>
-          <p:nvPr>
-            <p:ph type="title"/>
-          </p:nvPr>
-        </p:nvSpPr>
-        <p:spPr>
-          <a:xfrm>
-            <a:off x="1625176" y="404664"/>
-            <a:ext cx="8938472" cy="1003175"/>
-          </a:xfrm>
-        </p:spPr>
-        <p:txBody>
-          <a:bodyPr/>
-          <a:lstStyle/>
-          <a:p>
-            <a:r>
-              <a:rPr lang="pt-BR" b="1" dirty="0">
-                <a:latin typeface="Arial Rounded MT Bold" panose="020F0704030504030204" pitchFamily="34" charset="0"/>
-              </a:rPr>
-              <a:t>JUnitPerf</a:t>
-            </a:r>
-          </a:p>
-        </p:txBody>
-      </p:sp>
-      <p:sp>
-        <p:nvSpPr>
-          <p:cNvPr id="3" name="Espaço Reservado para Conteúdo 2"/>
-          <p:cNvSpPr>
-            <a:spLocks noGrp="1"/>
-          </p:cNvSpPr>
-          <p:nvPr>
-            <p:ph type="body" idx="1"/>
-          </p:nvPr>
-        </p:nvSpPr>
-        <p:spPr>
-          <a:xfrm>
-            <a:off x="1269876" y="1407840"/>
-            <a:ext cx="10369152" cy="4764360"/>
-          </a:xfrm>
-        </p:spPr>
-        <p:txBody>
-          <a:bodyPr>
-            <a:normAutofit/>
-          </a:bodyPr>
-          <a:lstStyle/>
-          <a:p>
-            <a:pPr marL="0" indent="0">
-              <a:buNone/>
-            </a:pPr>
-            <a:r>
-              <a:rPr lang="pt-BR" cap="none" dirty="0">
-                <a:solidFill>
-                  <a:schemeClr val="tx1"/>
-                </a:solidFill>
-              </a:rPr>
-              <a:t>Coleção de decoradores para medir performance escalabilidade em testes </a:t>
-            </a:r>
-            <a:r>
-              <a:rPr lang="pt-BR" cap="none" dirty="0" err="1">
-                <a:solidFill>
-                  <a:schemeClr val="tx1"/>
-                </a:solidFill>
-              </a:rPr>
-              <a:t>JUnit</a:t>
-            </a:r>
-            <a:r>
-              <a:rPr lang="pt-BR" cap="none" dirty="0">
-                <a:solidFill>
-                  <a:schemeClr val="tx1"/>
-                </a:solidFill>
-              </a:rPr>
-              <a:t> existentes.</a:t>
-            </a:r>
-          </a:p>
-          <a:p>
-            <a:pPr marL="0" indent="0">
-              <a:buNone/>
-            </a:pPr>
-            <a:r>
-              <a:rPr lang="pt-BR" cap="none" dirty="0">
-                <a:solidFill>
-                  <a:schemeClr val="tx1"/>
-                </a:solidFill>
-              </a:rPr>
-              <a:t>Para testes automáticos de performance o </a:t>
-            </a:r>
-            <a:r>
-              <a:rPr lang="pt-BR" cap="none" dirty="0" err="1">
-                <a:solidFill>
-                  <a:schemeClr val="tx1"/>
-                </a:solidFill>
-              </a:rPr>
-              <a:t>JUnitPerf</a:t>
-            </a:r>
-            <a:r>
-              <a:rPr lang="pt-BR" cap="none" dirty="0">
-                <a:solidFill>
-                  <a:schemeClr val="tx1"/>
-                </a:solidFill>
-              </a:rPr>
-              <a:t> oferece classes que permitem construir objetos que recebem testes existentes do </a:t>
-            </a:r>
-            <a:r>
-              <a:rPr lang="pt-BR" cap="none" dirty="0" err="1">
-                <a:solidFill>
-                  <a:schemeClr val="tx1"/>
-                </a:solidFill>
-              </a:rPr>
-              <a:t>JUnit</a:t>
-            </a:r>
-            <a:r>
-              <a:rPr lang="pt-BR" cap="none" dirty="0">
-                <a:solidFill>
-                  <a:schemeClr val="tx1"/>
-                </a:solidFill>
-              </a:rPr>
-              <a:t> e acrescentam neles avaliação de performance</a:t>
-            </a:r>
-          </a:p>
-          <a:p>
-            <a:pPr marL="0" indent="0">
-              <a:buNone/>
-            </a:pPr>
-            <a:r>
-              <a:rPr lang="pt-BR" cap="none" dirty="0" err="1">
-                <a:solidFill>
-                  <a:schemeClr val="tx1"/>
-                </a:solidFill>
-              </a:rPr>
-              <a:t>JUnitPerf</a:t>
-            </a:r>
-            <a:r>
-              <a:rPr lang="pt-BR" cap="none" dirty="0">
-                <a:solidFill>
-                  <a:schemeClr val="tx1"/>
-                </a:solidFill>
-              </a:rPr>
-              <a:t> não altera testes existentes, podendo rodar os testes sem o </a:t>
-            </a:r>
-            <a:r>
-              <a:rPr lang="pt-BR" cap="none" dirty="0" err="1">
-                <a:solidFill>
-                  <a:schemeClr val="tx1"/>
-                </a:solidFill>
-              </a:rPr>
-              <a:t>JUnitPerf</a:t>
-            </a:r>
-            <a:r>
-              <a:rPr lang="pt-BR" cap="none" dirty="0">
-                <a:solidFill>
-                  <a:schemeClr val="tx1"/>
-                </a:solidFill>
-              </a:rPr>
-              <a:t>.</a:t>
-            </a:r>
-          </a:p>
-        </p:txBody>
-      </p:sp>
-    </p:spTree>
-    <p:extLst>
-      <p:ext uri="{BB962C8B-B14F-4D97-AF65-F5344CB8AC3E}">
-        <p14:creationId xmlns:p14="http://schemas.microsoft.com/office/powerpoint/2010/main" val="984624682"/>
-      </p:ext>
-    </p:extLst>
-  </p:cSld>
-  <p:clrMapOvr>
-    <a:masterClrMapping/>
-  </p:clrMapOvr>
-  <mc:AlternateContent xmlns:mc="http://schemas.openxmlformats.org/markup-compatibility/2006" xmlns:p14="http://schemas.microsoft.com/office/powerpoint/2010/main">
-    <mc:Choice Requires="p14">
-      <p:transition spd="med" p14:dur="700">
-        <p:fade/>
-      </p:transition>
-    </mc:Choice>
-    <mc:Fallback xmlns="">
-      <p:transition spd="med">
-        <p:fade/>
-      </p:transition>
-    </mc:Fallback>
-  </mc:AlternateContent>
-</p:sld>
-</file>
-
-<file path=ppt/slides/slide14.xml><?xml version="1.0" encoding="utf-8"?>
-<p:sld xmlns:a="http://schemas.openxmlformats.org/drawingml/2006/main" xmlns:r="http://schemas.openxmlformats.org/officeDocument/2006/relationships" xmlns:p="http://schemas.openxmlformats.org/presentationml/2006/main">
-  <p:cSld>
-    <p:spTree>
-      <p:nvGrpSpPr>
-        <p:cNvPr id="1" name=""/>
-        <p:cNvGrpSpPr/>
-        <p:nvPr/>
-      </p:nvGrpSpPr>
-      <p:grpSpPr>
-        <a:xfrm>
-          <a:off x="0" y="0"/>
-          <a:ext cx="0" cy="0"/>
-          <a:chOff x="0" y="0"/>
-          <a:chExt cx="0" cy="0"/>
-        </a:xfrm>
-      </p:grpSpPr>
-      <p:sp>
-        <p:nvSpPr>
-          <p:cNvPr id="2" name="Título 1"/>
-          <p:cNvSpPr>
-            <a:spLocks noGrp="1"/>
-          </p:cNvSpPr>
-          <p:nvPr>
-            <p:ph type="title"/>
-          </p:nvPr>
-        </p:nvSpPr>
-        <p:spPr/>
-        <p:txBody>
-          <a:bodyPr/>
-          <a:lstStyle/>
-          <a:p>
-            <a:r>
-              <a:rPr lang="pt-BR" dirty="0"/>
-              <a:t>Componentes</a:t>
-            </a:r>
-          </a:p>
-        </p:txBody>
-      </p:sp>
-      <p:sp>
-        <p:nvSpPr>
-          <p:cNvPr id="3" name="Espaço Reservado para Conteúdo 2"/>
-          <p:cNvSpPr>
-            <a:spLocks noGrp="1"/>
-          </p:cNvSpPr>
-          <p:nvPr>
-            <p:ph idx="1"/>
-          </p:nvPr>
-        </p:nvSpPr>
-        <p:spPr>
-          <a:xfrm>
-            <a:off x="981845" y="1498600"/>
-            <a:ext cx="10873208" cy="5026743"/>
-          </a:xfrm>
-        </p:spPr>
-        <p:txBody>
-          <a:bodyPr>
-            <a:normAutofit fontScale="92500" lnSpcReduction="10000"/>
-          </a:bodyPr>
-          <a:lstStyle/>
-          <a:p>
-            <a:r>
-              <a:rPr lang="pt-BR" dirty="0"/>
-              <a:t>Timedtest</a:t>
-            </a:r>
-          </a:p>
-          <a:p>
-            <a:pPr marL="0" indent="0">
-              <a:buNone/>
-            </a:pPr>
-            <a:r>
-              <a:rPr lang="pt-BR" dirty="0"/>
-              <a:t>Executa um teste e mede o tempo transcorrido.</a:t>
-            </a:r>
-          </a:p>
-          <a:p>
-            <a:pPr marL="0" indent="0">
-              <a:buNone/>
-            </a:pPr>
-            <a:r>
-              <a:rPr lang="pt-BR" dirty="0"/>
-              <a:t>Define um tempo máximo para a execução. Teste a falha se a execução durar mais que o tempo estabelecido</a:t>
-            </a:r>
-          </a:p>
-          <a:p>
-            <a:r>
-              <a:rPr lang="pt-BR" dirty="0"/>
-              <a:t>Loadtest</a:t>
-            </a:r>
-          </a:p>
-          <a:p>
-            <a:pPr marL="0" indent="0">
-              <a:buNone/>
-            </a:pPr>
-            <a:r>
-              <a:rPr lang="pt-BR" dirty="0"/>
-              <a:t>Executa um teste com uma carga simulada.</a:t>
-            </a:r>
-          </a:p>
-          <a:p>
-            <a:pPr marL="0" indent="0">
-              <a:buNone/>
-            </a:pPr>
-            <a:r>
-              <a:rPr lang="pt-BR" dirty="0"/>
-              <a:t>Utiliza timers para distribuir as cargas usando distribuições randômicas</a:t>
-            </a:r>
-          </a:p>
-          <a:p>
-            <a:pPr marL="0" indent="0">
-              <a:buNone/>
-            </a:pPr>
-            <a:r>
-              <a:rPr lang="pt-BR" dirty="0"/>
-              <a:t>Combinado com timertest para medir tempo com carga.</a:t>
-            </a:r>
-          </a:p>
-          <a:p>
-            <a:r>
-              <a:rPr lang="pt-BR" dirty="0"/>
-              <a:t>Threadedtest</a:t>
-            </a:r>
-          </a:p>
-          <a:p>
-            <a:pPr marL="0" indent="0">
-              <a:buNone/>
-            </a:pPr>
-            <a:r>
-              <a:rPr lang="pt-BR" dirty="0"/>
-              <a:t> Executa o teste em um thread separado.</a:t>
-            </a:r>
-          </a:p>
-          <a:p>
-            <a:endParaRPr lang="pt-BR" dirty="0"/>
-          </a:p>
-        </p:txBody>
-      </p:sp>
-    </p:spTree>
-    <p:extLst>
-      <p:ext uri="{BB962C8B-B14F-4D97-AF65-F5344CB8AC3E}">
-        <p14:creationId xmlns:p14="http://schemas.microsoft.com/office/powerpoint/2010/main" val="4202224108"/>
-      </p:ext>
-    </p:extLst>
-  </p:cSld>
-  <p:clrMapOvr>
-    <a:masterClrMapping/>
-  </p:clrMapOvr>
-  <mc:AlternateContent xmlns:mc="http://schemas.openxmlformats.org/markup-compatibility/2006" xmlns:p14="http://schemas.microsoft.com/office/powerpoint/2010/main">
-    <mc:Choice Requires="p14">
-      <p:transition spd="med" p14:dur="700">
-        <p:fade/>
-      </p:transition>
-    </mc:Choice>
-    <mc:Fallback xmlns="">
-      <p:transition spd="med">
-        <p:fade/>
-      </p:transition>
-    </mc:Fallback>
-  </mc:AlternateContent>
-</p:sld>
-</file>
-
-<file path=ppt/slides/slide15.xml><?xml version="1.0" encoding="utf-8"?>
-<p:sld xmlns:a="http://schemas.openxmlformats.org/drawingml/2006/main" xmlns:r="http://schemas.openxmlformats.org/officeDocument/2006/relationships" xmlns:p="http://schemas.openxmlformats.org/presentationml/2006/main">
-  <p:cSld>
-    <p:spTree>
-      <p:nvGrpSpPr>
-        <p:cNvPr id="1" name=""/>
-        <p:cNvGrpSpPr/>
-        <p:nvPr/>
-      </p:nvGrpSpPr>
-      <p:grpSpPr>
-        <a:xfrm>
-          <a:off x="0" y="0"/>
-          <a:ext cx="0" cy="0"/>
-          <a:chOff x="0" y="0"/>
-          <a:chExt cx="0" cy="0"/>
-        </a:xfrm>
-      </p:grpSpPr>
-      <p:sp>
-        <p:nvSpPr>
-          <p:cNvPr id="2" name="Título 1"/>
-          <p:cNvSpPr>
-            <a:spLocks noGrp="1"/>
-          </p:cNvSpPr>
-          <p:nvPr>
-            <p:ph type="title"/>
-          </p:nvPr>
-        </p:nvSpPr>
-        <p:spPr/>
-        <p:txBody>
-          <a:bodyPr/>
-          <a:lstStyle/>
-          <a:p>
-            <a:r>
-              <a:rPr lang="pt-BR" dirty="0"/>
-              <a:t>Passos para executar os Testes</a:t>
-            </a:r>
-          </a:p>
-        </p:txBody>
-      </p:sp>
-      <p:sp>
-        <p:nvSpPr>
-          <p:cNvPr id="3" name="Espaço Reservado para Conteúdo 2"/>
-          <p:cNvSpPr>
-            <a:spLocks noGrp="1"/>
-          </p:cNvSpPr>
-          <p:nvPr>
-            <p:ph idx="1"/>
-          </p:nvPr>
-        </p:nvSpPr>
-        <p:spPr>
-          <a:xfrm>
-            <a:off x="1218883" y="1701796"/>
-            <a:ext cx="10204121" cy="4823547"/>
-          </a:xfrm>
-        </p:spPr>
-        <p:txBody>
-          <a:bodyPr>
-            <a:normAutofit lnSpcReduction="10000"/>
-          </a:bodyPr>
-          <a:lstStyle/>
-          <a:p>
-            <a:r>
-              <a:rPr lang="pt-BR" dirty="0"/>
-              <a:t>Primeiro é preciso estimar os valores ideais para execução dos testes.</a:t>
-            </a:r>
-          </a:p>
-          <a:p>
-            <a:r>
-              <a:rPr lang="pt-BR" dirty="0"/>
-              <a:t>1. Escrever testes JUnit para o código.</a:t>
-            </a:r>
-          </a:p>
-          <a:p>
-            <a:r>
-              <a:rPr lang="pt-BR" dirty="0"/>
-              <a:t>2. Executar um profiler para descobrir os </a:t>
-            </a:r>
-            <a:r>
-              <a:rPr lang="pt-BR" dirty="0" err="1"/>
-              <a:t>gargalos.utilizar</a:t>
-            </a:r>
-            <a:r>
-              <a:rPr lang="pt-BR" dirty="0"/>
-              <a:t> os dados obtidos como parâmetros para estabelecer os valores máximos aceitáveis para cada método.</a:t>
-            </a:r>
-          </a:p>
-          <a:p>
-            <a:r>
-              <a:rPr lang="pt-BR" dirty="0"/>
-              <a:t>3. Escrever testes do JUnit (se não existirem) para os trechos críticos quanto à performance.</a:t>
-            </a:r>
-          </a:p>
-          <a:p>
-            <a:r>
-              <a:rPr lang="pt-BR" dirty="0"/>
-              <a:t>4. Escrever um TimedTest do JUnitPerf para cada teste novo e executá-lo. O teste deve falhar. Se passar, não há problema de performance com o Código.</a:t>
-            </a:r>
-          </a:p>
-          <a:p>
-            <a:endParaRPr lang="pt-BR" dirty="0"/>
-          </a:p>
-        </p:txBody>
-      </p:sp>
-    </p:spTree>
-    <p:extLst>
-      <p:ext uri="{BB962C8B-B14F-4D97-AF65-F5344CB8AC3E}">
-        <p14:creationId xmlns:p14="http://schemas.microsoft.com/office/powerpoint/2010/main" val="1595594672"/>
-      </p:ext>
-    </p:extLst>
-  </p:cSld>
-  <p:clrMapOvr>
-    <a:masterClrMapping/>
-  </p:clrMapOvr>
-  <mc:AlternateContent xmlns:mc="http://schemas.openxmlformats.org/markup-compatibility/2006" xmlns:p14="http://schemas.microsoft.com/office/powerpoint/2010/main">
-    <mc:Choice Requires="p14">
-      <p:transition spd="med" p14:dur="700">
-        <p:fade/>
-      </p:transition>
-    </mc:Choice>
-    <mc:Fallback xmlns="">
-      <p:transition spd="med">
-        <p:fade/>
-      </p:transition>
-    </mc:Fallback>
-  </mc:AlternateContent>
-</p:sld>
-</file>
-
-<file path=ppt/slides/slide16.xml><?xml version="1.0" encoding="utf-8"?>
-<p:sld xmlns:a="http://schemas.openxmlformats.org/drawingml/2006/main" xmlns:r="http://schemas.openxmlformats.org/officeDocument/2006/relationships" xmlns:p="http://schemas.openxmlformats.org/presentationml/2006/main">
-  <p:cSld>
-    <p:spTree>
-      <p:nvGrpSpPr>
-        <p:cNvPr id="1" name=""/>
-        <p:cNvGrpSpPr/>
-        <p:nvPr/>
-      </p:nvGrpSpPr>
-      <p:grpSpPr>
-        <a:xfrm>
-          <a:off x="0" y="0"/>
-          <a:ext cx="0" cy="0"/>
-          <a:chOff x="0" y="0"/>
-          <a:chExt cx="0" cy="0"/>
-        </a:xfrm>
-      </p:grpSpPr>
-      <p:sp>
-        <p:nvSpPr>
-          <p:cNvPr id="2" name="Título 1"/>
-          <p:cNvSpPr>
-            <a:spLocks noGrp="1"/>
-          </p:cNvSpPr>
-          <p:nvPr>
-            <p:ph type="title"/>
-          </p:nvPr>
-        </p:nvSpPr>
-        <p:spPr>
-          <a:xfrm>
-            <a:off x="1625176" y="476672"/>
-            <a:ext cx="8938472" cy="931167"/>
-          </a:xfrm>
-        </p:spPr>
-        <p:txBody>
-          <a:bodyPr/>
-          <a:lstStyle/>
-          <a:p>
-            <a:r>
-              <a:rPr lang="pt-BR" b="1" dirty="0">
-                <a:latin typeface="Arial Rounded MT Bold" panose="020F0704030504030204" pitchFamily="34" charset="0"/>
-              </a:rPr>
-              <a:t>PyUnitPerf</a:t>
-            </a:r>
-          </a:p>
-        </p:txBody>
-      </p:sp>
-      <p:sp>
-        <p:nvSpPr>
-          <p:cNvPr id="3" name="Espaço Reservado para Conteúdo 2"/>
-          <p:cNvSpPr>
-            <a:spLocks noGrp="1"/>
-          </p:cNvSpPr>
-          <p:nvPr>
-            <p:ph type="body" idx="1"/>
-          </p:nvPr>
-        </p:nvSpPr>
-        <p:spPr>
-          <a:xfrm>
-            <a:off x="1125860" y="1556792"/>
-            <a:ext cx="10081120" cy="4615407"/>
-          </a:xfrm>
-        </p:spPr>
-        <p:txBody>
-          <a:bodyPr>
-            <a:normAutofit/>
-          </a:bodyPr>
-          <a:lstStyle/>
-          <a:p>
-            <a:r>
-              <a:rPr lang="pt-BR" cap="none" dirty="0">
-                <a:solidFill>
-                  <a:schemeClr val="tx1"/>
-                </a:solidFill>
-              </a:rPr>
-              <a:t>Os testes de </a:t>
-            </a:r>
-            <a:r>
-              <a:rPr lang="pt-BR" cap="none" dirty="0" err="1">
-                <a:solidFill>
-                  <a:schemeClr val="tx1"/>
-                </a:solidFill>
-              </a:rPr>
-              <a:t>PyUnitPerf</a:t>
-            </a:r>
-            <a:r>
-              <a:rPr lang="pt-BR" cap="none" dirty="0">
-                <a:solidFill>
-                  <a:schemeClr val="tx1"/>
-                </a:solidFill>
-              </a:rPr>
-              <a:t> destinam-se a adicionar de forma transparente, capacidades de teste de desempenho a conjuntos de teste de </a:t>
-            </a:r>
-            <a:r>
-              <a:rPr lang="pt-BR" cap="none" dirty="0" err="1">
-                <a:solidFill>
-                  <a:schemeClr val="tx1"/>
-                </a:solidFill>
-              </a:rPr>
-              <a:t>PyUnit</a:t>
-            </a:r>
-            <a:r>
-              <a:rPr lang="pt-BR" cap="none" dirty="0">
-                <a:solidFill>
-                  <a:schemeClr val="tx1"/>
-                </a:solidFill>
-              </a:rPr>
-              <a:t> existentes.</a:t>
-            </a:r>
-            <a:br>
-              <a:rPr lang="pt-BR" cap="none" dirty="0">
-                <a:solidFill>
-                  <a:schemeClr val="tx1"/>
-                </a:solidFill>
-              </a:rPr>
-            </a:br>
-            <a:r>
-              <a:rPr lang="pt-BR" cap="none" dirty="0">
-                <a:solidFill>
-                  <a:schemeClr val="tx1"/>
-                </a:solidFill>
-              </a:rPr>
-              <a:t>O framework </a:t>
-            </a:r>
-            <a:r>
-              <a:rPr lang="pt-BR" cap="none" dirty="0" err="1">
-                <a:solidFill>
-                  <a:schemeClr val="tx1"/>
-                </a:solidFill>
-              </a:rPr>
-              <a:t>PyUnitPerf</a:t>
-            </a:r>
-            <a:r>
-              <a:rPr lang="pt-BR" cap="none" dirty="0">
-                <a:solidFill>
-                  <a:schemeClr val="tx1"/>
-                </a:solidFill>
-              </a:rPr>
-              <a:t> introduz 2 novos tipos de testes: </a:t>
-            </a:r>
-          </a:p>
-          <a:p>
-            <a:endParaRPr lang="pt-BR" cap="none" dirty="0">
-              <a:solidFill>
-                <a:schemeClr val="tx1"/>
-              </a:solidFill>
-            </a:endParaRPr>
-          </a:p>
-          <a:p>
-            <a:r>
-              <a:rPr lang="pt-BR" cap="none" dirty="0" err="1">
-                <a:solidFill>
-                  <a:schemeClr val="tx1"/>
-                </a:solidFill>
-              </a:rPr>
-              <a:t>Timedtest</a:t>
-            </a:r>
-            <a:r>
-              <a:rPr lang="pt-BR" cap="none" dirty="0">
-                <a:solidFill>
-                  <a:schemeClr val="tx1"/>
-                </a:solidFill>
-              </a:rPr>
-              <a:t>: executa um caso de teste </a:t>
-            </a:r>
-            <a:r>
-              <a:rPr lang="pt-BR" cap="none" dirty="0" err="1">
-                <a:solidFill>
-                  <a:schemeClr val="tx1"/>
-                </a:solidFill>
-              </a:rPr>
-              <a:t>PyUnit</a:t>
-            </a:r>
-            <a:r>
-              <a:rPr lang="pt-BR" cap="none" dirty="0">
-                <a:solidFill>
-                  <a:schemeClr val="tx1"/>
-                </a:solidFill>
-              </a:rPr>
-              <a:t> existente impondo um limite ao tempo que leva para executar o teste.</a:t>
-            </a:r>
-          </a:p>
-          <a:p>
-            <a:r>
-              <a:rPr lang="pt-BR" cap="none" dirty="0" err="1">
-                <a:solidFill>
-                  <a:schemeClr val="tx1"/>
-                </a:solidFill>
-              </a:rPr>
-              <a:t>Loadtest</a:t>
-            </a:r>
-            <a:r>
-              <a:rPr lang="pt-BR" cap="none" dirty="0">
-                <a:solidFill>
-                  <a:schemeClr val="tx1"/>
-                </a:solidFill>
-              </a:rPr>
-              <a:t>: executa um caso de teste </a:t>
-            </a:r>
-            <a:r>
-              <a:rPr lang="pt-BR" cap="none" dirty="0" err="1">
-                <a:solidFill>
-                  <a:schemeClr val="tx1"/>
-                </a:solidFill>
-              </a:rPr>
-              <a:t>PyUnit</a:t>
-            </a:r>
-            <a:r>
-              <a:rPr lang="pt-BR" cap="none" dirty="0">
-                <a:solidFill>
-                  <a:schemeClr val="tx1"/>
-                </a:solidFill>
-              </a:rPr>
-              <a:t> existente, simulando usuários simultâneos e iterações.</a:t>
-            </a:r>
-          </a:p>
-        </p:txBody>
-      </p:sp>
-    </p:spTree>
-    <p:extLst>
-      <p:ext uri="{BB962C8B-B14F-4D97-AF65-F5344CB8AC3E}">
-        <p14:creationId xmlns:p14="http://schemas.microsoft.com/office/powerpoint/2010/main" val="1795879431"/>
-      </p:ext>
-    </p:extLst>
-  </p:cSld>
-  <p:clrMapOvr>
-    <a:masterClrMapping/>
-  </p:clrMapOvr>
-  <mc:AlternateContent xmlns:mc="http://schemas.openxmlformats.org/markup-compatibility/2006" xmlns:p14="http://schemas.microsoft.com/office/powerpoint/2010/main">
-    <mc:Choice Requires="p14">
-      <p:transition spd="med" p14:dur="700">
-        <p:fade/>
-      </p:transition>
-    </mc:Choice>
-    <mc:Fallback xmlns="">
-      <p:transition spd="med">
-        <p:fade/>
-      </p:transition>
-    </mc:Fallback>
-  </mc:AlternateContent>
-</p:sld>
-</file>
-
-<file path=ppt/slides/slide17.xml><?xml version="1.0" encoding="utf-8"?>
-<p:sld xmlns:a="http://schemas.openxmlformats.org/drawingml/2006/main" xmlns:r="http://schemas.openxmlformats.org/officeDocument/2006/relationships" xmlns:p="http://schemas.openxmlformats.org/presentationml/2006/main">
-  <p:cSld>
-    <p:spTree>
-      <p:nvGrpSpPr>
-        <p:cNvPr id="1" name=""/>
-        <p:cNvGrpSpPr/>
-        <p:nvPr/>
-      </p:nvGrpSpPr>
-      <p:grpSpPr>
-        <a:xfrm>
-          <a:off x="0" y="0"/>
-          <a:ext cx="0" cy="0"/>
-          <a:chOff x="0" y="0"/>
-          <a:chExt cx="0" cy="0"/>
-        </a:xfrm>
-      </p:grpSpPr>
-      <p:sp>
-        <p:nvSpPr>
-          <p:cNvPr id="6" name="Título 5"/>
-          <p:cNvSpPr>
-            <a:spLocks noGrp="1"/>
-          </p:cNvSpPr>
-          <p:nvPr>
-            <p:ph type="title"/>
-          </p:nvPr>
-        </p:nvSpPr>
-        <p:spPr>
-          <a:xfrm>
-            <a:off x="880571" y="4014873"/>
-            <a:ext cx="11233247" cy="2808312"/>
-          </a:xfrm>
-        </p:spPr>
-        <p:txBody>
-          <a:bodyPr>
-            <a:noAutofit/>
-          </a:bodyPr>
-          <a:lstStyle/>
-          <a:p>
-            <a:r>
-              <a:rPr lang="pt-BR" sz="2400" b="1" dirty="0"/>
-              <a:t>Classe </a:t>
-            </a:r>
-            <a:r>
-              <a:rPr lang="pt-BR" sz="2400" b="1" dirty="0" err="1"/>
-              <a:t>TestSuite</a:t>
-            </a:r>
-            <a:r>
-              <a:rPr lang="pt-BR" sz="2400" dirty="0"/>
-              <a:t>: Atende como um recipiente de coleção e pode possuir vários objetos </a:t>
-            </a:r>
-            <a:r>
-              <a:rPr lang="pt-BR" sz="2400" dirty="0" err="1"/>
-              <a:t>testcase</a:t>
-            </a:r>
-            <a:r>
-              <a:rPr lang="pt-BR" sz="2400" dirty="0"/>
-              <a:t> e vários objetos </a:t>
-            </a:r>
-            <a:r>
-              <a:rPr lang="pt-BR" sz="2400" dirty="0" err="1"/>
-              <a:t>testsuites</a:t>
-            </a:r>
-            <a:br>
-              <a:rPr lang="pt-BR" sz="2400" dirty="0"/>
-            </a:br>
-            <a:r>
-              <a:rPr lang="pt-BR" sz="2400" b="1" dirty="0"/>
-              <a:t>Classe </a:t>
-            </a:r>
-            <a:r>
-              <a:rPr lang="pt-BR" sz="2400" b="1" dirty="0" err="1"/>
-              <a:t>TestLoader</a:t>
-            </a:r>
-            <a:r>
-              <a:rPr lang="pt-BR" sz="2400" dirty="0"/>
-              <a:t>: Esta classe carrega casos de teste e </a:t>
-            </a:r>
-            <a:r>
-              <a:rPr lang="pt-BR" sz="2400" dirty="0" err="1"/>
-              <a:t>suites</a:t>
-            </a:r>
-            <a:r>
-              <a:rPr lang="pt-BR" sz="2400" dirty="0"/>
-              <a:t> </a:t>
-            </a:r>
-            <a:r>
-              <a:rPr lang="pt-BR" sz="2400" b="1" dirty="0"/>
-              <a:t>definidos localmente</a:t>
-            </a:r>
-            <a:r>
-              <a:rPr lang="pt-BR" sz="2400" dirty="0"/>
-              <a:t> ou a partir de um arquivo externo. Ele emite um </a:t>
-            </a:r>
-            <a:r>
-              <a:rPr lang="pt-BR" sz="2400" dirty="0" err="1"/>
-              <a:t>objects</a:t>
-            </a:r>
-            <a:r>
-              <a:rPr lang="pt-BR" sz="2400" dirty="0"/>
-              <a:t> de teste que possui essas suítes e casos</a:t>
-            </a:r>
-            <a:br>
-              <a:rPr lang="pt-BR" sz="2400" dirty="0"/>
-            </a:br>
-            <a:r>
-              <a:rPr lang="pt-BR" sz="2400" b="1" dirty="0" err="1"/>
-              <a:t>TextTestRunner</a:t>
-            </a:r>
-            <a:r>
-              <a:rPr lang="pt-BR" sz="2400" b="1" dirty="0"/>
-              <a:t> classe</a:t>
-            </a:r>
-            <a:r>
-              <a:rPr lang="pt-BR" sz="2400" dirty="0"/>
-              <a:t>: Para executar os testes que atende a uma </a:t>
-            </a:r>
-            <a:r>
-              <a:rPr lang="pt-BR" sz="2400" b="1" dirty="0"/>
-              <a:t>plataforma</a:t>
-            </a:r>
-            <a:r>
-              <a:rPr lang="pt-BR" sz="2400" dirty="0"/>
-              <a:t> padrão para executar os testes</a:t>
-            </a:r>
-            <a:br>
-              <a:rPr lang="pt-BR" sz="2400" dirty="0"/>
-            </a:br>
-            <a:r>
-              <a:rPr lang="pt-BR" sz="2400" b="1" dirty="0"/>
-              <a:t>A classe </a:t>
-            </a:r>
-            <a:r>
-              <a:rPr lang="pt-BR" sz="2400" b="1" dirty="0" err="1"/>
-              <a:t>TestResults</a:t>
-            </a:r>
-            <a:r>
-              <a:rPr lang="pt-BR" sz="2400" dirty="0"/>
-              <a:t>: Oferece um contêiner padrão para os resultados do teste</a:t>
-            </a:r>
-            <a:br>
-              <a:rPr lang="pt-BR" sz="2400" dirty="0"/>
-            </a:br>
-            <a:endParaRPr lang="pt-BR" sz="2400" dirty="0"/>
-          </a:p>
-        </p:txBody>
-      </p:sp>
-      <p:pic>
-        <p:nvPicPr>
-          <p:cNvPr id="5" name="Imagem 4"/>
-          <p:cNvPicPr>
-            <a:picLocks noChangeAspect="1"/>
-          </p:cNvPicPr>
-          <p:nvPr/>
-        </p:nvPicPr>
-        <p:blipFill>
-          <a:blip r:embed="rId2">
-            <a:extLst>
-              <a:ext uri="{28A0092B-C50C-407E-A947-70E740481C1C}">
-                <a14:useLocalDpi xmlns:a14="http://schemas.microsoft.com/office/drawing/2010/main" val="0"/>
-              </a:ext>
-            </a:extLst>
-          </a:blip>
-          <a:stretch>
-            <a:fillRect/>
-          </a:stretch>
-        </p:blipFill>
-        <p:spPr>
-          <a:xfrm>
-            <a:off x="4870275" y="116632"/>
-            <a:ext cx="7313691" cy="3600400"/>
-          </a:xfrm>
-          <a:prstGeom prst="rect">
-            <a:avLst/>
-          </a:prstGeom>
-        </p:spPr>
-      </p:pic>
-      <p:sp>
-        <p:nvSpPr>
-          <p:cNvPr id="7" name="CaixaDeTexto 6"/>
-          <p:cNvSpPr txBox="1"/>
-          <p:nvPr/>
-        </p:nvSpPr>
-        <p:spPr>
-          <a:xfrm>
-            <a:off x="1053852" y="116632"/>
-            <a:ext cx="3600400" cy="3108543"/>
-          </a:xfrm>
-          <a:prstGeom prst="rect">
-            <a:avLst/>
-          </a:prstGeom>
-          <a:noFill/>
-        </p:spPr>
-        <p:txBody>
-          <a:bodyPr wrap="square" rtlCol="0">
-            <a:spAutoFit/>
-          </a:bodyPr>
-          <a:lstStyle/>
-          <a:p>
-            <a:r>
-              <a:rPr lang="pt-BR" sz="2800" b="1" dirty="0"/>
-              <a:t>Classe </a:t>
-            </a:r>
-            <a:r>
-              <a:rPr lang="pt-BR" sz="2800" b="1" dirty="0" err="1"/>
-              <a:t>TestCase</a:t>
-            </a:r>
-            <a:r>
-              <a:rPr lang="pt-BR" sz="2800" dirty="0"/>
-              <a:t>:</a:t>
-            </a:r>
-            <a:br>
-              <a:rPr lang="pt-BR" sz="2800" dirty="0"/>
-            </a:br>
-            <a:r>
-              <a:rPr lang="pt-BR" sz="2800" dirty="0"/>
-              <a:t>A classe </a:t>
-            </a:r>
-            <a:r>
-              <a:rPr lang="pt-BR" sz="2800" dirty="0" err="1"/>
-              <a:t>TestCase</a:t>
-            </a:r>
-            <a:r>
-              <a:rPr lang="pt-BR" sz="2800" dirty="0"/>
-              <a:t> carrega as rotinas de teste e fornece ganchos para fazer cada rotina e limpar depois</a:t>
-            </a:r>
-          </a:p>
-        </p:txBody>
-      </p:sp>
-    </p:spTree>
-    <p:extLst>
-      <p:ext uri="{BB962C8B-B14F-4D97-AF65-F5344CB8AC3E}">
-        <p14:creationId xmlns:p14="http://schemas.microsoft.com/office/powerpoint/2010/main" val="1815437796"/>
-      </p:ext>
-    </p:extLst>
-  </p:cSld>
-  <p:clrMapOvr>
-    <a:masterClrMapping/>
-  </p:clrMapOvr>
-  <mc:AlternateContent xmlns:mc="http://schemas.openxmlformats.org/markup-compatibility/2006" xmlns:p14="http://schemas.microsoft.com/office/powerpoint/2010/main">
-    <mc:Choice Requires="p14">
-      <p:transition spd="med" p14:dur="700">
-        <p:fade/>
-      </p:transition>
-    </mc:Choice>
-    <mc:Fallback xmlns="">
-      <p:transition spd="med">
-        <p:fade/>
-      </p:transition>
-    </mc:Fallback>
-  </mc:AlternateContent>
-</p:sld>
-</file>
-
-<file path=ppt/slides/slide18.xml><?xml version="1.0" encoding="utf-8"?>
-<p:sld xmlns:a="http://schemas.openxmlformats.org/drawingml/2006/main" xmlns:r="http://schemas.openxmlformats.org/officeDocument/2006/relationships" xmlns:p="http://schemas.openxmlformats.org/presentationml/2006/main">
-  <p:cSld>
-    <p:spTree>
-      <p:nvGrpSpPr>
-        <p:cNvPr id="1" name=""/>
-        <p:cNvGrpSpPr/>
-        <p:nvPr/>
-      </p:nvGrpSpPr>
-      <p:grpSpPr>
-        <a:xfrm>
-          <a:off x="0" y="0"/>
-          <a:ext cx="0" cy="0"/>
-          <a:chOff x="0" y="0"/>
-          <a:chExt cx="0" cy="0"/>
-        </a:xfrm>
-      </p:grpSpPr>
-      <p:sp>
-        <p:nvSpPr>
-          <p:cNvPr id="7" name="Título 1"/>
-          <p:cNvSpPr>
-            <a:spLocks noGrp="1"/>
-          </p:cNvSpPr>
-          <p:nvPr>
-            <p:ph type="ctrTitle"/>
-          </p:nvPr>
-        </p:nvSpPr>
-        <p:spPr>
-          <a:xfrm>
-            <a:off x="1413892" y="476673"/>
-            <a:ext cx="9257706" cy="1368152"/>
-          </a:xfrm>
-        </p:spPr>
-        <p:txBody>
-          <a:bodyPr>
-            <a:normAutofit fontScale="90000"/>
-          </a:bodyPr>
-          <a:lstStyle/>
-          <a:p>
-            <a:pPr algn="ctr"/>
-            <a:r>
-              <a:rPr lang="pt-BR" sz="9600" dirty="0"/>
-              <a:t>Teste de Software</a:t>
-            </a:r>
-          </a:p>
-        </p:txBody>
-      </p:sp>
-      <p:sp>
-        <p:nvSpPr>
-          <p:cNvPr id="2" name="CaixaDeTexto 1"/>
-          <p:cNvSpPr txBox="1"/>
-          <p:nvPr/>
-        </p:nvSpPr>
-        <p:spPr>
-          <a:xfrm>
-            <a:off x="2061964" y="2780928"/>
-            <a:ext cx="8784976" cy="523220"/>
-          </a:xfrm>
-          <a:prstGeom prst="rect">
-            <a:avLst/>
-          </a:prstGeom>
-          <a:noFill/>
-        </p:spPr>
-        <p:txBody>
-          <a:bodyPr wrap="square" rtlCol="0">
-            <a:spAutoFit/>
-          </a:bodyPr>
-          <a:lstStyle/>
-          <a:p>
-            <a:pPr algn="ctr"/>
-            <a:r>
-              <a:rPr lang="pt-BR" sz="2800" dirty="0"/>
-              <a:t>Bruno Félix, </a:t>
-            </a:r>
-            <a:r>
-              <a:rPr lang="pt-BR" sz="2800" dirty="0" err="1"/>
-              <a:t>Jaasiel</a:t>
-            </a:r>
-            <a:r>
-              <a:rPr lang="pt-BR" sz="2800" dirty="0"/>
-              <a:t> Tavares, </a:t>
-            </a:r>
-            <a:r>
-              <a:rPr lang="pt-BR" sz="2800" dirty="0" err="1"/>
-              <a:t>Maikon</a:t>
-            </a:r>
-            <a:r>
-              <a:rPr lang="pt-BR" sz="2800" dirty="0"/>
-              <a:t> Silva, Tiago José</a:t>
-            </a:r>
-          </a:p>
-        </p:txBody>
-      </p:sp>
-    </p:spTree>
-    <p:extLst>
-      <p:ext uri="{BB962C8B-B14F-4D97-AF65-F5344CB8AC3E}">
-        <p14:creationId xmlns:p14="http://schemas.microsoft.com/office/powerpoint/2010/main" val="2190865113"/>
-      </p:ext>
-    </p:extLst>
-  </p:cSld>
-  <p:clrMapOvr>
-    <a:masterClrMapping/>
-  </p:clrMapOvr>
-  <mc:AlternateContent xmlns:mc="http://schemas.openxmlformats.org/markup-compatibility/2006" xmlns:p14="http://schemas.microsoft.com/office/powerpoint/2010/main">
-    <mc:Choice Requires="p14">
-      <p:transition spd="med" p14:dur="700">
-        <p:fade/>
-      </p:transition>
-    </mc:Choice>
-    <mc:Fallback xmlns="">
-      <p:transition spd="med">
-        <p:fade/>
-      </p:transition>
-    </mc:Fallback>
-  </mc:AlternateContent>
-</p:sld>
-</file>
-
-<file path=ppt/slides/slide19.xml><?xml version="1.0" encoding="utf-8"?>
-<p:sld xmlns:a="http://schemas.openxmlformats.org/drawingml/2006/main" xmlns:r="http://schemas.openxmlformats.org/officeDocument/2006/relationships" xmlns:p="http://schemas.openxmlformats.org/presentationml/2006/main">
-  <p:cSld>
-    <p:spTree>
-      <p:nvGrpSpPr>
-        <p:cNvPr id="1" name=""/>
-        <p:cNvGrpSpPr/>
-        <p:nvPr/>
-      </p:nvGrpSpPr>
-      <p:grpSpPr>
-        <a:xfrm>
-          <a:off x="0" y="0"/>
-          <a:ext cx="0" cy="0"/>
-          <a:chOff x="0" y="0"/>
-          <a:chExt cx="0" cy="0"/>
-        </a:xfrm>
-      </p:grpSpPr>
-      <p:sp>
-        <p:nvSpPr>
-          <p:cNvPr id="3" name="Título 2"/>
-          <p:cNvSpPr>
-            <a:spLocks noGrp="1"/>
-          </p:cNvSpPr>
-          <p:nvPr>
-            <p:ph type="ctrTitle"/>
-          </p:nvPr>
-        </p:nvSpPr>
-        <p:spPr/>
-        <p:txBody>
-          <a:bodyPr/>
-          <a:lstStyle/>
-          <a:p>
-            <a:endParaRPr lang="pt-BR"/>
-          </a:p>
-        </p:txBody>
-      </p:sp>
-      <p:sp>
-        <p:nvSpPr>
-          <p:cNvPr id="4" name="Subtítulo 3"/>
-          <p:cNvSpPr>
-            <a:spLocks noGrp="1"/>
-          </p:cNvSpPr>
-          <p:nvPr>
-            <p:ph type="subTitle" idx="1"/>
-          </p:nvPr>
-        </p:nvSpPr>
-        <p:spPr/>
-        <p:txBody>
-          <a:bodyPr/>
-          <a:lstStyle/>
-          <a:p>
-            <a:endParaRPr lang="pt-BR"/>
-          </a:p>
-        </p:txBody>
-      </p:sp>
-    </p:spTree>
-    <p:extLst>
-      <p:ext uri="{BB962C8B-B14F-4D97-AF65-F5344CB8AC3E}">
-        <p14:creationId xmlns:p14="http://schemas.microsoft.com/office/powerpoint/2010/main" val="3462297455"/>
       </p:ext>
     </p:extLst>
   </p:cSld>
@@ -7191,6 +7206,505 @@
 </p:sld>
 </file>
 
+<file path=ppt/slides/slide20.xml><?xml version="1.0" encoding="utf-8"?>
+<p:sld xmlns:a="http://schemas.openxmlformats.org/drawingml/2006/main" xmlns:r="http://schemas.openxmlformats.org/officeDocument/2006/relationships" xmlns:p="http://schemas.openxmlformats.org/presentationml/2006/main">
+  <p:cSld>
+    <p:spTree>
+      <p:nvGrpSpPr>
+        <p:cNvPr id="1" name=""/>
+        <p:cNvGrpSpPr/>
+        <p:nvPr/>
+      </p:nvGrpSpPr>
+      <p:grpSpPr>
+        <a:xfrm>
+          <a:off x="0" y="0"/>
+          <a:ext cx="0" cy="0"/>
+          <a:chOff x="0" y="0"/>
+          <a:chExt cx="0" cy="0"/>
+        </a:xfrm>
+      </p:grpSpPr>
+      <p:sp>
+        <p:nvSpPr>
+          <p:cNvPr id="2" name="Título 1"/>
+          <p:cNvSpPr>
+            <a:spLocks noGrp="1"/>
+          </p:cNvSpPr>
+          <p:nvPr>
+            <p:ph type="title"/>
+          </p:nvPr>
+        </p:nvSpPr>
+        <p:spPr>
+          <a:xfrm>
+            <a:off x="1195118" y="332656"/>
+            <a:ext cx="10360501" cy="877912"/>
+          </a:xfrm>
+        </p:spPr>
+        <p:txBody>
+          <a:bodyPr/>
+          <a:lstStyle/>
+          <a:p>
+            <a:r>
+              <a:rPr lang="pt-BR" dirty="0"/>
+              <a:t>JUnitPerf</a:t>
+            </a:r>
+          </a:p>
+        </p:txBody>
+      </p:sp>
+      <p:sp>
+        <p:nvSpPr>
+          <p:cNvPr id="3" name="Espaço Reservado para Conteúdo 2"/>
+          <p:cNvSpPr>
+            <a:spLocks noGrp="1"/>
+          </p:cNvSpPr>
+          <p:nvPr>
+            <p:ph idx="1"/>
+          </p:nvPr>
+        </p:nvSpPr>
+        <p:spPr/>
+        <p:txBody>
+          <a:bodyPr/>
+          <a:lstStyle/>
+          <a:p>
+            <a:pPr marL="0" indent="0">
+              <a:buNone/>
+            </a:pPr>
+            <a:r>
+              <a:rPr lang="pt-BR" dirty="0"/>
+              <a:t>Coleção de decoradores para medir performance </a:t>
+            </a:r>
+            <a:r>
+              <a:rPr lang="pt-BR" dirty="0" err="1"/>
+              <a:t>eescalabilidade</a:t>
+            </a:r>
+            <a:r>
+              <a:rPr lang="pt-BR" dirty="0"/>
+              <a:t> em testes JUnit existentes</a:t>
+            </a:r>
+          </a:p>
+          <a:p>
+            <a:pPr marL="0" indent="0">
+              <a:buNone/>
+            </a:pPr>
+            <a:r>
+              <a:rPr lang="pt-BR" dirty="0"/>
+              <a:t>Para testes automáticos de performance o JUnitPerf oferece classes que permitem construir objetos que recebem testes existentes do JUnit e acrescentam neles avaliação de performance</a:t>
+            </a:r>
+          </a:p>
+          <a:p>
+            <a:pPr marL="0" indent="0">
+              <a:buNone/>
+            </a:pPr>
+            <a:r>
+              <a:rPr lang="pt-BR" dirty="0"/>
+              <a:t>JUnitPerf não altera testes existentes, podendo rodar os testes sem o JUnitPerf.</a:t>
+            </a:r>
+          </a:p>
+          <a:p>
+            <a:pPr marL="0" indent="0">
+              <a:buNone/>
+            </a:pPr>
+            <a:endParaRPr lang="pt-BR" dirty="0"/>
+          </a:p>
+        </p:txBody>
+      </p:sp>
+    </p:spTree>
+    <p:extLst>
+      <p:ext uri="{BB962C8B-B14F-4D97-AF65-F5344CB8AC3E}">
+        <p14:creationId xmlns:p14="http://schemas.microsoft.com/office/powerpoint/2010/main" val="984624682"/>
+      </p:ext>
+    </p:extLst>
+  </p:cSld>
+  <p:clrMapOvr>
+    <a:masterClrMapping/>
+  </p:clrMapOvr>
+  <mc:AlternateContent xmlns:mc="http://schemas.openxmlformats.org/markup-compatibility/2006" xmlns:p14="http://schemas.microsoft.com/office/powerpoint/2010/main">
+    <mc:Choice Requires="p14">
+      <p:transition spd="med" p14:dur="700">
+        <p:fade/>
+      </p:transition>
+    </mc:Choice>
+    <mc:Fallback xmlns="">
+      <p:transition spd="med">
+        <p:fade/>
+      </p:transition>
+    </mc:Fallback>
+  </mc:AlternateContent>
+</p:sld>
+</file>
+
+<file path=ppt/slides/slide21.xml><?xml version="1.0" encoding="utf-8"?>
+<p:sld xmlns:a="http://schemas.openxmlformats.org/drawingml/2006/main" xmlns:r="http://schemas.openxmlformats.org/officeDocument/2006/relationships" xmlns:p="http://schemas.openxmlformats.org/presentationml/2006/main">
+  <p:cSld>
+    <p:spTree>
+      <p:nvGrpSpPr>
+        <p:cNvPr id="1" name=""/>
+        <p:cNvGrpSpPr/>
+        <p:nvPr/>
+      </p:nvGrpSpPr>
+      <p:grpSpPr>
+        <a:xfrm>
+          <a:off x="0" y="0"/>
+          <a:ext cx="0" cy="0"/>
+          <a:chOff x="0" y="0"/>
+          <a:chExt cx="0" cy="0"/>
+        </a:xfrm>
+      </p:grpSpPr>
+      <p:sp>
+        <p:nvSpPr>
+          <p:cNvPr id="2" name="Título 1"/>
+          <p:cNvSpPr>
+            <a:spLocks noGrp="1"/>
+          </p:cNvSpPr>
+          <p:nvPr>
+            <p:ph type="title"/>
+          </p:nvPr>
+        </p:nvSpPr>
+        <p:spPr/>
+        <p:txBody>
+          <a:bodyPr/>
+          <a:lstStyle/>
+          <a:p>
+            <a:r>
+              <a:rPr lang="pt-BR" dirty="0"/>
+              <a:t>Componentes</a:t>
+            </a:r>
+          </a:p>
+        </p:txBody>
+      </p:sp>
+      <p:sp>
+        <p:nvSpPr>
+          <p:cNvPr id="3" name="Espaço Reservado para Conteúdo 2"/>
+          <p:cNvSpPr>
+            <a:spLocks noGrp="1"/>
+          </p:cNvSpPr>
+          <p:nvPr>
+            <p:ph idx="1"/>
+          </p:nvPr>
+        </p:nvSpPr>
+        <p:spPr>
+          <a:xfrm>
+            <a:off x="981845" y="1498600"/>
+            <a:ext cx="10873208" cy="5026743"/>
+          </a:xfrm>
+        </p:spPr>
+        <p:txBody>
+          <a:bodyPr>
+            <a:normAutofit fontScale="92500" lnSpcReduction="10000"/>
+          </a:bodyPr>
+          <a:lstStyle/>
+          <a:p>
+            <a:r>
+              <a:rPr lang="pt-BR" dirty="0"/>
+              <a:t>Timedtest</a:t>
+            </a:r>
+          </a:p>
+          <a:p>
+            <a:pPr marL="0" indent="0">
+              <a:buNone/>
+            </a:pPr>
+            <a:r>
+              <a:rPr lang="pt-BR" dirty="0"/>
+              <a:t>Executa um teste e mede o tempo transcorrido.</a:t>
+            </a:r>
+          </a:p>
+          <a:p>
+            <a:pPr marL="0" indent="0">
+              <a:buNone/>
+            </a:pPr>
+            <a:r>
+              <a:rPr lang="pt-BR" dirty="0"/>
+              <a:t>Define um tempo máximo para a execução. Teste a falha se a execução durar mais que o tempo estabelecido</a:t>
+            </a:r>
+          </a:p>
+          <a:p>
+            <a:r>
+              <a:rPr lang="pt-BR" dirty="0"/>
+              <a:t>Loadtest</a:t>
+            </a:r>
+          </a:p>
+          <a:p>
+            <a:pPr marL="0" indent="0">
+              <a:buNone/>
+            </a:pPr>
+            <a:r>
+              <a:rPr lang="pt-BR" dirty="0"/>
+              <a:t>Executa um teste com uma carga simulada.</a:t>
+            </a:r>
+          </a:p>
+          <a:p>
+            <a:pPr marL="0" indent="0">
+              <a:buNone/>
+            </a:pPr>
+            <a:r>
+              <a:rPr lang="pt-BR" dirty="0"/>
+              <a:t>Utiliza timers para distribuir as cargas usando distribuições randômicas</a:t>
+            </a:r>
+          </a:p>
+          <a:p>
+            <a:pPr marL="0" indent="0">
+              <a:buNone/>
+            </a:pPr>
+            <a:r>
+              <a:rPr lang="pt-BR" dirty="0"/>
+              <a:t>Combinado com timertest para medir tempo com carga.</a:t>
+            </a:r>
+          </a:p>
+          <a:p>
+            <a:r>
+              <a:rPr lang="pt-BR" dirty="0"/>
+              <a:t>Threadedtest</a:t>
+            </a:r>
+          </a:p>
+          <a:p>
+            <a:pPr marL="0" indent="0">
+              <a:buNone/>
+            </a:pPr>
+            <a:r>
+              <a:rPr lang="pt-BR" dirty="0"/>
+              <a:t> Executa o teste em um thread separado.</a:t>
+            </a:r>
+          </a:p>
+          <a:p>
+            <a:endParaRPr lang="pt-BR" dirty="0"/>
+          </a:p>
+        </p:txBody>
+      </p:sp>
+    </p:spTree>
+    <p:extLst>
+      <p:ext uri="{BB962C8B-B14F-4D97-AF65-F5344CB8AC3E}">
+        <p14:creationId xmlns:p14="http://schemas.microsoft.com/office/powerpoint/2010/main" val="4202224108"/>
+      </p:ext>
+    </p:extLst>
+  </p:cSld>
+  <p:clrMapOvr>
+    <a:masterClrMapping/>
+  </p:clrMapOvr>
+  <mc:AlternateContent xmlns:mc="http://schemas.openxmlformats.org/markup-compatibility/2006" xmlns:p14="http://schemas.microsoft.com/office/powerpoint/2010/main">
+    <mc:Choice Requires="p14">
+      <p:transition spd="med" p14:dur="700">
+        <p:fade/>
+      </p:transition>
+    </mc:Choice>
+    <mc:Fallback xmlns="">
+      <p:transition spd="med">
+        <p:fade/>
+      </p:transition>
+    </mc:Fallback>
+  </mc:AlternateContent>
+</p:sld>
+</file>
+
+<file path=ppt/slides/slide22.xml><?xml version="1.0" encoding="utf-8"?>
+<p:sld xmlns:a="http://schemas.openxmlformats.org/drawingml/2006/main" xmlns:r="http://schemas.openxmlformats.org/officeDocument/2006/relationships" xmlns:p="http://schemas.openxmlformats.org/presentationml/2006/main">
+  <p:cSld>
+    <p:spTree>
+      <p:nvGrpSpPr>
+        <p:cNvPr id="1" name=""/>
+        <p:cNvGrpSpPr/>
+        <p:nvPr/>
+      </p:nvGrpSpPr>
+      <p:grpSpPr>
+        <a:xfrm>
+          <a:off x="0" y="0"/>
+          <a:ext cx="0" cy="0"/>
+          <a:chOff x="0" y="0"/>
+          <a:chExt cx="0" cy="0"/>
+        </a:xfrm>
+      </p:grpSpPr>
+      <p:sp>
+        <p:nvSpPr>
+          <p:cNvPr id="2" name="Título 1"/>
+          <p:cNvSpPr>
+            <a:spLocks noGrp="1"/>
+          </p:cNvSpPr>
+          <p:nvPr>
+            <p:ph type="title"/>
+          </p:nvPr>
+        </p:nvSpPr>
+        <p:spPr/>
+        <p:txBody>
+          <a:bodyPr/>
+          <a:lstStyle/>
+          <a:p>
+            <a:r>
+              <a:rPr lang="pt-BR" dirty="0"/>
+              <a:t>Passos para executar os Testes</a:t>
+            </a:r>
+          </a:p>
+        </p:txBody>
+      </p:sp>
+      <p:sp>
+        <p:nvSpPr>
+          <p:cNvPr id="3" name="Espaço Reservado para Conteúdo 2"/>
+          <p:cNvSpPr>
+            <a:spLocks noGrp="1"/>
+          </p:cNvSpPr>
+          <p:nvPr>
+            <p:ph idx="1"/>
+          </p:nvPr>
+        </p:nvSpPr>
+        <p:spPr>
+          <a:xfrm>
+            <a:off x="1218883" y="1701796"/>
+            <a:ext cx="10204121" cy="4823547"/>
+          </a:xfrm>
+        </p:spPr>
+        <p:txBody>
+          <a:bodyPr>
+            <a:normAutofit lnSpcReduction="10000"/>
+          </a:bodyPr>
+          <a:lstStyle/>
+          <a:p>
+            <a:r>
+              <a:rPr lang="pt-BR" dirty="0"/>
+              <a:t>Primeiro é preciso estimar os valores ideais para execução dos testes.</a:t>
+            </a:r>
+          </a:p>
+          <a:p>
+            <a:r>
+              <a:rPr lang="pt-BR" dirty="0"/>
+              <a:t>1. Escrever testes JUnit para o código.</a:t>
+            </a:r>
+          </a:p>
+          <a:p>
+            <a:r>
+              <a:rPr lang="pt-BR" dirty="0"/>
+              <a:t>2. Executar um profiler para descobrir os </a:t>
+            </a:r>
+            <a:r>
+              <a:rPr lang="pt-BR" dirty="0" err="1"/>
+              <a:t>gargalos.utilizar</a:t>
+            </a:r>
+            <a:r>
+              <a:rPr lang="pt-BR" dirty="0"/>
+              <a:t> os dados obtidos como parâmetros para estabelecer os valores máximos aceitáveis para cada método.</a:t>
+            </a:r>
+          </a:p>
+          <a:p>
+            <a:r>
+              <a:rPr lang="pt-BR" dirty="0"/>
+              <a:t>3. Escrever testes do JUnit (se não existirem) para os trechos críticos quanto à performance.</a:t>
+            </a:r>
+          </a:p>
+          <a:p>
+            <a:r>
+              <a:rPr lang="pt-BR" dirty="0"/>
+              <a:t>4. Escrever um TimedTest do JUnitPerf para cada teste novo e executá-lo. O teste deve falhar. Se passar, não há problema de performance com o Código.</a:t>
+            </a:r>
+          </a:p>
+          <a:p>
+            <a:endParaRPr lang="pt-BR" dirty="0"/>
+          </a:p>
+        </p:txBody>
+      </p:sp>
+    </p:spTree>
+    <p:extLst>
+      <p:ext uri="{BB962C8B-B14F-4D97-AF65-F5344CB8AC3E}">
+        <p14:creationId xmlns:p14="http://schemas.microsoft.com/office/powerpoint/2010/main" val="1595594672"/>
+      </p:ext>
+    </p:extLst>
+  </p:cSld>
+  <p:clrMapOvr>
+    <a:masterClrMapping/>
+  </p:clrMapOvr>
+  <mc:AlternateContent xmlns:mc="http://schemas.openxmlformats.org/markup-compatibility/2006" xmlns:p14="http://schemas.microsoft.com/office/powerpoint/2010/main">
+    <mc:Choice Requires="p14">
+      <p:transition spd="med" p14:dur="700">
+        <p:fade/>
+      </p:transition>
+    </mc:Choice>
+    <mc:Fallback xmlns="">
+      <p:transition spd="med">
+        <p:fade/>
+      </p:transition>
+    </mc:Fallback>
+  </mc:AlternateContent>
+</p:sld>
+</file>
+
+<file path=ppt/slides/slide23.xml><?xml version="1.0" encoding="utf-8"?>
+<p:sld xmlns:a="http://schemas.openxmlformats.org/drawingml/2006/main" xmlns:r="http://schemas.openxmlformats.org/officeDocument/2006/relationships" xmlns:p="http://schemas.openxmlformats.org/presentationml/2006/main">
+  <p:cSld>
+    <p:spTree>
+      <p:nvGrpSpPr>
+        <p:cNvPr id="1" name=""/>
+        <p:cNvGrpSpPr/>
+        <p:nvPr/>
+      </p:nvGrpSpPr>
+      <p:grpSpPr>
+        <a:xfrm>
+          <a:off x="0" y="0"/>
+          <a:ext cx="0" cy="0"/>
+          <a:chOff x="0" y="0"/>
+          <a:chExt cx="0" cy="0"/>
+        </a:xfrm>
+      </p:grpSpPr>
+      <p:sp>
+        <p:nvSpPr>
+          <p:cNvPr id="2" name="Título 1"/>
+          <p:cNvSpPr>
+            <a:spLocks noGrp="1"/>
+          </p:cNvSpPr>
+          <p:nvPr>
+            <p:ph type="title"/>
+          </p:nvPr>
+        </p:nvSpPr>
+        <p:spPr/>
+        <p:txBody>
+          <a:bodyPr/>
+          <a:lstStyle/>
+          <a:p>
+            <a:r>
+              <a:rPr lang="pt-BR" dirty="0"/>
+              <a:t>PyUnitPerf</a:t>
+            </a:r>
+          </a:p>
+        </p:txBody>
+      </p:sp>
+      <p:sp>
+        <p:nvSpPr>
+          <p:cNvPr id="3" name="Espaço Reservado para Conteúdo 2"/>
+          <p:cNvSpPr>
+            <a:spLocks noGrp="1"/>
+          </p:cNvSpPr>
+          <p:nvPr>
+            <p:ph idx="1"/>
+          </p:nvPr>
+        </p:nvSpPr>
+        <p:spPr/>
+        <p:txBody>
+          <a:bodyPr/>
+          <a:lstStyle/>
+          <a:p>
+            <a:endParaRPr lang="pt-BR" dirty="0"/>
+          </a:p>
+        </p:txBody>
+      </p:sp>
+    </p:spTree>
+    <p:extLst>
+      <p:ext uri="{BB962C8B-B14F-4D97-AF65-F5344CB8AC3E}">
+        <p14:creationId xmlns:p14="http://schemas.microsoft.com/office/powerpoint/2010/main" val="1795879431"/>
+      </p:ext>
+    </p:extLst>
+  </p:cSld>
+  <p:clrMapOvr>
+    <a:masterClrMapping/>
+  </p:clrMapOvr>
+  <mc:AlternateContent xmlns:mc="http://schemas.openxmlformats.org/markup-compatibility/2006" xmlns:p14="http://schemas.microsoft.com/office/powerpoint/2010/main">
+    <mc:Choice Requires="p14">
+      <p:transition spd="med" p14:dur="700">
+        <p:fade/>
+      </p:transition>
+    </mc:Choice>
+    <mc:Fallback xmlns="">
+      <p:transition spd="med">
+        <p:fade/>
+      </p:transition>
+    </mc:Fallback>
+  </mc:AlternateContent>
+</p:sld>
+</file>
+
 <file path=ppt/slides/slide3.xml><?xml version="1.0" encoding="utf-8"?>
 <p:sld xmlns:a="http://schemas.openxmlformats.org/drawingml/2006/main" xmlns:r="http://schemas.openxmlformats.org/officeDocument/2006/relationships" xmlns:p="http://schemas.openxmlformats.org/presentationml/2006/main">
   <p:cSld>
@@ -7220,8 +7734,8 @@
         </p:nvSpPr>
         <p:spPr>
           <a:xfrm>
-            <a:off x="1413892" y="332656"/>
-            <a:ext cx="8938472" cy="931167"/>
+            <a:off x="1053852" y="116632"/>
+            <a:ext cx="9404723" cy="1400530"/>
           </a:xfrm>
         </p:spPr>
         <p:txBody>
@@ -7229,9 +7743,7 @@
           <a:lstStyle/>
           <a:p>
             <a:r>
-              <a:rPr lang="pt-BR" b="1" dirty="0">
-                <a:latin typeface="Arial Rounded MT Bold" panose="020F0704030504030204" pitchFamily="34" charset="0"/>
-              </a:rPr>
+              <a:rPr lang="pt-BR" dirty="0"/>
               <a:t>Sumário</a:t>
             </a:r>
           </a:p>
@@ -7244,13 +7756,13 @@
             <a:spLocks noGrp="1"/>
           </p:cNvSpPr>
           <p:nvPr>
-            <p:ph type="body" idx="1"/>
+            <p:ph idx="1"/>
           </p:nvPr>
         </p:nvSpPr>
         <p:spPr>
           <a:xfrm>
-            <a:off x="1625176" y="1412776"/>
-            <a:ext cx="7069519" cy="4759423"/>
+            <a:off x="1103312" y="1537252"/>
+            <a:ext cx="9670705" cy="4711147"/>
           </a:xfrm>
         </p:spPr>
         <p:txBody>
@@ -7259,112 +7771,40 @@
           </a:bodyPr>
           <a:lstStyle/>
           <a:p>
-            <a:pPr marL="457200" indent="-457200">
-              <a:buFont typeface="Arial" panose="020B0604020202020204" pitchFamily="34" charset="0"/>
-              <a:buChar char="•"/>
-            </a:pPr>
-            <a:r>
-              <a:rPr lang="pt-BR" sz="3200" cap="none" dirty="0" err="1">
-                <a:solidFill>
-                  <a:schemeClr val="tx1"/>
-                </a:solidFill>
-              </a:rPr>
+            <a:r>
+              <a:rPr lang="pt-BR" sz="3200" dirty="0"/>
               <a:t>Jmeter</a:t>
             </a:r>
-            <a:endParaRPr lang="pt-BR" sz="3200" cap="none" dirty="0">
-              <a:solidFill>
-                <a:schemeClr val="tx1"/>
-              </a:solidFill>
-            </a:endParaRPr>
-          </a:p>
-          <a:p>
-            <a:pPr marL="457200" indent="-457200">
-              <a:buFont typeface="Arial" panose="020B0604020202020204" pitchFamily="34" charset="0"/>
-              <a:buChar char="•"/>
-            </a:pPr>
-            <a:r>
-              <a:rPr lang="pt-BR" sz="3200" cap="none" dirty="0">
-                <a:solidFill>
-                  <a:schemeClr val="tx1"/>
-                </a:solidFill>
-              </a:rPr>
+          </a:p>
+          <a:p>
+            <a:r>
+              <a:rPr lang="pt-BR" sz="3200" dirty="0"/>
               <a:t>Open STA</a:t>
             </a:r>
           </a:p>
           <a:p>
-            <a:pPr marL="457200" indent="-457200">
-              <a:buFont typeface="Arial" panose="020B0604020202020204" pitchFamily="34" charset="0"/>
-              <a:buChar char="•"/>
-            </a:pPr>
-            <a:r>
-              <a:rPr lang="pt-BR" sz="3200" cap="none" dirty="0">
-                <a:solidFill>
-                  <a:schemeClr val="tx1"/>
-                </a:solidFill>
-              </a:rPr>
-              <a:t>The </a:t>
-            </a:r>
-            <a:r>
-              <a:rPr lang="pt-BR" sz="3200" cap="none" dirty="0" err="1">
-                <a:solidFill>
-                  <a:schemeClr val="tx1"/>
-                </a:solidFill>
-              </a:rPr>
-              <a:t>grinder</a:t>
-            </a:r>
-            <a:endParaRPr lang="pt-BR" sz="3200" cap="none" dirty="0">
-              <a:solidFill>
-                <a:schemeClr val="tx1"/>
-              </a:solidFill>
-            </a:endParaRPr>
-          </a:p>
-          <a:p>
-            <a:pPr marL="457200" indent="-457200">
-              <a:buFont typeface="Arial" panose="020B0604020202020204" pitchFamily="34" charset="0"/>
-              <a:buChar char="•"/>
-            </a:pPr>
-            <a:r>
-              <a:rPr lang="pt-BR" sz="3200" cap="none" dirty="0" err="1">
-                <a:solidFill>
-                  <a:schemeClr val="tx1"/>
-                </a:solidFill>
-              </a:rPr>
-              <a:t>Junitperf</a:t>
-            </a:r>
-            <a:endParaRPr lang="pt-BR" sz="3200" cap="none" dirty="0">
-              <a:solidFill>
-                <a:schemeClr val="tx1"/>
-              </a:solidFill>
-            </a:endParaRPr>
-          </a:p>
-          <a:p>
-            <a:pPr marL="457200" indent="-457200">
-              <a:buFont typeface="Arial" panose="020B0604020202020204" pitchFamily="34" charset="0"/>
-              <a:buChar char="•"/>
-            </a:pPr>
-            <a:r>
-              <a:rPr lang="pt-BR" sz="3200" cap="none" dirty="0" err="1">
-                <a:solidFill>
-                  <a:schemeClr val="tx1"/>
-                </a:solidFill>
-              </a:rPr>
-              <a:t>Pyunitperf</a:t>
-            </a:r>
-            <a:endParaRPr lang="pt-BR" sz="3200" cap="none" dirty="0">
-              <a:solidFill>
-                <a:schemeClr val="tx1"/>
-              </a:solidFill>
-            </a:endParaRPr>
+            <a:r>
+              <a:rPr lang="pt-BR" sz="3200" dirty="0"/>
+              <a:t>The Grinder</a:t>
+            </a:r>
+          </a:p>
+          <a:p>
+            <a:r>
+              <a:rPr lang="pt-BR" sz="3200" dirty="0"/>
+              <a:t>JUnitPerf</a:t>
+            </a:r>
+          </a:p>
+          <a:p>
+            <a:r>
+              <a:rPr lang="pt-BR" sz="3200" dirty="0"/>
+              <a:t>PyUnitPerf</a:t>
+            </a:r>
           </a:p>
           <a:p>
             <a:pPr marL="0" indent="0">
               <a:buNone/>
             </a:pPr>
-            <a:endParaRPr lang="pt-BR" cap="none" dirty="0">
-              <a:solidFill>
-                <a:schemeClr val="tx1"/>
-              </a:solidFill>
-            </a:endParaRPr>
+            <a:endParaRPr lang="pt-BR" dirty="0"/>
           </a:p>
         </p:txBody>
       </p:sp>
@@ -7430,7 +7870,6 @@
               <a:rPr lang="pt-BR" dirty="0"/>
               <a:t>O que é Jmeter ?</a:t>
             </a:r>
-            <a:endParaRPr lang="pt-br" dirty="0"/>
           </a:p>
         </p:txBody>
       </p:sp>
@@ -7526,7 +7965,6 @@
               <a:rPr lang="pt-BR" dirty="0"/>
               <a:t>Componentes </a:t>
             </a:r>
-            <a:endParaRPr lang="pt-br" dirty="0"/>
           </a:p>
         </p:txBody>
       </p:sp>
@@ -7559,7 +7997,7 @@
           </a:p>
           <a:p>
             <a:pPr rtl="0"/>
-            <a:endParaRPr lang="pt-br" dirty="0"/>
+            <a:endParaRPr lang="pt-BR" dirty="0"/>
           </a:p>
         </p:txBody>
       </p:sp>
@@ -7659,7 +8097,6 @@
               <a:rPr lang="pt-BR" dirty="0"/>
               <a:t>Componentes</a:t>
             </a:r>
-            <a:endParaRPr lang="pt-br" dirty="0"/>
           </a:p>
         </p:txBody>
       </p:sp>
@@ -7883,8 +8320,8 @@
         </p:nvSpPr>
         <p:spPr>
           <a:xfrm>
-            <a:off x="1625176" y="332656"/>
-            <a:ext cx="8938472" cy="931167"/>
+            <a:off x="1125860" y="2780928"/>
+            <a:ext cx="10360501" cy="1223963"/>
           </a:xfrm>
         </p:spPr>
         <p:txBody>
@@ -7892,201 +8329,8 @@
           <a:lstStyle/>
           <a:p>
             <a:r>
-              <a:rPr lang="pt-BR" b="1" dirty="0"/>
+              <a:rPr lang="pt-BR" dirty="0"/>
               <a:t>OpenSTA</a:t>
-            </a:r>
-          </a:p>
-        </p:txBody>
-      </p:sp>
-      <p:sp>
-        <p:nvSpPr>
-          <p:cNvPr id="3" name="Espaço Reservado para Conteúdo 2"/>
-          <p:cNvSpPr>
-            <a:spLocks noGrp="1"/>
-          </p:cNvSpPr>
-          <p:nvPr>
-            <p:ph type="body" idx="1"/>
-          </p:nvPr>
-        </p:nvSpPr>
-        <p:spPr>
-          <a:xfrm>
-            <a:off x="1125860" y="1340768"/>
-            <a:ext cx="9937104" cy="5040560"/>
-          </a:xfrm>
-        </p:spPr>
-        <p:txBody>
-          <a:bodyPr>
-            <a:normAutofit fontScale="92500" lnSpcReduction="10000"/>
-          </a:bodyPr>
-          <a:lstStyle/>
-          <a:p>
-            <a:r>
-              <a:rPr lang="pt-BR" cap="none" dirty="0">
-                <a:solidFill>
-                  <a:schemeClr val="tx1"/>
-                </a:solidFill>
-              </a:rPr>
-              <a:t>O </a:t>
-            </a:r>
-            <a:r>
-              <a:rPr lang="pt-BR" cap="none" dirty="0" err="1">
-                <a:solidFill>
-                  <a:schemeClr val="tx1"/>
-                </a:solidFill>
-              </a:rPr>
-              <a:t>opensta</a:t>
-            </a:r>
-            <a:r>
-              <a:rPr lang="pt-BR" cap="none" dirty="0">
-                <a:solidFill>
-                  <a:schemeClr val="tx1"/>
-                </a:solidFill>
-              </a:rPr>
-              <a:t> é um utilitário de benchmarking de servidores web baseado em GUI, rico em recursos, capaz de executar testes de carga pesada HTTP e HTTPS com medições de desempenho. Está livremente disponível e distribuível sob a GNU general </a:t>
-            </a:r>
-            <a:r>
-              <a:rPr lang="pt-BR" cap="none" dirty="0" err="1">
-                <a:solidFill>
-                  <a:schemeClr val="tx1"/>
-                </a:solidFill>
-              </a:rPr>
-              <a:t>public</a:t>
-            </a:r>
-            <a:r>
-              <a:rPr lang="pt-BR" cap="none" dirty="0">
-                <a:solidFill>
-                  <a:schemeClr val="tx1"/>
-                </a:solidFill>
-              </a:rPr>
-              <a:t> </a:t>
-            </a:r>
-            <a:r>
-              <a:rPr lang="pt-BR" cap="none" dirty="0" err="1">
-                <a:solidFill>
-                  <a:schemeClr val="tx1"/>
-                </a:solidFill>
-              </a:rPr>
-              <a:t>license</a:t>
-            </a:r>
-            <a:r>
-              <a:rPr lang="pt-BR" cap="none" dirty="0">
-                <a:solidFill>
-                  <a:schemeClr val="tx1"/>
-                </a:solidFill>
-              </a:rPr>
-              <a:t> de código aberto . atualmente, o </a:t>
-            </a:r>
-            <a:r>
-              <a:rPr lang="pt-BR" cap="none" dirty="0" err="1">
-                <a:solidFill>
-                  <a:schemeClr val="tx1"/>
-                </a:solidFill>
-              </a:rPr>
-              <a:t>opensta</a:t>
-            </a:r>
-            <a:r>
-              <a:rPr lang="pt-BR" cap="none" dirty="0">
-                <a:solidFill>
-                  <a:schemeClr val="tx1"/>
-                </a:solidFill>
-              </a:rPr>
-              <a:t> só é executado em sistemas operacionais baseados no </a:t>
-            </a:r>
-            <a:r>
-              <a:rPr lang="pt-BR" cap="none" dirty="0" err="1">
-                <a:solidFill>
-                  <a:schemeClr val="tx1"/>
-                </a:solidFill>
-              </a:rPr>
-              <a:t>microsoft</a:t>
-            </a:r>
-            <a:r>
-              <a:rPr lang="pt-BR" cap="none" dirty="0">
-                <a:solidFill>
-                  <a:schemeClr val="tx1"/>
-                </a:solidFill>
-              </a:rPr>
-              <a:t> </a:t>
-            </a:r>
-            <a:r>
-              <a:rPr lang="pt-BR" cap="none" dirty="0" err="1">
-                <a:solidFill>
-                  <a:schemeClr val="tx1"/>
-                </a:solidFill>
-              </a:rPr>
-              <a:t>windows</a:t>
-            </a:r>
-            <a:r>
-              <a:rPr lang="pt-BR" cap="none" dirty="0">
-                <a:solidFill>
-                  <a:schemeClr val="tx1"/>
-                </a:solidFill>
-              </a:rPr>
-              <a:t> .Os scripts são gravados em uma linguagem proprietária chamada "SCL". É uma linguagem de codificação bastante simples que fornece suporte para funções personalizadas, escopos variáveis ​​e listas aleatórias ou </a:t>
-            </a:r>
-            <a:r>
-              <a:rPr lang="pt-BR" cap="none" dirty="0" err="1">
-                <a:solidFill>
-                  <a:schemeClr val="tx1"/>
-                </a:solidFill>
-              </a:rPr>
-              <a:t>sequenciais.Opensta</a:t>
-            </a:r>
-            <a:r>
-              <a:rPr lang="pt-BR" cap="none" dirty="0">
-                <a:solidFill>
-                  <a:schemeClr val="tx1"/>
-                </a:solidFill>
-              </a:rPr>
-              <a:t> foi originalmente escrito por </a:t>
-            </a:r>
-            <a:r>
-              <a:rPr lang="pt-BR" cap="none" dirty="0" err="1">
-                <a:solidFill>
-                  <a:schemeClr val="tx1"/>
-                </a:solidFill>
-              </a:rPr>
-              <a:t>cyrano</a:t>
-            </a:r>
-            <a:r>
-              <a:rPr lang="pt-BR" cap="none" dirty="0">
-                <a:solidFill>
-                  <a:schemeClr val="tx1"/>
-                </a:solidFill>
-              </a:rPr>
-              <a:t>. As intenções de </a:t>
-            </a:r>
-            <a:r>
-              <a:rPr lang="pt-BR" cap="none" dirty="0" err="1">
-                <a:solidFill>
-                  <a:schemeClr val="tx1"/>
-                </a:solidFill>
-              </a:rPr>
-              <a:t>cyrano</a:t>
-            </a:r>
-            <a:r>
-              <a:rPr lang="pt-BR" cap="none" dirty="0">
-                <a:solidFill>
-                  <a:schemeClr val="tx1"/>
-                </a:solidFill>
-              </a:rPr>
-              <a:t> eram escrever plug-ins comerciais em módulos e suporte para </a:t>
-            </a:r>
-            <a:r>
-              <a:rPr lang="pt-BR" cap="none" dirty="0" err="1">
-                <a:solidFill>
-                  <a:schemeClr val="tx1"/>
-                </a:solidFill>
-              </a:rPr>
-              <a:t>opensta</a:t>
-            </a:r>
-            <a:r>
-              <a:rPr lang="pt-BR" cap="none" dirty="0">
-                <a:solidFill>
-                  <a:schemeClr val="tx1"/>
-                </a:solidFill>
-              </a:rPr>
-              <a:t> para testes de desempenho de aplicações não-web.</a:t>
             </a:r>
           </a:p>
         </p:txBody>
@@ -8094,7 +8338,7 @@
     </p:spTree>
     <p:extLst>
       <p:ext uri="{BB962C8B-B14F-4D97-AF65-F5344CB8AC3E}">
-        <p14:creationId xmlns:p14="http://schemas.microsoft.com/office/powerpoint/2010/main" val="2244367574"/>
+        <p14:creationId xmlns:p14="http://schemas.microsoft.com/office/powerpoint/2010/main" val="850629597"/>
       </p:ext>
     </p:extLst>
   </p:cSld>
@@ -8135,172 +8379,118 @@
       </p:grpSpPr>
       <p:sp>
         <p:nvSpPr>
-          <p:cNvPr id="3" name="Título 2"/>
+          <p:cNvPr id="2" name="Título 1"/>
           <p:cNvSpPr>
             <a:spLocks noGrp="1"/>
           </p:cNvSpPr>
           <p:nvPr>
             <p:ph type="title"/>
+          </p:nvPr>
+        </p:nvSpPr>
+        <p:spPr/>
+        <p:txBody>
+          <a:bodyPr/>
+          <a:lstStyle/>
+          <a:p>
+            <a:r>
+              <a:rPr lang="pt-BR" dirty="0" smtClean="0"/>
+              <a:t>Introdução - OpenSTA</a:t>
+            </a:r>
+            <a:endParaRPr lang="pt-BR" dirty="0"/>
+          </a:p>
+        </p:txBody>
+      </p:sp>
+      <p:sp>
+        <p:nvSpPr>
+          <p:cNvPr id="3" name="Espaço Reservado para Conteúdo 2"/>
+          <p:cNvSpPr>
+            <a:spLocks noGrp="1"/>
+          </p:cNvSpPr>
+          <p:nvPr>
+            <p:ph idx="1"/>
           </p:nvPr>
         </p:nvSpPr>
         <p:spPr>
           <a:xfrm>
-            <a:off x="1629916" y="451312"/>
-            <a:ext cx="8938472" cy="859159"/>
+            <a:off x="1218883" y="1701796"/>
+            <a:ext cx="10360501" cy="4679531"/>
           </a:xfrm>
         </p:spPr>
         <p:txBody>
-          <a:bodyPr rtlCol="0">
-            <a:normAutofit fontScale="90000"/>
+          <a:bodyPr>
+            <a:normAutofit fontScale="92500" lnSpcReduction="10000"/>
           </a:bodyPr>
           <a:lstStyle/>
           <a:p>
             <a:r>
-              <a:rPr lang="pt-BR" dirty="0">
-                <a:latin typeface="Arial Rounded MT Bold" panose="020F0704030504030204" pitchFamily="34" charset="0"/>
-              </a:rPr>
-              <a:t>The Grinder</a:t>
-            </a:r>
-            <a:endParaRPr lang="pt-br" dirty="0"/>
-          </a:p>
-        </p:txBody>
-      </p:sp>
-      <p:sp>
-        <p:nvSpPr>
-          <p:cNvPr id="2" name="Espaço Reservado para Conteúdo 1"/>
-          <p:cNvSpPr>
-            <a:spLocks noGrp="1"/>
-          </p:cNvSpPr>
-          <p:nvPr>
-            <p:ph type="body" idx="1"/>
-          </p:nvPr>
-        </p:nvSpPr>
-        <p:spPr>
-          <a:xfrm>
-            <a:off x="1197868" y="1340768"/>
-            <a:ext cx="10153128" cy="4541440"/>
-          </a:xfrm>
-        </p:spPr>
-        <p:txBody>
-          <a:bodyPr>
-            <a:normAutofit/>
-          </a:bodyPr>
-          <a:lstStyle/>
-          <a:p>
-            <a:r>
-              <a:rPr lang="pt-BR" cap="none" dirty="0">
-                <a:solidFill>
-                  <a:schemeClr val="tx1"/>
-                </a:solidFill>
-              </a:rPr>
-              <a:t>É um framework de testes de carga que facilita a execução de testes de carga distribuídas entre vários servidores.</a:t>
-            </a:r>
-            <a:br>
-              <a:rPr lang="pt-BR" cap="none" dirty="0">
-                <a:solidFill>
-                  <a:schemeClr val="tx1"/>
-                </a:solidFill>
-              </a:rPr>
-            </a:br>
-            <a:r>
-              <a:rPr lang="pt-BR" cap="none" dirty="0">
-                <a:solidFill>
-                  <a:schemeClr val="tx1"/>
-                </a:solidFill>
-              </a:rPr>
-              <a:t>Os scripts de teste são escritos em </a:t>
-            </a:r>
-            <a:r>
-              <a:rPr lang="pt-BR" cap="none" dirty="0" err="1">
-                <a:solidFill>
-                  <a:schemeClr val="tx1"/>
-                </a:solidFill>
-              </a:rPr>
-              <a:t>jython</a:t>
-            </a:r>
-            <a:r>
-              <a:rPr lang="pt-BR" cap="none" dirty="0">
-                <a:solidFill>
-                  <a:schemeClr val="tx1"/>
-                </a:solidFill>
-              </a:rPr>
-              <a:t> ou </a:t>
-            </a:r>
-            <a:r>
-              <a:rPr lang="pt-BR" cap="none" dirty="0" err="1">
-                <a:solidFill>
-                  <a:schemeClr val="tx1"/>
-                </a:solidFill>
-              </a:rPr>
-              <a:t>cloujure</a:t>
-            </a:r>
-            <a:r>
-              <a:rPr lang="pt-BR" cap="none" dirty="0">
-                <a:solidFill>
-                  <a:schemeClr val="tx1"/>
-                </a:solidFill>
-              </a:rPr>
-              <a:t>, fornecendo suporte para testar uma ampla gama de protocolos de rede.</a:t>
-            </a:r>
-          </a:p>
-          <a:p>
-            <a:r>
-              <a:rPr lang="pt-BR" cap="none" dirty="0">
-                <a:solidFill>
-                  <a:schemeClr val="tx1"/>
-                </a:solidFill>
-              </a:rPr>
-              <a:t>O </a:t>
-            </a:r>
-            <a:r>
-              <a:rPr lang="pt-BR" cap="none" dirty="0" err="1">
-                <a:solidFill>
-                  <a:schemeClr val="tx1"/>
-                </a:solidFill>
-              </a:rPr>
-              <a:t>the</a:t>
-            </a:r>
-            <a:r>
-              <a:rPr lang="pt-BR" cap="none" dirty="0">
-                <a:solidFill>
-                  <a:schemeClr val="tx1"/>
-                </a:solidFill>
-              </a:rPr>
-              <a:t> </a:t>
-            </a:r>
-            <a:r>
-              <a:rPr lang="pt-BR" cap="none" dirty="0" err="1">
-                <a:solidFill>
-                  <a:schemeClr val="tx1"/>
-                </a:solidFill>
-              </a:rPr>
-              <a:t>grinder</a:t>
-            </a:r>
-            <a:r>
-              <a:rPr lang="pt-BR" cap="none" dirty="0">
-                <a:solidFill>
-                  <a:schemeClr val="tx1"/>
-                </a:solidFill>
-              </a:rPr>
-              <a:t> também vem com um plug-in para testar serviços http.</a:t>
-            </a:r>
-          </a:p>
-          <a:p>
-            <a:pPr marL="0" indent="0">
-              <a:buNone/>
-            </a:pPr>
-            <a:endParaRPr lang="pt-BR" cap="none" dirty="0">
-              <a:solidFill>
-                <a:schemeClr val="tx1"/>
-              </a:solidFill>
-            </a:endParaRPr>
+              <a:rPr lang="pt-BR" dirty="0" smtClean="0"/>
+              <a:t>Ferramenta de teste </a:t>
+            </a:r>
+            <a:r>
+              <a:rPr lang="pt-BR" dirty="0"/>
+              <a:t>open source (GNU General Public </a:t>
+            </a:r>
+            <a:r>
+              <a:rPr lang="pt-BR" dirty="0" smtClean="0"/>
+              <a:t>License).</a:t>
+            </a:r>
+          </a:p>
+          <a:p>
+            <a:r>
+              <a:rPr lang="pt-BR" dirty="0" smtClean="0"/>
+              <a:t>Desenvolvido pela empresa Cyrano.</a:t>
+            </a:r>
+          </a:p>
+          <a:p>
+            <a:r>
+              <a:rPr lang="pt-BR" dirty="0" smtClean="0"/>
+              <a:t>Escrito em C++.</a:t>
+            </a:r>
+          </a:p>
+          <a:p>
+            <a:r>
+              <a:rPr lang="pt-BR" dirty="0" smtClean="0"/>
+              <a:t> Somente para Windows.</a:t>
+            </a:r>
+          </a:p>
+          <a:p>
+            <a:r>
+              <a:rPr lang="pt-BR" dirty="0" smtClean="0"/>
+              <a:t>Composto por duas ferramentas: OpenSTA commander e o OpenSTA gateway.</a:t>
+            </a:r>
+          </a:p>
+          <a:p>
+            <a:r>
+              <a:rPr lang="pt-BR" dirty="0" smtClean="0"/>
+              <a:t>Scripts são escritos em uma linguagem própria denominada “SLC”, linguagem de codificação simples, que fornece suporte para funções personalizadas, escopo de variáveis, listas aleatórias </a:t>
+            </a:r>
+            <a:r>
+              <a:rPr lang="pt-BR" dirty="0"/>
+              <a:t>ou sequenciais.</a:t>
+            </a:r>
+            <a:endParaRPr lang="pt-BR" dirty="0" smtClean="0"/>
+          </a:p>
+          <a:p>
+            <a:r>
+              <a:rPr lang="pt-BR" dirty="0" smtClean="0"/>
+              <a:t>Capaz </a:t>
+            </a:r>
+            <a:r>
+              <a:rPr lang="pt-BR" dirty="0"/>
+              <a:t>de executar testes de carga pesada HTTP e </a:t>
+            </a:r>
+            <a:r>
+              <a:rPr lang="pt-BR" dirty="0" smtClean="0"/>
+              <a:t>HTTPS.</a:t>
+            </a:r>
+            <a:endParaRPr lang="pt-BR" dirty="0"/>
           </a:p>
         </p:txBody>
       </p:sp>
     </p:spTree>
     <p:extLst>
       <p:ext uri="{BB962C8B-B14F-4D97-AF65-F5344CB8AC3E}">
-        <p14:creationId xmlns:p14="http://schemas.microsoft.com/office/powerpoint/2010/main" val="397710800"/>
+        <p14:creationId xmlns:p14="http://schemas.microsoft.com/office/powerpoint/2010/main" val="2244367574"/>
       </p:ext>
     </p:extLst>
   </p:cSld>
@@ -8676,7 +8866,7 @@
   <a:extraClrSchemeLst/>
   <a:extLst>
     <a:ext uri="{05A4C25C-085E-4340-85A3-A5531E510DB2}">
-      <thm15:themeFamily xmlns:thm15="http://schemas.microsoft.com/office/thememl/2012/main" name="TF02787990.potx" id="{BDB9CD5E-36EC-45F3-B87D-6D062B8A3823}" vid="{51682E2F-7C85-4D6F-AD40-072EFC83910D}"/>
+      <thm15:themeFamily xmlns="" xmlns:thm15="http://schemas.microsoft.com/office/thememl/2012/main" name="TF02787990.potx" id="{BDB9CD5E-36EC-45F3-B87D-6D062B8A3823}" vid="{51682E2F-7C85-4D6F-AD40-072EFC83910D}"/>
     </a:ext>
   </a:extLst>
 </a:theme>
@@ -9273,139 +9463,12 @@
 </file>
 
 <file path=customXml/item1.xml><?xml version="1.0" encoding="utf-8"?>
-<p:properties xmlns:p="http://schemas.microsoft.com/office/2006/metadata/properties" xmlns:xsi="http://www.w3.org/2001/XMLSchema-instance" xmlns:pc="http://schemas.microsoft.com/office/infopath/2007/PartnerControls">
-  <documentManagement>
-    <LocPublishedLinkedAssetsLookup xmlns="4873beb7-5857-4685-be1f-d57550cc96cc" xsi:nil="true"/>
-    <ApprovalStatus xmlns="4873beb7-5857-4685-be1f-d57550cc96cc">InProgress</ApprovalStatus>
-    <MarketSpecific xmlns="4873beb7-5857-4685-be1f-d57550cc96cc">false</MarketSpecific>
-    <LocComments xmlns="4873beb7-5857-4685-be1f-d57550cc96cc" xsi:nil="true"/>
-    <LocLastLocAttemptVersionTypeLookup xmlns="4873beb7-5857-4685-be1f-d57550cc96cc" xsi:nil="true"/>
-    <DirectSourceMarket xmlns="4873beb7-5857-4685-be1f-d57550cc96cc" xsi:nil="true"/>
-    <ThumbnailAssetId xmlns="4873beb7-5857-4685-be1f-d57550cc96cc" xsi:nil="true"/>
-    <PrimaryImageGen xmlns="4873beb7-5857-4685-be1f-d57550cc96cc">false</PrimaryImageGen>
-    <LocNewPublishedVersionLookup xmlns="4873beb7-5857-4685-be1f-d57550cc96cc" xsi:nil="true"/>
-    <LegacyData xmlns="4873beb7-5857-4685-be1f-d57550cc96cc" xsi:nil="true"/>
-    <LocRecommendedHandoff xmlns="4873beb7-5857-4685-be1f-d57550cc96cc" xsi:nil="true"/>
-    <BusinessGroup xmlns="4873beb7-5857-4685-be1f-d57550cc96cc" xsi:nil="true"/>
-    <BlockPublish xmlns="4873beb7-5857-4685-be1f-d57550cc96cc">false</BlockPublish>
-    <TPFriendlyName xmlns="4873beb7-5857-4685-be1f-d57550cc96cc" xsi:nil="true"/>
-    <LocOverallPublishStatusLookup xmlns="4873beb7-5857-4685-be1f-d57550cc96cc" xsi:nil="true"/>
-    <NumericId xmlns="4873beb7-5857-4685-be1f-d57550cc96cc" xsi:nil="true"/>
-    <APEditor xmlns="4873beb7-5857-4685-be1f-d57550cc96cc">
-      <UserInfo>
-        <DisplayName/>
-        <AccountId xsi:nil="true"/>
-        <AccountType/>
-      </UserInfo>
-    </APEditor>
-    <SourceTitle xmlns="4873beb7-5857-4685-be1f-d57550cc96cc" xsi:nil="true"/>
-    <OpenTemplate xmlns="4873beb7-5857-4685-be1f-d57550cc96cc">true</OpenTemplate>
-    <LocOverallLocStatusLookup xmlns="4873beb7-5857-4685-be1f-d57550cc96cc" xsi:nil="true"/>
-    <UALocComments xmlns="4873beb7-5857-4685-be1f-d57550cc96cc" xsi:nil="true"/>
-    <ParentAssetId xmlns="4873beb7-5857-4685-be1f-d57550cc96cc" xsi:nil="true"/>
-    <IntlLangReviewDate xmlns="4873beb7-5857-4685-be1f-d57550cc96cc" xsi:nil="true"/>
-    <FeatureTagsTaxHTField0 xmlns="4873beb7-5857-4685-be1f-d57550cc96cc">
-      <Terms xmlns="http://schemas.microsoft.com/office/infopath/2007/PartnerControls"/>
-    </FeatureTagsTaxHTField0>
-    <PublishStatusLookup xmlns="4873beb7-5857-4685-be1f-d57550cc96cc">
-      <Value>1345093</Value>
-    </PublishStatusLookup>
-    <Providers xmlns="4873beb7-5857-4685-be1f-d57550cc96cc" xsi:nil="true"/>
-    <MachineTranslated xmlns="4873beb7-5857-4685-be1f-d57550cc96cc">false</MachineTranslated>
-    <OriginalSourceMarket xmlns="4873beb7-5857-4685-be1f-d57550cc96cc" xsi:nil="true"/>
-    <APDescription xmlns="4873beb7-5857-4685-be1f-d57550cc96cc">This simple template design works for technology and  businesses, but it's versatile enough to use in other contexts.  It features multiple slide layouts designed for widescreen (16x9 resolution) and includes a sample SmartArt list and chart that are easily editable.</APDescription>
-    <ClipArtFilename xmlns="4873beb7-5857-4685-be1f-d57550cc96cc" xsi:nil="true"/>
-    <ContentItem xmlns="4873beb7-5857-4685-be1f-d57550cc96cc" xsi:nil="true"/>
-    <TPInstallLocation xmlns="4873beb7-5857-4685-be1f-d57550cc96cc" xsi:nil="true"/>
-    <PublishTargets xmlns="4873beb7-5857-4685-be1f-d57550cc96cc">OfficeOnlineVNext</PublishTargets>
-    <TimesCloned xmlns="4873beb7-5857-4685-be1f-d57550cc96cc" xsi:nil="true"/>
-    <AssetStart xmlns="4873beb7-5857-4685-be1f-d57550cc96cc">2011-11-26T00:30:00+00:00</AssetStart>
-    <Provider xmlns="4873beb7-5857-4685-be1f-d57550cc96cc" xsi:nil="true"/>
-    <AcquiredFrom xmlns="4873beb7-5857-4685-be1f-d57550cc96cc">Internal MS</AcquiredFrom>
-    <FriendlyTitle xmlns="4873beb7-5857-4685-be1f-d57550cc96cc" xsi:nil="true"/>
-    <LastHandOff xmlns="4873beb7-5857-4685-be1f-d57550cc96cc" xsi:nil="true"/>
-    <TPClientViewer xmlns="4873beb7-5857-4685-be1f-d57550cc96cc" xsi:nil="true"/>
-    <TemplateStatus xmlns="4873beb7-5857-4685-be1f-d57550cc96cc">Complete</TemplateStatus>
-    <Downloads xmlns="4873beb7-5857-4685-be1f-d57550cc96cc">0</Downloads>
-    <OOCacheId xmlns="4873beb7-5857-4685-be1f-d57550cc96cc" xsi:nil="true"/>
-    <IsDeleted xmlns="4873beb7-5857-4685-be1f-d57550cc96cc">false</IsDeleted>
-    <LocPublishedDependentAssetsLookup xmlns="4873beb7-5857-4685-be1f-d57550cc96cc" xsi:nil="true"/>
-    <TPExecutable xmlns="4873beb7-5857-4685-be1f-d57550cc96cc" xsi:nil="true"/>
-    <EditorialTags xmlns="4873beb7-5857-4685-be1f-d57550cc96cc" xsi:nil="true"/>
-    <SubmitterId xmlns="4873beb7-5857-4685-be1f-d57550cc96cc" xsi:nil="true"/>
-    <ApprovalLog xmlns="4873beb7-5857-4685-be1f-d57550cc96cc" xsi:nil="true"/>
-    <AssetType xmlns="4873beb7-5857-4685-be1f-d57550cc96cc">TP</AssetType>
-    <BugNumber xmlns="4873beb7-5857-4685-be1f-d57550cc96cc" xsi:nil="true"/>
-    <CSXSubmissionDate xmlns="4873beb7-5857-4685-be1f-d57550cc96cc" xsi:nil="true"/>
-    <CSXUpdate xmlns="4873beb7-5857-4685-be1f-d57550cc96cc">false</CSXUpdate>
-    <Milestone xmlns="4873beb7-5857-4685-be1f-d57550cc96cc" xsi:nil="true"/>
-    <RecommendationsModifier xmlns="4873beb7-5857-4685-be1f-d57550cc96cc" xsi:nil="true"/>
-    <OriginAsset xmlns="4873beb7-5857-4685-be1f-d57550cc96cc" xsi:nil="true"/>
-    <TPComponent xmlns="4873beb7-5857-4685-be1f-d57550cc96cc" xsi:nil="true"/>
-    <AssetId xmlns="4873beb7-5857-4685-be1f-d57550cc96cc">TP102787989</AssetId>
-    <IntlLocPriority xmlns="4873beb7-5857-4685-be1f-d57550cc96cc" xsi:nil="true"/>
-    <PolicheckWords xmlns="4873beb7-5857-4685-be1f-d57550cc96cc" xsi:nil="true"/>
-    <TPLaunchHelpLink xmlns="4873beb7-5857-4685-be1f-d57550cc96cc" xsi:nil="true"/>
-    <TPApplication xmlns="4873beb7-5857-4685-be1f-d57550cc96cc" xsi:nil="true"/>
-    <CrawlForDependencies xmlns="4873beb7-5857-4685-be1f-d57550cc96cc">false</CrawlForDependencies>
-    <HandoffToMSDN xmlns="4873beb7-5857-4685-be1f-d57550cc96cc" xsi:nil="true"/>
-    <PlannedPubDate xmlns="4873beb7-5857-4685-be1f-d57550cc96cc" xsi:nil="true"/>
-    <IntlLangReviewer xmlns="4873beb7-5857-4685-be1f-d57550cc96cc" xsi:nil="true"/>
-    <TrustLevel xmlns="4873beb7-5857-4685-be1f-d57550cc96cc">1 Microsoft Managed Content</TrustLevel>
-    <LocLastLocAttemptVersionLookup xmlns="4873beb7-5857-4685-be1f-d57550cc96cc">694266</LocLastLocAttemptVersionLookup>
-    <LocProcessedForHandoffsLookup xmlns="4873beb7-5857-4685-be1f-d57550cc96cc" xsi:nil="true"/>
-    <IsSearchable xmlns="4873beb7-5857-4685-be1f-d57550cc96cc">true</IsSearchable>
-    <TemplateTemplateType xmlns="4873beb7-5857-4685-be1f-d57550cc96cc">PowerPoint Presentation Template</TemplateTemplateType>
-    <CampaignTagsTaxHTField0 xmlns="4873beb7-5857-4685-be1f-d57550cc96cc">
-      <Terms xmlns="http://schemas.microsoft.com/office/infopath/2007/PartnerControls"/>
-    </CampaignTagsTaxHTField0>
-    <TPNamespace xmlns="4873beb7-5857-4685-be1f-d57550cc96cc" xsi:nil="true"/>
-    <LocOverallPreviewStatusLookup xmlns="4873beb7-5857-4685-be1f-d57550cc96cc" xsi:nil="true"/>
-    <TaxCatchAll xmlns="4873beb7-5857-4685-be1f-d57550cc96cc"/>
-    <Markets xmlns="4873beb7-5857-4685-be1f-d57550cc96cc"/>
-    <UAProjectedTotalWords xmlns="4873beb7-5857-4685-be1f-d57550cc96cc" xsi:nil="true"/>
-    <IntlLangReview xmlns="4873beb7-5857-4685-be1f-d57550cc96cc" xsi:nil="true"/>
-    <OutputCachingOn xmlns="4873beb7-5857-4685-be1f-d57550cc96cc">false</OutputCachingOn>
-    <AverageRating xmlns="4873beb7-5857-4685-be1f-d57550cc96cc" xsi:nil="true"/>
-    <APAuthor xmlns="4873beb7-5857-4685-be1f-d57550cc96cc">
-      <UserInfo>
-        <DisplayName>REDMOND\kristaa</DisplayName>
-        <AccountId>136</AccountId>
-        <AccountType/>
-      </UserInfo>
-    </APAuthor>
-    <LocManualTestRequired xmlns="4873beb7-5857-4685-be1f-d57550cc96cc">false</LocManualTestRequired>
-    <TPCommandLine xmlns="4873beb7-5857-4685-be1f-d57550cc96cc" xsi:nil="true"/>
-    <TPAppVersion xmlns="4873beb7-5857-4685-be1f-d57550cc96cc" xsi:nil="true"/>
-    <EditorialStatus xmlns="4873beb7-5857-4685-be1f-d57550cc96cc">Complete</EditorialStatus>
-    <LastModifiedDateTime xmlns="4873beb7-5857-4685-be1f-d57550cc96cc" xsi:nil="true"/>
-    <ScenarioTagsTaxHTField0 xmlns="4873beb7-5857-4685-be1f-d57550cc96cc">
-      <Terms xmlns="http://schemas.microsoft.com/office/infopath/2007/PartnerControls"/>
-    </ScenarioTagsTaxHTField0>
-    <LocProcessedForMarketsLookup xmlns="4873beb7-5857-4685-be1f-d57550cc96cc" xsi:nil="true"/>
-    <TPLaunchHelpLinkType xmlns="4873beb7-5857-4685-be1f-d57550cc96cc">Template</TPLaunchHelpLinkType>
-    <OriginalRelease xmlns="4873beb7-5857-4685-be1f-d57550cc96cc">15</OriginalRelease>
-    <LocalizationTagsTaxHTField0 xmlns="4873beb7-5857-4685-be1f-d57550cc96cc">
-      <Terms xmlns="http://schemas.microsoft.com/office/infopath/2007/PartnerControls"/>
-    </LocalizationTagsTaxHTField0>
-    <UACurrentWords xmlns="4873beb7-5857-4685-be1f-d57550cc96cc" xsi:nil="true"/>
-    <ArtSampleDocs xmlns="4873beb7-5857-4685-be1f-d57550cc96cc" xsi:nil="true"/>
-    <UALocRecommendation xmlns="4873beb7-5857-4685-be1f-d57550cc96cc">Localize</UALocRecommendation>
-    <Manager xmlns="4873beb7-5857-4685-be1f-d57550cc96cc" xsi:nil="true"/>
-    <LocOverallHandbackStatusLookup xmlns="4873beb7-5857-4685-be1f-d57550cc96cc" xsi:nil="true"/>
-    <ShowIn xmlns="4873beb7-5857-4685-be1f-d57550cc96cc">Show everywhere</ShowIn>
-    <UANotes xmlns="4873beb7-5857-4685-be1f-d57550cc96cc" xsi:nil="true"/>
-    <InternalTagsTaxHTField0 xmlns="4873beb7-5857-4685-be1f-d57550cc96cc">
-      <Terms xmlns="http://schemas.microsoft.com/office/infopath/2007/PartnerControls"/>
-    </InternalTagsTaxHTField0>
-    <CSXHash xmlns="4873beb7-5857-4685-be1f-d57550cc96cc" xsi:nil="true"/>
-    <VoteCount xmlns="4873beb7-5857-4685-be1f-d57550cc96cc" xsi:nil="true"/>
-    <AssetExpire xmlns="4873beb7-5857-4685-be1f-d57550cc96cc">2029-05-12T07:00:00+00:00</AssetExpire>
-    <DSATActionTaken xmlns="4873beb7-5857-4685-be1f-d57550cc96cc" xsi:nil="true"/>
-    <CSXSubmissionMarket xmlns="4873beb7-5857-4685-be1f-d57550cc96cc" xsi:nil="true"/>
-    <LocMarketGroupTiers2 xmlns="4873beb7-5857-4685-be1f-d57550cc96cc" xsi:nil="true"/>
-  </documentManagement>
-</p:properties>
+<?mso-contentType ?>
+<FormTemplates xmlns="http://schemas.microsoft.com/sharepoint/v3/contenttype/forms">
+  <Display>DocumentLibraryForm</Display>
+  <Edit>AssetEditForm</Edit>
+  <New>DocumentLibraryForm</New>
+</FormTemplates>
 </file>
 
 <file path=customXml/item2.xml><?xml version="1.0" encoding="utf-8"?>
@@ -10449,26 +10512,145 @@
 </file>
 
 <file path=customXml/item3.xml><?xml version="1.0" encoding="utf-8"?>
-<?mso-contentType ?>
-<FormTemplates xmlns="http://schemas.microsoft.com/sharepoint/v3/contenttype/forms">
-  <Display>DocumentLibraryForm</Display>
-  <Edit>AssetEditForm</Edit>
-  <New>DocumentLibraryForm</New>
-</FormTemplates>
+<p:properties xmlns:p="http://schemas.microsoft.com/office/2006/metadata/properties" xmlns:xsi="http://www.w3.org/2001/XMLSchema-instance" xmlns:pc="http://schemas.microsoft.com/office/infopath/2007/PartnerControls">
+  <documentManagement>
+    <LocPublishedLinkedAssetsLookup xmlns="4873beb7-5857-4685-be1f-d57550cc96cc" xsi:nil="true"/>
+    <ApprovalStatus xmlns="4873beb7-5857-4685-be1f-d57550cc96cc">InProgress</ApprovalStatus>
+    <MarketSpecific xmlns="4873beb7-5857-4685-be1f-d57550cc96cc">false</MarketSpecific>
+    <LocComments xmlns="4873beb7-5857-4685-be1f-d57550cc96cc" xsi:nil="true"/>
+    <LocLastLocAttemptVersionTypeLookup xmlns="4873beb7-5857-4685-be1f-d57550cc96cc" xsi:nil="true"/>
+    <DirectSourceMarket xmlns="4873beb7-5857-4685-be1f-d57550cc96cc" xsi:nil="true"/>
+    <ThumbnailAssetId xmlns="4873beb7-5857-4685-be1f-d57550cc96cc" xsi:nil="true"/>
+    <PrimaryImageGen xmlns="4873beb7-5857-4685-be1f-d57550cc96cc">false</PrimaryImageGen>
+    <LocNewPublishedVersionLookup xmlns="4873beb7-5857-4685-be1f-d57550cc96cc" xsi:nil="true"/>
+    <LegacyData xmlns="4873beb7-5857-4685-be1f-d57550cc96cc" xsi:nil="true"/>
+    <LocRecommendedHandoff xmlns="4873beb7-5857-4685-be1f-d57550cc96cc" xsi:nil="true"/>
+    <BusinessGroup xmlns="4873beb7-5857-4685-be1f-d57550cc96cc" xsi:nil="true"/>
+    <BlockPublish xmlns="4873beb7-5857-4685-be1f-d57550cc96cc">false</BlockPublish>
+    <TPFriendlyName xmlns="4873beb7-5857-4685-be1f-d57550cc96cc" xsi:nil="true"/>
+    <LocOverallPublishStatusLookup xmlns="4873beb7-5857-4685-be1f-d57550cc96cc" xsi:nil="true"/>
+    <NumericId xmlns="4873beb7-5857-4685-be1f-d57550cc96cc" xsi:nil="true"/>
+    <APEditor xmlns="4873beb7-5857-4685-be1f-d57550cc96cc">
+      <UserInfo>
+        <DisplayName/>
+        <AccountId xsi:nil="true"/>
+        <AccountType/>
+      </UserInfo>
+    </APEditor>
+    <SourceTitle xmlns="4873beb7-5857-4685-be1f-d57550cc96cc" xsi:nil="true"/>
+    <OpenTemplate xmlns="4873beb7-5857-4685-be1f-d57550cc96cc">true</OpenTemplate>
+    <LocOverallLocStatusLookup xmlns="4873beb7-5857-4685-be1f-d57550cc96cc" xsi:nil="true"/>
+    <UALocComments xmlns="4873beb7-5857-4685-be1f-d57550cc96cc" xsi:nil="true"/>
+    <ParentAssetId xmlns="4873beb7-5857-4685-be1f-d57550cc96cc" xsi:nil="true"/>
+    <IntlLangReviewDate xmlns="4873beb7-5857-4685-be1f-d57550cc96cc" xsi:nil="true"/>
+    <FeatureTagsTaxHTField0 xmlns="4873beb7-5857-4685-be1f-d57550cc96cc">
+      <Terms xmlns="http://schemas.microsoft.com/office/infopath/2007/PartnerControls"/>
+    </FeatureTagsTaxHTField0>
+    <PublishStatusLookup xmlns="4873beb7-5857-4685-be1f-d57550cc96cc">
+      <Value>1345093</Value>
+    </PublishStatusLookup>
+    <Providers xmlns="4873beb7-5857-4685-be1f-d57550cc96cc" xsi:nil="true"/>
+    <MachineTranslated xmlns="4873beb7-5857-4685-be1f-d57550cc96cc">false</MachineTranslated>
+    <OriginalSourceMarket xmlns="4873beb7-5857-4685-be1f-d57550cc96cc" xsi:nil="true"/>
+    <APDescription xmlns="4873beb7-5857-4685-be1f-d57550cc96cc">This simple template design works for technology and  businesses, but it's versatile enough to use in other contexts.  It features multiple slide layouts designed for widescreen (16x9 resolution) and includes a sample SmartArt list and chart that are easily editable.</APDescription>
+    <ClipArtFilename xmlns="4873beb7-5857-4685-be1f-d57550cc96cc" xsi:nil="true"/>
+    <ContentItem xmlns="4873beb7-5857-4685-be1f-d57550cc96cc" xsi:nil="true"/>
+    <TPInstallLocation xmlns="4873beb7-5857-4685-be1f-d57550cc96cc" xsi:nil="true"/>
+    <PublishTargets xmlns="4873beb7-5857-4685-be1f-d57550cc96cc">OfficeOnlineVNext</PublishTargets>
+    <TimesCloned xmlns="4873beb7-5857-4685-be1f-d57550cc96cc" xsi:nil="true"/>
+    <AssetStart xmlns="4873beb7-5857-4685-be1f-d57550cc96cc">2011-11-26T00:30:00+00:00</AssetStart>
+    <Provider xmlns="4873beb7-5857-4685-be1f-d57550cc96cc" xsi:nil="true"/>
+    <AcquiredFrom xmlns="4873beb7-5857-4685-be1f-d57550cc96cc">Internal MS</AcquiredFrom>
+    <FriendlyTitle xmlns="4873beb7-5857-4685-be1f-d57550cc96cc" xsi:nil="true"/>
+    <LastHandOff xmlns="4873beb7-5857-4685-be1f-d57550cc96cc" xsi:nil="true"/>
+    <TPClientViewer xmlns="4873beb7-5857-4685-be1f-d57550cc96cc" xsi:nil="true"/>
+    <TemplateStatus xmlns="4873beb7-5857-4685-be1f-d57550cc96cc">Complete</TemplateStatus>
+    <Downloads xmlns="4873beb7-5857-4685-be1f-d57550cc96cc">0</Downloads>
+    <OOCacheId xmlns="4873beb7-5857-4685-be1f-d57550cc96cc" xsi:nil="true"/>
+    <IsDeleted xmlns="4873beb7-5857-4685-be1f-d57550cc96cc">false</IsDeleted>
+    <LocPublishedDependentAssetsLookup xmlns="4873beb7-5857-4685-be1f-d57550cc96cc" xsi:nil="true"/>
+    <TPExecutable xmlns="4873beb7-5857-4685-be1f-d57550cc96cc" xsi:nil="true"/>
+    <EditorialTags xmlns="4873beb7-5857-4685-be1f-d57550cc96cc" xsi:nil="true"/>
+    <SubmitterId xmlns="4873beb7-5857-4685-be1f-d57550cc96cc" xsi:nil="true"/>
+    <ApprovalLog xmlns="4873beb7-5857-4685-be1f-d57550cc96cc" xsi:nil="true"/>
+    <AssetType xmlns="4873beb7-5857-4685-be1f-d57550cc96cc">TP</AssetType>
+    <BugNumber xmlns="4873beb7-5857-4685-be1f-d57550cc96cc" xsi:nil="true"/>
+    <CSXSubmissionDate xmlns="4873beb7-5857-4685-be1f-d57550cc96cc" xsi:nil="true"/>
+    <CSXUpdate xmlns="4873beb7-5857-4685-be1f-d57550cc96cc">false</CSXUpdate>
+    <Milestone xmlns="4873beb7-5857-4685-be1f-d57550cc96cc" xsi:nil="true"/>
+    <RecommendationsModifier xmlns="4873beb7-5857-4685-be1f-d57550cc96cc" xsi:nil="true"/>
+    <OriginAsset xmlns="4873beb7-5857-4685-be1f-d57550cc96cc" xsi:nil="true"/>
+    <TPComponent xmlns="4873beb7-5857-4685-be1f-d57550cc96cc" xsi:nil="true"/>
+    <AssetId xmlns="4873beb7-5857-4685-be1f-d57550cc96cc">TP102787989</AssetId>
+    <IntlLocPriority xmlns="4873beb7-5857-4685-be1f-d57550cc96cc" xsi:nil="true"/>
+    <PolicheckWords xmlns="4873beb7-5857-4685-be1f-d57550cc96cc" xsi:nil="true"/>
+    <TPLaunchHelpLink xmlns="4873beb7-5857-4685-be1f-d57550cc96cc" xsi:nil="true"/>
+    <TPApplication xmlns="4873beb7-5857-4685-be1f-d57550cc96cc" xsi:nil="true"/>
+    <CrawlForDependencies xmlns="4873beb7-5857-4685-be1f-d57550cc96cc">false</CrawlForDependencies>
+    <HandoffToMSDN xmlns="4873beb7-5857-4685-be1f-d57550cc96cc" xsi:nil="true"/>
+    <PlannedPubDate xmlns="4873beb7-5857-4685-be1f-d57550cc96cc" xsi:nil="true"/>
+    <IntlLangReviewer xmlns="4873beb7-5857-4685-be1f-d57550cc96cc" xsi:nil="true"/>
+    <TrustLevel xmlns="4873beb7-5857-4685-be1f-d57550cc96cc">1 Microsoft Managed Content</TrustLevel>
+    <LocLastLocAttemptVersionLookup xmlns="4873beb7-5857-4685-be1f-d57550cc96cc">694266</LocLastLocAttemptVersionLookup>
+    <LocProcessedForHandoffsLookup xmlns="4873beb7-5857-4685-be1f-d57550cc96cc" xsi:nil="true"/>
+    <IsSearchable xmlns="4873beb7-5857-4685-be1f-d57550cc96cc">true</IsSearchable>
+    <TemplateTemplateType xmlns="4873beb7-5857-4685-be1f-d57550cc96cc">PowerPoint Presentation Template</TemplateTemplateType>
+    <CampaignTagsTaxHTField0 xmlns="4873beb7-5857-4685-be1f-d57550cc96cc">
+      <Terms xmlns="http://schemas.microsoft.com/office/infopath/2007/PartnerControls"/>
+    </CampaignTagsTaxHTField0>
+    <TPNamespace xmlns="4873beb7-5857-4685-be1f-d57550cc96cc" xsi:nil="true"/>
+    <LocOverallPreviewStatusLookup xmlns="4873beb7-5857-4685-be1f-d57550cc96cc" xsi:nil="true"/>
+    <TaxCatchAll xmlns="4873beb7-5857-4685-be1f-d57550cc96cc"/>
+    <Markets xmlns="4873beb7-5857-4685-be1f-d57550cc96cc"/>
+    <UAProjectedTotalWords xmlns="4873beb7-5857-4685-be1f-d57550cc96cc" xsi:nil="true"/>
+    <IntlLangReview xmlns="4873beb7-5857-4685-be1f-d57550cc96cc" xsi:nil="true"/>
+    <OutputCachingOn xmlns="4873beb7-5857-4685-be1f-d57550cc96cc">false</OutputCachingOn>
+    <AverageRating xmlns="4873beb7-5857-4685-be1f-d57550cc96cc" xsi:nil="true"/>
+    <APAuthor xmlns="4873beb7-5857-4685-be1f-d57550cc96cc">
+      <UserInfo>
+        <DisplayName>REDMOND\kristaa</DisplayName>
+        <AccountId>136</AccountId>
+        <AccountType/>
+      </UserInfo>
+    </APAuthor>
+    <LocManualTestRequired xmlns="4873beb7-5857-4685-be1f-d57550cc96cc">false</LocManualTestRequired>
+    <TPCommandLine xmlns="4873beb7-5857-4685-be1f-d57550cc96cc" xsi:nil="true"/>
+    <TPAppVersion xmlns="4873beb7-5857-4685-be1f-d57550cc96cc" xsi:nil="true"/>
+    <EditorialStatus xmlns="4873beb7-5857-4685-be1f-d57550cc96cc">Complete</EditorialStatus>
+    <LastModifiedDateTime xmlns="4873beb7-5857-4685-be1f-d57550cc96cc" xsi:nil="true"/>
+    <ScenarioTagsTaxHTField0 xmlns="4873beb7-5857-4685-be1f-d57550cc96cc">
+      <Terms xmlns="http://schemas.microsoft.com/office/infopath/2007/PartnerControls"/>
+    </ScenarioTagsTaxHTField0>
+    <LocProcessedForMarketsLookup xmlns="4873beb7-5857-4685-be1f-d57550cc96cc" xsi:nil="true"/>
+    <TPLaunchHelpLinkType xmlns="4873beb7-5857-4685-be1f-d57550cc96cc">Template</TPLaunchHelpLinkType>
+    <OriginalRelease xmlns="4873beb7-5857-4685-be1f-d57550cc96cc">15</OriginalRelease>
+    <LocalizationTagsTaxHTField0 xmlns="4873beb7-5857-4685-be1f-d57550cc96cc">
+      <Terms xmlns="http://schemas.microsoft.com/office/infopath/2007/PartnerControls"/>
+    </LocalizationTagsTaxHTField0>
+    <UACurrentWords xmlns="4873beb7-5857-4685-be1f-d57550cc96cc" xsi:nil="true"/>
+    <ArtSampleDocs xmlns="4873beb7-5857-4685-be1f-d57550cc96cc" xsi:nil="true"/>
+    <UALocRecommendation xmlns="4873beb7-5857-4685-be1f-d57550cc96cc">Localize</UALocRecommendation>
+    <Manager xmlns="4873beb7-5857-4685-be1f-d57550cc96cc" xsi:nil="true"/>
+    <LocOverallHandbackStatusLookup xmlns="4873beb7-5857-4685-be1f-d57550cc96cc" xsi:nil="true"/>
+    <ShowIn xmlns="4873beb7-5857-4685-be1f-d57550cc96cc">Show everywhere</ShowIn>
+    <UANotes xmlns="4873beb7-5857-4685-be1f-d57550cc96cc" xsi:nil="true"/>
+    <InternalTagsTaxHTField0 xmlns="4873beb7-5857-4685-be1f-d57550cc96cc">
+      <Terms xmlns="http://schemas.microsoft.com/office/infopath/2007/PartnerControls"/>
+    </InternalTagsTaxHTField0>
+    <CSXHash xmlns="4873beb7-5857-4685-be1f-d57550cc96cc" xsi:nil="true"/>
+    <VoteCount xmlns="4873beb7-5857-4685-be1f-d57550cc96cc" xsi:nil="true"/>
+    <AssetExpire xmlns="4873beb7-5857-4685-be1f-d57550cc96cc">2029-05-12T07:00:00+00:00</AssetExpire>
+    <DSATActionTaken xmlns="4873beb7-5857-4685-be1f-d57550cc96cc" xsi:nil="true"/>
+    <CSXSubmissionMarket xmlns="4873beb7-5857-4685-be1f-d57550cc96cc" xsi:nil="true"/>
+    <LocMarketGroupTiers2 xmlns="4873beb7-5857-4685-be1f-d57550cc96cc" xsi:nil="true"/>
+  </documentManagement>
+</p:properties>
 </file>
 
 <file path=customXml/itemProps1.xml><?xml version="1.0" encoding="utf-8"?>
-<ds:datastoreItem xmlns:ds="http://schemas.openxmlformats.org/officeDocument/2006/customXml" ds:itemID="{60C67BEE-D13F-4BD2-98A5-34D8A0977F68}">
+<ds:datastoreItem xmlns:ds="http://schemas.openxmlformats.org/officeDocument/2006/customXml" ds:itemID="{3836F65B-1B07-41EE-A0E8-BC6EF3855225}">
   <ds:schemaRefs>
-    <ds:schemaRef ds:uri="http://schemas.microsoft.com/office/2006/documentManagement/types"/>
-    <ds:schemaRef ds:uri="http://schemas.openxmlformats.org/package/2006/metadata/core-properties"/>
-    <ds:schemaRef ds:uri="http://purl.org/dc/elements/1.1/"/>
-    <ds:schemaRef ds:uri="http://schemas.microsoft.com/office/2006/metadata/properties"/>
-    <ds:schemaRef ds:uri="http://schemas.microsoft.com/office/infopath/2007/PartnerControls"/>
-    <ds:schemaRef ds:uri="http://purl.org/dc/terms/"/>
-    <ds:schemaRef ds:uri="4873beb7-5857-4685-be1f-d57550cc96cc"/>
-    <ds:schemaRef ds:uri="http://www.w3.org/XML/1998/namespace"/>
-    <ds:schemaRef ds:uri="http://purl.org/dc/dcmitype/"/>
+    <ds:schemaRef ds:uri="http://schemas.microsoft.com/sharepoint/v3/contenttype/forms"/>
   </ds:schemaRefs>
 </ds:datastoreItem>
 </file>
@@ -10492,9 +10674,17 @@
 </file>
 
 <file path=customXml/itemProps3.xml><?xml version="1.0" encoding="utf-8"?>
-<ds:datastoreItem xmlns:ds="http://schemas.openxmlformats.org/officeDocument/2006/customXml" ds:itemID="{3836F65B-1B07-41EE-A0E8-BC6EF3855225}">
+<ds:datastoreItem xmlns:ds="http://schemas.openxmlformats.org/officeDocument/2006/customXml" ds:itemID="{60C67BEE-D13F-4BD2-98A5-34D8A0977F68}">
   <ds:schemaRefs>
-    <ds:schemaRef ds:uri="http://schemas.microsoft.com/sharepoint/v3/contenttype/forms"/>
+    <ds:schemaRef ds:uri="http://schemas.microsoft.com/office/2006/documentManagement/types"/>
+    <ds:schemaRef ds:uri="http://schemas.openxmlformats.org/package/2006/metadata/core-properties"/>
+    <ds:schemaRef ds:uri="http://purl.org/dc/elements/1.1/"/>
+    <ds:schemaRef ds:uri="http://schemas.microsoft.com/office/2006/metadata/properties"/>
+    <ds:schemaRef ds:uri="http://schemas.microsoft.com/office/infopath/2007/PartnerControls"/>
+    <ds:schemaRef ds:uri="http://purl.org/dc/terms/"/>
+    <ds:schemaRef ds:uri="4873beb7-5857-4685-be1f-d57550cc96cc"/>
+    <ds:schemaRef ds:uri="http://www.w3.org/XML/1998/namespace"/>
+    <ds:schemaRef ds:uri="http://purl.org/dc/dcmitype/"/>
   </ds:schemaRefs>
 </ds:datastoreItem>
 </file>
</xml_diff>

<commit_message>
Ajuste da apresentação na parte de PyUnit
</commit_message>
<xml_diff>
--- a/Docs/Apresentação TSW.pptx
+++ b/Docs/Apresentação TSW.pptx
@@ -5,10 +5,10 @@
     <p:sldMasterId id="2147483660" r:id="rId4"/>
   </p:sldMasterIdLst>
   <p:notesMasterIdLst>
-    <p:notesMasterId r:id="rId28"/>
+    <p:notesMasterId r:id="rId36"/>
   </p:notesMasterIdLst>
   <p:handoutMasterIdLst>
-    <p:handoutMasterId r:id="rId29"/>
+    <p:handoutMasterId r:id="rId37"/>
   </p:handoutMasterIdLst>
   <p:sldIdLst>
     <p:sldId id="257" r:id="rId5"/>
@@ -33,7 +33,15 @@
     <p:sldId id="274" r:id="rId24"/>
     <p:sldId id="276" r:id="rId25"/>
     <p:sldId id="277" r:id="rId26"/>
-    <p:sldId id="278" r:id="rId27"/>
+    <p:sldId id="288" r:id="rId27"/>
+    <p:sldId id="278" r:id="rId28"/>
+    <p:sldId id="287" r:id="rId29"/>
+    <p:sldId id="289" r:id="rId30"/>
+    <p:sldId id="290" r:id="rId31"/>
+    <p:sldId id="291" r:id="rId32"/>
+    <p:sldId id="292" r:id="rId33"/>
+    <p:sldId id="293" r:id="rId34"/>
+    <p:sldId id="294" r:id="rId35"/>
   </p:sldIdLst>
   <p:sldSz cx="12188825" cy="6858000"/>
   <p:notesSz cx="6858000" cy="9144000"/>
@@ -134,7 +142,7 @@
   </p:defaultTextStyle>
   <p:extLst>
     <p:ext uri="{EFAFB233-063F-42B5-8137-9DF3F51BA10A}">
-      <p15:sldGuideLst xmlns="" xmlns:p15="http://schemas.microsoft.com/office/powerpoint/2012/main">
+      <p15:sldGuideLst xmlns:p15="http://schemas.microsoft.com/office/powerpoint/2012/main" xmlns="">
         <p15:guide id="1" orient="horz" pos="2160">
           <p15:clr>
             <a:srgbClr val="A4A3A4"/>
@@ -148,7 +156,7 @@
       </p15:sldGuideLst>
     </p:ext>
     <p:ext uri="{2D200454-40CA-4A62-9FC3-DE9A4176ACB9}">
-      <p15:notesGuideLst xmlns="" xmlns:p15="http://schemas.microsoft.com/office/powerpoint/2012/main">
+      <p15:notesGuideLst xmlns:p15="http://schemas.microsoft.com/office/powerpoint/2012/main" xmlns="">
         <p15:guide id="1" orient="horz" pos="2880">
           <p15:clr>
             <a:srgbClr val="A4A3A4"/>
@@ -5252,7 +5260,7 @@
   </p:txStyles>
   <p:extLst>
     <p:ext uri="{27BBF7A9-308A-43DC-89C8-2F10F3537804}">
-      <p15:sldGuideLst xmlns="" xmlns:p15="http://schemas.microsoft.com/office/powerpoint/2012/main">
+      <p15:sldGuideLst xmlns:p15="http://schemas.microsoft.com/office/powerpoint/2012/main" xmlns="">
         <p15:guide id="1" orient="horz" pos="2160" userDrawn="1">
           <p15:clr>
             <a:srgbClr val="F26B43"/>
@@ -6355,11 +6363,7 @@
           <a:p>
             <a:r>
               <a:rPr lang="pt-PT" dirty="0" smtClean="0"/>
-              <a:t>Selecionar a ordem de exeção de cada um</a:t>
-            </a:r>
-            <a:r>
-              <a:rPr lang="pt-PT" dirty="0" smtClean="0"/>
-              <a:t>.</a:t>
+              <a:t>Selecionar a ordem de exeção de cada um.</a:t>
             </a:r>
           </a:p>
           <a:p>
@@ -7649,26 +7653,74 @@
             <p:ph type="title"/>
           </p:nvPr>
         </p:nvSpPr>
-        <p:spPr/>
+        <p:spPr>
+          <a:xfrm>
+            <a:off x="1125860" y="2780928"/>
+            <a:ext cx="10360501" cy="1223963"/>
+          </a:xfrm>
+        </p:spPr>
         <p:txBody>
           <a:bodyPr/>
           <a:lstStyle/>
           <a:p>
             <a:r>
-              <a:rPr lang="pt-BR" dirty="0"/>
-              <a:t>PyUnitPerf</a:t>
-            </a:r>
-          </a:p>
-        </p:txBody>
-      </p:sp>
-      <p:sp>
-        <p:nvSpPr>
-          <p:cNvPr id="3" name="Espaço Reservado para Conteúdo 2"/>
-          <p:cNvSpPr>
-            <a:spLocks noGrp="1"/>
-          </p:cNvSpPr>
-          <p:nvPr>
-            <p:ph idx="1"/>
+              <a:rPr lang="pt-BR" dirty="0" smtClean="0"/>
+              <a:t>PyUnit Perf</a:t>
+            </a:r>
+            <a:endParaRPr lang="pt-BR" dirty="0"/>
+          </a:p>
+        </p:txBody>
+      </p:sp>
+    </p:spTree>
+    <p:extLst>
+      <p:ext uri="{BB962C8B-B14F-4D97-AF65-F5344CB8AC3E}">
+        <p14:creationId xmlns:p14="http://schemas.microsoft.com/office/powerpoint/2010/main" val="3492026286"/>
+      </p:ext>
+    </p:extLst>
+  </p:cSld>
+  <p:clrMapOvr>
+    <a:masterClrMapping/>
+  </p:clrMapOvr>
+  <mc:AlternateContent xmlns:mc="http://schemas.openxmlformats.org/markup-compatibility/2006" xmlns:p14="http://schemas.microsoft.com/office/powerpoint/2010/main">
+    <mc:Choice Requires="p14">
+      <p:transition spd="med" p14:dur="700">
+        <p:fade/>
+      </p:transition>
+    </mc:Choice>
+    <mc:Fallback xmlns="">
+      <p:transition spd="med">
+        <p:fade/>
+      </p:transition>
+    </mc:Fallback>
+  </mc:AlternateContent>
+</p:sld>
+</file>
+
+<file path=ppt/slides/slide24.xml><?xml version="1.0" encoding="utf-8"?>
+<p:sld xmlns:a="http://schemas.openxmlformats.org/drawingml/2006/main" xmlns:r="http://schemas.openxmlformats.org/officeDocument/2006/relationships" xmlns:p="http://schemas.openxmlformats.org/presentationml/2006/main">
+  <p:cSld>
+    <p:spTree>
+      <p:nvGrpSpPr>
+        <p:cNvPr id="1" name=""/>
+        <p:cNvGrpSpPr/>
+        <p:nvPr/>
+      </p:nvGrpSpPr>
+      <p:grpSpPr>
+        <a:xfrm>
+          <a:off x="0" y="0"/>
+          <a:ext cx="0" cy="0"/>
+          <a:chOff x="0" y="0"/>
+          <a:chExt cx="0" cy="0"/>
+        </a:xfrm>
+      </p:grpSpPr>
+      <p:sp>
+        <p:nvSpPr>
+          <p:cNvPr id="2" name="Título 1"/>
+          <p:cNvSpPr>
+            <a:spLocks noGrp="1"/>
+          </p:cNvSpPr>
+          <p:nvPr>
+            <p:ph type="title"/>
           </p:nvPr>
         </p:nvSpPr>
         <p:spPr/>
@@ -7676,7 +7728,48 @@
           <a:bodyPr/>
           <a:lstStyle/>
           <a:p>
+            <a:r>
+              <a:rPr lang="pt-BR" dirty="0" smtClean="0"/>
+              <a:t>Intrudução - PyUnit Perf</a:t>
+            </a:r>
             <a:endParaRPr lang="pt-BR" dirty="0"/>
+          </a:p>
+        </p:txBody>
+      </p:sp>
+      <p:sp>
+        <p:nvSpPr>
+          <p:cNvPr id="3" name="Espaço Reservado para Conteúdo 2"/>
+          <p:cNvSpPr>
+            <a:spLocks noGrp="1"/>
+          </p:cNvSpPr>
+          <p:nvPr>
+            <p:ph idx="1"/>
+          </p:nvPr>
+        </p:nvSpPr>
+        <p:spPr/>
+        <p:txBody>
+          <a:bodyPr>
+            <a:normAutofit/>
+          </a:bodyPr>
+          <a:lstStyle/>
+          <a:p>
+            <a:r>
+              <a:rPr lang="pt-BR" sz="4000" dirty="0" smtClean="0"/>
+              <a:t>Framework de teste baseado no Junit.</a:t>
+            </a:r>
+          </a:p>
+          <a:p>
+            <a:r>
+              <a:rPr lang="pt-BR" sz="4000" dirty="0" smtClean="0"/>
+              <a:t>Feito para a linguagem Python.</a:t>
+            </a:r>
+          </a:p>
+          <a:p>
+            <a:r>
+              <a:rPr lang="pt-BR" sz="4000" dirty="0" smtClean="0"/>
+              <a:t>Para as versões do Python acima da 2.1 já está imbutido.</a:t>
+            </a:r>
+            <a:endParaRPr lang="pt-BR" sz="4000" dirty="0"/>
           </a:p>
         </p:txBody>
       </p:sp>
@@ -7684,6 +7777,673 @@
     <p:extLst>
       <p:ext uri="{BB962C8B-B14F-4D97-AF65-F5344CB8AC3E}">
         <p14:creationId xmlns:p14="http://schemas.microsoft.com/office/powerpoint/2010/main" val="1795879431"/>
+      </p:ext>
+    </p:extLst>
+  </p:cSld>
+  <p:clrMapOvr>
+    <a:masterClrMapping/>
+  </p:clrMapOvr>
+  <mc:AlternateContent xmlns:mc="http://schemas.openxmlformats.org/markup-compatibility/2006" xmlns:p14="http://schemas.microsoft.com/office/powerpoint/2010/main">
+    <mc:Choice Requires="p14">
+      <p:transition spd="med" p14:dur="700">
+        <p:fade/>
+      </p:transition>
+    </mc:Choice>
+    <mc:Fallback xmlns="">
+      <p:transition spd="med">
+        <p:fade/>
+      </p:transition>
+    </mc:Fallback>
+  </mc:AlternateContent>
+</p:sld>
+</file>
+
+<file path=ppt/slides/slide25.xml><?xml version="1.0" encoding="utf-8"?>
+<p:sld xmlns:a="http://schemas.openxmlformats.org/drawingml/2006/main" xmlns:r="http://schemas.openxmlformats.org/officeDocument/2006/relationships" xmlns:p="http://schemas.openxmlformats.org/presentationml/2006/main">
+  <p:cSld>
+    <p:spTree>
+      <p:nvGrpSpPr>
+        <p:cNvPr id="1" name=""/>
+        <p:cNvGrpSpPr/>
+        <p:nvPr/>
+      </p:nvGrpSpPr>
+      <p:grpSpPr>
+        <a:xfrm>
+          <a:off x="0" y="0"/>
+          <a:ext cx="0" cy="0"/>
+          <a:chOff x="0" y="0"/>
+          <a:chExt cx="0" cy="0"/>
+        </a:xfrm>
+      </p:grpSpPr>
+      <p:sp>
+        <p:nvSpPr>
+          <p:cNvPr id="2" name="Título 1"/>
+          <p:cNvSpPr>
+            <a:spLocks noGrp="1"/>
+          </p:cNvSpPr>
+          <p:nvPr>
+            <p:ph type="title"/>
+          </p:nvPr>
+        </p:nvSpPr>
+        <p:spPr/>
+        <p:txBody>
+          <a:bodyPr/>
+          <a:lstStyle/>
+          <a:p>
+            <a:r>
+              <a:rPr lang="pt-BR" dirty="0"/>
+              <a:t>Intrudução - PyUnit </a:t>
+            </a:r>
+            <a:r>
+              <a:rPr lang="pt-BR" dirty="0" smtClean="0"/>
+              <a:t>Perf</a:t>
+            </a:r>
+            <a:endParaRPr lang="pt-BR" dirty="0"/>
+          </a:p>
+        </p:txBody>
+      </p:sp>
+      <p:sp>
+        <p:nvSpPr>
+          <p:cNvPr id="3" name="Espaço Reservado para Conteúdo 2"/>
+          <p:cNvSpPr>
+            <a:spLocks noGrp="1"/>
+          </p:cNvSpPr>
+          <p:nvPr>
+            <p:ph idx="1"/>
+          </p:nvPr>
+        </p:nvSpPr>
+        <p:spPr/>
+        <p:txBody>
+          <a:bodyPr>
+            <a:normAutofit/>
+          </a:bodyPr>
+          <a:lstStyle/>
+          <a:p>
+            <a:r>
+              <a:rPr lang="pt-BR" sz="4000" dirty="0" smtClean="0"/>
+              <a:t>A classe chave é a TesteCase, pertencente ao módulo unitteste.</a:t>
+            </a:r>
+          </a:p>
+          <a:p>
+            <a:r>
+              <a:rPr lang="pt-BR" sz="4000" dirty="0" smtClean="0"/>
+              <a:t>Toda e qualquer classe </a:t>
+            </a:r>
+            <a:br>
+              <a:rPr lang="pt-BR" sz="4000" dirty="0" smtClean="0"/>
+            </a:br>
+            <a:r>
+              <a:rPr lang="pt-BR" sz="4000" dirty="0" smtClean="0"/>
+              <a:t>de teste deve estender </a:t>
+            </a:r>
+            <a:br>
+              <a:rPr lang="pt-BR" sz="4000" dirty="0" smtClean="0"/>
+            </a:br>
+            <a:r>
+              <a:rPr lang="pt-BR" sz="4000" dirty="0" smtClean="0"/>
+              <a:t>dela.</a:t>
+            </a:r>
+          </a:p>
+          <a:p>
+            <a:endParaRPr lang="pt-BR" sz="4000" dirty="0" smtClean="0"/>
+          </a:p>
+        </p:txBody>
+      </p:sp>
+      <p:pic>
+        <p:nvPicPr>
+          <p:cNvPr id="1026" name="Picture 2" descr="C:\Users\Bruno\Desktop\pydev_unittest_run.png"/>
+          <p:cNvPicPr>
+            <a:picLocks noChangeAspect="1" noChangeArrowheads="1"/>
+          </p:cNvPicPr>
+          <p:nvPr/>
+        </p:nvPicPr>
+        <p:blipFill>
+          <a:blip r:embed="rId2">
+            <a:extLst>
+              <a:ext uri="{28A0092B-C50C-407E-A947-70E740481C1C}">
+                <a14:useLocalDpi xmlns:a14="http://schemas.microsoft.com/office/drawing/2010/main" val="0"/>
+              </a:ext>
+            </a:extLst>
+          </a:blip>
+          <a:srcRect/>
+          <a:stretch>
+            <a:fillRect/>
+          </a:stretch>
+        </p:blipFill>
+        <p:spPr bwMode="auto">
+          <a:xfrm>
+            <a:off x="6454452" y="2420888"/>
+            <a:ext cx="5586358" cy="4331045"/>
+          </a:xfrm>
+          <a:prstGeom prst="rect">
+            <a:avLst/>
+          </a:prstGeom>
+          <a:noFill/>
+          <a:extLst>
+            <a:ext uri="{909E8E84-426E-40DD-AFC4-6F175D3DCCD1}">
+              <a14:hiddenFill xmlns:a14="http://schemas.microsoft.com/office/drawing/2010/main">
+                <a:solidFill>
+                  <a:srgbClr val="FFFFFF"/>
+                </a:solidFill>
+              </a14:hiddenFill>
+            </a:ext>
+          </a:extLst>
+        </p:spPr>
+      </p:pic>
+    </p:spTree>
+    <p:extLst>
+      <p:ext uri="{BB962C8B-B14F-4D97-AF65-F5344CB8AC3E}">
+        <p14:creationId xmlns:p14="http://schemas.microsoft.com/office/powerpoint/2010/main" val="339083380"/>
+      </p:ext>
+    </p:extLst>
+  </p:cSld>
+  <p:clrMapOvr>
+    <a:masterClrMapping/>
+  </p:clrMapOvr>
+  <mc:AlternateContent xmlns:mc="http://schemas.openxmlformats.org/markup-compatibility/2006" xmlns:p14="http://schemas.microsoft.com/office/powerpoint/2010/main">
+    <mc:Choice Requires="p14">
+      <p:transition spd="med" p14:dur="700">
+        <p:fade/>
+      </p:transition>
+    </mc:Choice>
+    <mc:Fallback xmlns="">
+      <p:transition spd="med">
+        <p:fade/>
+      </p:transition>
+    </mc:Fallback>
+  </mc:AlternateContent>
+</p:sld>
+</file>
+
+<file path=ppt/slides/slide26.xml><?xml version="1.0" encoding="utf-8"?>
+<p:sld xmlns:a="http://schemas.openxmlformats.org/drawingml/2006/main" xmlns:r="http://schemas.openxmlformats.org/officeDocument/2006/relationships" xmlns:p="http://schemas.openxmlformats.org/presentationml/2006/main">
+  <p:cSld>
+    <p:spTree>
+      <p:nvGrpSpPr>
+        <p:cNvPr id="1" name=""/>
+        <p:cNvGrpSpPr/>
+        <p:nvPr/>
+      </p:nvGrpSpPr>
+      <p:grpSpPr>
+        <a:xfrm>
+          <a:off x="0" y="0"/>
+          <a:ext cx="0" cy="0"/>
+          <a:chOff x="0" y="0"/>
+          <a:chExt cx="0" cy="0"/>
+        </a:xfrm>
+      </p:grpSpPr>
+      <p:sp>
+        <p:nvSpPr>
+          <p:cNvPr id="2" name="Título 1"/>
+          <p:cNvSpPr>
+            <a:spLocks noGrp="1"/>
+          </p:cNvSpPr>
+          <p:nvPr>
+            <p:ph type="title"/>
+          </p:nvPr>
+        </p:nvSpPr>
+        <p:spPr/>
+        <p:txBody>
+          <a:bodyPr/>
+          <a:lstStyle/>
+          <a:p>
+            <a:r>
+              <a:rPr lang="pt-BR" dirty="0" smtClean="0"/>
+              <a:t>Assertions </a:t>
+            </a:r>
+            <a:r>
+              <a:rPr lang="pt-BR" dirty="0"/>
+              <a:t>- PyUnit </a:t>
+            </a:r>
+            <a:r>
+              <a:rPr lang="pt-BR" dirty="0" smtClean="0"/>
+              <a:t>Perf</a:t>
+            </a:r>
+            <a:endParaRPr lang="pt-BR" dirty="0"/>
+          </a:p>
+        </p:txBody>
+      </p:sp>
+      <p:sp>
+        <p:nvSpPr>
+          <p:cNvPr id="3" name="Espaço Reservado para Conteúdo 2"/>
+          <p:cNvSpPr>
+            <a:spLocks noGrp="1"/>
+          </p:cNvSpPr>
+          <p:nvPr>
+            <p:ph idx="1"/>
+          </p:nvPr>
+        </p:nvSpPr>
+        <p:spPr/>
+        <p:txBody>
+          <a:bodyPr>
+            <a:normAutofit/>
+          </a:bodyPr>
+          <a:lstStyle/>
+          <a:p>
+            <a:r>
+              <a:rPr lang="pt-BR" sz="4000" dirty="0" smtClean="0"/>
+              <a:t>Tipicamente usa-se o assert padrão do Python.</a:t>
+            </a:r>
+          </a:p>
+          <a:p>
+            <a:endParaRPr lang="pt-BR" sz="4000" dirty="0" smtClean="0"/>
+          </a:p>
+          <a:p>
+            <a:endParaRPr lang="pt-BR" sz="4000" dirty="0" smtClean="0"/>
+          </a:p>
+        </p:txBody>
+      </p:sp>
+      <p:pic>
+        <p:nvPicPr>
+          <p:cNvPr id="2050" name="Picture 2" descr="C:\Users\Bruno\Desktop\Capturar.PNG"/>
+          <p:cNvPicPr>
+            <a:picLocks noChangeAspect="1" noChangeArrowheads="1"/>
+          </p:cNvPicPr>
+          <p:nvPr/>
+        </p:nvPicPr>
+        <p:blipFill>
+          <a:blip r:embed="rId2">
+            <a:extLst>
+              <a:ext uri="{28A0092B-C50C-407E-A947-70E740481C1C}">
+                <a14:useLocalDpi xmlns:a14="http://schemas.microsoft.com/office/drawing/2010/main" val="0"/>
+              </a:ext>
+            </a:extLst>
+          </a:blip>
+          <a:srcRect/>
+          <a:stretch>
+            <a:fillRect/>
+          </a:stretch>
+        </p:blipFill>
+        <p:spPr bwMode="auto">
+          <a:xfrm>
+            <a:off x="1053852" y="3068960"/>
+            <a:ext cx="10602913" cy="2114550"/>
+          </a:xfrm>
+          <a:prstGeom prst="rect">
+            <a:avLst/>
+          </a:prstGeom>
+          <a:noFill/>
+          <a:extLst>
+            <a:ext uri="{909E8E84-426E-40DD-AFC4-6F175D3DCCD1}">
+              <a14:hiddenFill xmlns:a14="http://schemas.microsoft.com/office/drawing/2010/main">
+                <a:solidFill>
+                  <a:srgbClr val="FFFFFF"/>
+                </a:solidFill>
+              </a14:hiddenFill>
+            </a:ext>
+          </a:extLst>
+        </p:spPr>
+      </p:pic>
+    </p:spTree>
+    <p:extLst>
+      <p:ext uri="{BB962C8B-B14F-4D97-AF65-F5344CB8AC3E}">
+        <p14:creationId xmlns:p14="http://schemas.microsoft.com/office/powerpoint/2010/main" val="770872450"/>
+      </p:ext>
+    </p:extLst>
+  </p:cSld>
+  <p:clrMapOvr>
+    <a:masterClrMapping/>
+  </p:clrMapOvr>
+  <mc:AlternateContent xmlns:mc="http://schemas.openxmlformats.org/markup-compatibility/2006" xmlns:p14="http://schemas.microsoft.com/office/powerpoint/2010/main">
+    <mc:Choice Requires="p14">
+      <p:transition spd="med" p14:dur="700">
+        <p:fade/>
+      </p:transition>
+    </mc:Choice>
+    <mc:Fallback xmlns="">
+      <p:transition spd="med">
+        <p:fade/>
+      </p:transition>
+    </mc:Fallback>
+  </mc:AlternateContent>
+</p:sld>
+</file>
+
+<file path=ppt/slides/slide27.xml><?xml version="1.0" encoding="utf-8"?>
+<p:sld xmlns:a="http://schemas.openxmlformats.org/drawingml/2006/main" xmlns:r="http://schemas.openxmlformats.org/officeDocument/2006/relationships" xmlns:p="http://schemas.openxmlformats.org/presentationml/2006/main">
+  <p:cSld>
+    <p:spTree>
+      <p:nvGrpSpPr>
+        <p:cNvPr id="1" name=""/>
+        <p:cNvGrpSpPr/>
+        <p:nvPr/>
+      </p:nvGrpSpPr>
+      <p:grpSpPr>
+        <a:xfrm>
+          <a:off x="0" y="0"/>
+          <a:ext cx="0" cy="0"/>
+          <a:chOff x="0" y="0"/>
+          <a:chExt cx="0" cy="0"/>
+        </a:xfrm>
+      </p:grpSpPr>
+      <p:sp>
+        <p:nvSpPr>
+          <p:cNvPr id="2" name="Título 1"/>
+          <p:cNvSpPr>
+            <a:spLocks noGrp="1"/>
+          </p:cNvSpPr>
+          <p:nvPr>
+            <p:ph type="title"/>
+          </p:nvPr>
+        </p:nvSpPr>
+        <p:spPr/>
+        <p:txBody>
+          <a:bodyPr/>
+          <a:lstStyle/>
+          <a:p>
+            <a:r>
+              <a:rPr lang="pt-BR" dirty="0" smtClean="0"/>
+              <a:t>Assertions </a:t>
+            </a:r>
+            <a:r>
+              <a:rPr lang="pt-BR" dirty="0"/>
+              <a:t>- PyUnit </a:t>
+            </a:r>
+            <a:r>
+              <a:rPr lang="pt-BR" dirty="0" smtClean="0"/>
+              <a:t>Perf</a:t>
+            </a:r>
+            <a:endParaRPr lang="pt-BR" dirty="0"/>
+          </a:p>
+        </p:txBody>
+      </p:sp>
+      <p:sp>
+        <p:nvSpPr>
+          <p:cNvPr id="3" name="Espaço Reservado para Conteúdo 2"/>
+          <p:cNvSpPr>
+            <a:spLocks noGrp="1"/>
+          </p:cNvSpPr>
+          <p:nvPr>
+            <p:ph idx="1"/>
+          </p:nvPr>
+        </p:nvSpPr>
+        <p:spPr/>
+        <p:txBody>
+          <a:bodyPr>
+            <a:normAutofit/>
+          </a:bodyPr>
+          <a:lstStyle/>
+          <a:p>
+            <a:r>
+              <a:rPr lang="pt-BR" sz="4000" dirty="0" smtClean="0"/>
+              <a:t>Problemas: Se for necessário rodar o Python com a otimização ligada os asserts padrões são ignorados.</a:t>
+            </a:r>
+          </a:p>
+          <a:p>
+            <a:r>
+              <a:rPr lang="pt-BR" sz="4000" dirty="0" smtClean="0"/>
+              <a:t>A solução seria utilizar os asserts do PyUnit.</a:t>
+            </a:r>
+            <a:endParaRPr lang="pt-BR" sz="4000" dirty="0" smtClean="0"/>
+          </a:p>
+          <a:p>
+            <a:endParaRPr lang="pt-BR" sz="4000" dirty="0" smtClean="0"/>
+          </a:p>
+          <a:p>
+            <a:endParaRPr lang="pt-BR" sz="4000" dirty="0" smtClean="0"/>
+          </a:p>
+          <a:p>
+            <a:endParaRPr lang="pt-BR" sz="4000" dirty="0" smtClean="0"/>
+          </a:p>
+        </p:txBody>
+      </p:sp>
+    </p:spTree>
+    <p:extLst>
+      <p:ext uri="{BB962C8B-B14F-4D97-AF65-F5344CB8AC3E}">
+        <p14:creationId xmlns:p14="http://schemas.microsoft.com/office/powerpoint/2010/main" val="2806934378"/>
+      </p:ext>
+    </p:extLst>
+  </p:cSld>
+  <p:clrMapOvr>
+    <a:masterClrMapping/>
+  </p:clrMapOvr>
+  <mc:AlternateContent xmlns:mc="http://schemas.openxmlformats.org/markup-compatibility/2006" xmlns:p14="http://schemas.microsoft.com/office/powerpoint/2010/main">
+    <mc:Choice Requires="p14">
+      <p:transition spd="med" p14:dur="700">
+        <p:fade/>
+      </p:transition>
+    </mc:Choice>
+    <mc:Fallback xmlns="">
+      <p:transition spd="med">
+        <p:fade/>
+      </p:transition>
+    </mc:Fallback>
+  </mc:AlternateContent>
+</p:sld>
+</file>
+
+<file path=ppt/slides/slide28.xml><?xml version="1.0" encoding="utf-8"?>
+<p:sld xmlns:a="http://schemas.openxmlformats.org/drawingml/2006/main" xmlns:r="http://schemas.openxmlformats.org/officeDocument/2006/relationships" xmlns:p="http://schemas.openxmlformats.org/presentationml/2006/main">
+  <p:cSld>
+    <p:spTree>
+      <p:nvGrpSpPr>
+        <p:cNvPr id="1" name=""/>
+        <p:cNvGrpSpPr/>
+        <p:nvPr/>
+      </p:nvGrpSpPr>
+      <p:grpSpPr>
+        <a:xfrm>
+          <a:off x="0" y="0"/>
+          <a:ext cx="0" cy="0"/>
+          <a:chOff x="0" y="0"/>
+          <a:chExt cx="0" cy="0"/>
+        </a:xfrm>
+      </p:grpSpPr>
+      <p:sp>
+        <p:nvSpPr>
+          <p:cNvPr id="2" name="Título 1"/>
+          <p:cNvSpPr>
+            <a:spLocks noGrp="1"/>
+          </p:cNvSpPr>
+          <p:nvPr>
+            <p:ph type="title"/>
+          </p:nvPr>
+        </p:nvSpPr>
+        <p:spPr/>
+        <p:txBody>
+          <a:bodyPr/>
+          <a:lstStyle/>
+          <a:p>
+            <a:r>
+              <a:rPr lang="pt-BR" dirty="0" smtClean="0"/>
+              <a:t>Exceções </a:t>
+            </a:r>
+            <a:r>
+              <a:rPr lang="pt-BR" dirty="0"/>
+              <a:t>- PyUnit </a:t>
+            </a:r>
+            <a:r>
+              <a:rPr lang="pt-BR" dirty="0" smtClean="0"/>
+              <a:t>Perf</a:t>
+            </a:r>
+            <a:endParaRPr lang="pt-BR" dirty="0"/>
+          </a:p>
+        </p:txBody>
+      </p:sp>
+      <p:sp>
+        <p:nvSpPr>
+          <p:cNvPr id="3" name="Espaço Reservado para Conteúdo 2"/>
+          <p:cNvSpPr>
+            <a:spLocks noGrp="1"/>
+          </p:cNvSpPr>
+          <p:nvPr>
+            <p:ph idx="1"/>
+          </p:nvPr>
+        </p:nvSpPr>
+        <p:spPr/>
+        <p:txBody>
+          <a:bodyPr>
+            <a:normAutofit/>
+          </a:bodyPr>
+          <a:lstStyle/>
+          <a:p>
+            <a:r>
+              <a:rPr lang="pt-BR" sz="4000" dirty="0" smtClean="0"/>
+              <a:t>Três soluções para testar situações em que exceções esperadas não são lançadas.</a:t>
+            </a:r>
+          </a:p>
+          <a:p>
+            <a:endParaRPr lang="pt-BR" sz="4000" dirty="0" smtClean="0"/>
+          </a:p>
+          <a:p>
+            <a:endParaRPr lang="pt-BR" sz="4000" dirty="0" smtClean="0"/>
+          </a:p>
+          <a:p>
+            <a:endParaRPr lang="pt-BR" sz="4000" dirty="0" smtClean="0"/>
+          </a:p>
+        </p:txBody>
+      </p:sp>
+    </p:spTree>
+    <p:extLst>
+      <p:ext uri="{BB962C8B-B14F-4D97-AF65-F5344CB8AC3E}">
+        <p14:creationId xmlns:p14="http://schemas.microsoft.com/office/powerpoint/2010/main" val="567036885"/>
+      </p:ext>
+    </p:extLst>
+  </p:cSld>
+  <p:clrMapOvr>
+    <a:masterClrMapping/>
+  </p:clrMapOvr>
+  <mc:AlternateContent xmlns:mc="http://schemas.openxmlformats.org/markup-compatibility/2006" xmlns:p14="http://schemas.microsoft.com/office/powerpoint/2010/main">
+    <mc:Choice Requires="p14">
+      <p:transition spd="med" p14:dur="700">
+        <p:fade/>
+      </p:transition>
+    </mc:Choice>
+    <mc:Fallback xmlns="">
+      <p:transition spd="med">
+        <p:fade/>
+      </p:transition>
+    </mc:Fallback>
+  </mc:AlternateContent>
+</p:sld>
+</file>
+
+<file path=ppt/slides/slide29.xml><?xml version="1.0" encoding="utf-8"?>
+<p:sld xmlns:a="http://schemas.openxmlformats.org/drawingml/2006/main" xmlns:r="http://schemas.openxmlformats.org/officeDocument/2006/relationships" xmlns:p="http://schemas.openxmlformats.org/presentationml/2006/main">
+  <p:cSld>
+    <p:spTree>
+      <p:nvGrpSpPr>
+        <p:cNvPr id="1" name=""/>
+        <p:cNvGrpSpPr/>
+        <p:nvPr/>
+      </p:nvGrpSpPr>
+      <p:grpSpPr>
+        <a:xfrm>
+          <a:off x="0" y="0"/>
+          <a:ext cx="0" cy="0"/>
+          <a:chOff x="0" y="0"/>
+          <a:chExt cx="0" cy="0"/>
+        </a:xfrm>
+      </p:grpSpPr>
+      <p:sp>
+        <p:nvSpPr>
+          <p:cNvPr id="2" name="Título 1"/>
+          <p:cNvSpPr>
+            <a:spLocks noGrp="1"/>
+          </p:cNvSpPr>
+          <p:nvPr>
+            <p:ph type="title"/>
+          </p:nvPr>
+        </p:nvSpPr>
+        <p:spPr/>
+        <p:txBody>
+          <a:bodyPr/>
+          <a:lstStyle/>
+          <a:p>
+            <a:r>
+              <a:rPr lang="pt-BR" dirty="0" smtClean="0"/>
+              <a:t>Exceções </a:t>
+            </a:r>
+            <a:r>
+              <a:rPr lang="pt-BR" dirty="0"/>
+              <a:t>- PyUnit </a:t>
+            </a:r>
+            <a:r>
+              <a:rPr lang="pt-BR" dirty="0" smtClean="0"/>
+              <a:t>Perf</a:t>
+            </a:r>
+            <a:endParaRPr lang="pt-BR" dirty="0"/>
+          </a:p>
+        </p:txBody>
+      </p:sp>
+      <p:sp>
+        <p:nvSpPr>
+          <p:cNvPr id="3" name="Espaço Reservado para Conteúdo 2"/>
+          <p:cNvSpPr>
+            <a:spLocks noGrp="1"/>
+          </p:cNvSpPr>
+          <p:nvPr>
+            <p:ph idx="1"/>
+          </p:nvPr>
+        </p:nvSpPr>
+        <p:spPr/>
+        <p:txBody>
+          <a:bodyPr>
+            <a:normAutofit/>
+          </a:bodyPr>
+          <a:lstStyle/>
+          <a:p>
+            <a:r>
+              <a:rPr lang="pt-BR" sz="4000" dirty="0" smtClean="0"/>
+              <a:t>Forma 1: Silimilar ao java.</a:t>
+            </a:r>
+          </a:p>
+          <a:p>
+            <a:endParaRPr lang="pt-BR" sz="4000" dirty="0" smtClean="0"/>
+          </a:p>
+          <a:p>
+            <a:endParaRPr lang="pt-BR" sz="4000" dirty="0" smtClean="0"/>
+          </a:p>
+          <a:p>
+            <a:endParaRPr lang="pt-BR" sz="4000" dirty="0" smtClean="0"/>
+          </a:p>
+        </p:txBody>
+      </p:sp>
+      <p:pic>
+        <p:nvPicPr>
+          <p:cNvPr id="3074" name="Picture 2" descr="C:\Users\Bruno\Desktop\Capturar1.PNG"/>
+          <p:cNvPicPr>
+            <a:picLocks noChangeAspect="1" noChangeArrowheads="1"/>
+          </p:cNvPicPr>
+          <p:nvPr/>
+        </p:nvPicPr>
+        <p:blipFill>
+          <a:blip r:embed="rId2">
+            <a:extLst>
+              <a:ext uri="{28A0092B-C50C-407E-A947-70E740481C1C}">
+                <a14:useLocalDpi xmlns:a14="http://schemas.microsoft.com/office/drawing/2010/main" val="0"/>
+              </a:ext>
+            </a:extLst>
+          </a:blip>
+          <a:srcRect/>
+          <a:stretch>
+            <a:fillRect/>
+          </a:stretch>
+        </p:blipFill>
+        <p:spPr bwMode="auto">
+          <a:xfrm>
+            <a:off x="2998068" y="2811608"/>
+            <a:ext cx="5534025" cy="2952750"/>
+          </a:xfrm>
+          <a:prstGeom prst="rect">
+            <a:avLst/>
+          </a:prstGeom>
+          <a:noFill/>
+          <a:extLst>
+            <a:ext uri="{909E8E84-426E-40DD-AFC4-6F175D3DCCD1}">
+              <a14:hiddenFill xmlns:a14="http://schemas.microsoft.com/office/drawing/2010/main">
+                <a:solidFill>
+                  <a:srgbClr val="FFFFFF"/>
+                </a:solidFill>
+              </a14:hiddenFill>
+            </a:ext>
+          </a:extLst>
+        </p:spPr>
+      </p:pic>
+    </p:spTree>
+    <p:extLst>
+      <p:ext uri="{BB962C8B-B14F-4D97-AF65-F5344CB8AC3E}">
+        <p14:creationId xmlns:p14="http://schemas.microsoft.com/office/powerpoint/2010/main" val="5685608"/>
       </p:ext>
     </p:extLst>
   </p:cSld>
@@ -7812,6 +8572,300 @@
     <p:extLst>
       <p:ext uri="{BB962C8B-B14F-4D97-AF65-F5344CB8AC3E}">
         <p14:creationId xmlns:p14="http://schemas.microsoft.com/office/powerpoint/2010/main" val="3529114326"/>
+      </p:ext>
+    </p:extLst>
+  </p:cSld>
+  <p:clrMapOvr>
+    <a:masterClrMapping/>
+  </p:clrMapOvr>
+  <mc:AlternateContent xmlns:mc="http://schemas.openxmlformats.org/markup-compatibility/2006" xmlns:p14="http://schemas.microsoft.com/office/powerpoint/2010/main">
+    <mc:Choice Requires="p14">
+      <p:transition spd="med" p14:dur="700">
+        <p:fade/>
+      </p:transition>
+    </mc:Choice>
+    <mc:Fallback xmlns="">
+      <p:transition spd="med">
+        <p:fade/>
+      </p:transition>
+    </mc:Fallback>
+  </mc:AlternateContent>
+</p:sld>
+</file>
+
+<file path=ppt/slides/slide30.xml><?xml version="1.0" encoding="utf-8"?>
+<p:sld xmlns:a="http://schemas.openxmlformats.org/drawingml/2006/main" xmlns:r="http://schemas.openxmlformats.org/officeDocument/2006/relationships" xmlns:p="http://schemas.openxmlformats.org/presentationml/2006/main">
+  <p:cSld>
+    <p:spTree>
+      <p:nvGrpSpPr>
+        <p:cNvPr id="1" name=""/>
+        <p:cNvGrpSpPr/>
+        <p:nvPr/>
+      </p:nvGrpSpPr>
+      <p:grpSpPr>
+        <a:xfrm>
+          <a:off x="0" y="0"/>
+          <a:ext cx="0" cy="0"/>
+          <a:chOff x="0" y="0"/>
+          <a:chExt cx="0" cy="0"/>
+        </a:xfrm>
+      </p:grpSpPr>
+      <p:sp>
+        <p:nvSpPr>
+          <p:cNvPr id="2" name="Título 1"/>
+          <p:cNvSpPr>
+            <a:spLocks noGrp="1"/>
+          </p:cNvSpPr>
+          <p:nvPr>
+            <p:ph type="title"/>
+          </p:nvPr>
+        </p:nvSpPr>
+        <p:spPr/>
+        <p:txBody>
+          <a:bodyPr/>
+          <a:lstStyle/>
+          <a:p>
+            <a:r>
+              <a:rPr lang="pt-BR" dirty="0" smtClean="0"/>
+              <a:t>Exceções </a:t>
+            </a:r>
+            <a:r>
+              <a:rPr lang="pt-BR" dirty="0"/>
+              <a:t>- PyUnit </a:t>
+            </a:r>
+            <a:r>
+              <a:rPr lang="pt-BR" dirty="0" smtClean="0"/>
+              <a:t>Perf</a:t>
+            </a:r>
+            <a:endParaRPr lang="pt-BR" dirty="0"/>
+          </a:p>
+        </p:txBody>
+      </p:sp>
+      <p:sp>
+        <p:nvSpPr>
+          <p:cNvPr id="3" name="Espaço Reservado para Conteúdo 2"/>
+          <p:cNvSpPr>
+            <a:spLocks noGrp="1"/>
+          </p:cNvSpPr>
+          <p:nvPr>
+            <p:ph idx="1"/>
+          </p:nvPr>
+        </p:nvSpPr>
+        <p:spPr/>
+        <p:txBody>
+          <a:bodyPr>
+            <a:normAutofit/>
+          </a:bodyPr>
+          <a:lstStyle/>
+          <a:p>
+            <a:r>
+              <a:rPr lang="pt-BR" sz="4000" dirty="0" smtClean="0"/>
+              <a:t>Forma 2: Forma padrão do Python.</a:t>
+            </a:r>
+          </a:p>
+          <a:p>
+            <a:endParaRPr lang="pt-BR" sz="4000" dirty="0" smtClean="0"/>
+          </a:p>
+          <a:p>
+            <a:endParaRPr lang="pt-BR" sz="4000" dirty="0" smtClean="0"/>
+          </a:p>
+          <a:p>
+            <a:endParaRPr lang="pt-BR" sz="4000" dirty="0" smtClean="0"/>
+          </a:p>
+        </p:txBody>
+      </p:sp>
+      <p:pic>
+        <p:nvPicPr>
+          <p:cNvPr id="4098" name="Picture 2" descr="C:\Users\Bruno\Desktop\Capturar2.PNG"/>
+          <p:cNvPicPr>
+            <a:picLocks noChangeAspect="1" noChangeArrowheads="1"/>
+          </p:cNvPicPr>
+          <p:nvPr/>
+        </p:nvPicPr>
+        <p:blipFill>
+          <a:blip r:embed="rId2">
+            <a:extLst>
+              <a:ext uri="{28A0092B-C50C-407E-A947-70E740481C1C}">
+                <a14:useLocalDpi xmlns:a14="http://schemas.microsoft.com/office/drawing/2010/main" val="0"/>
+              </a:ext>
+            </a:extLst>
+          </a:blip>
+          <a:srcRect/>
+          <a:stretch>
+            <a:fillRect/>
+          </a:stretch>
+        </p:blipFill>
+        <p:spPr bwMode="auto">
+          <a:xfrm>
+            <a:off x="2998068" y="2852936"/>
+            <a:ext cx="5486400" cy="3105150"/>
+          </a:xfrm>
+          <a:prstGeom prst="rect">
+            <a:avLst/>
+          </a:prstGeom>
+          <a:noFill/>
+          <a:extLst>
+            <a:ext uri="{909E8E84-426E-40DD-AFC4-6F175D3DCCD1}">
+              <a14:hiddenFill xmlns:a14="http://schemas.microsoft.com/office/drawing/2010/main">
+                <a:solidFill>
+                  <a:srgbClr val="FFFFFF"/>
+                </a:solidFill>
+              </a14:hiddenFill>
+            </a:ext>
+          </a:extLst>
+        </p:spPr>
+      </p:pic>
+    </p:spTree>
+    <p:extLst>
+      <p:ext uri="{BB962C8B-B14F-4D97-AF65-F5344CB8AC3E}">
+        <p14:creationId xmlns:p14="http://schemas.microsoft.com/office/powerpoint/2010/main" val="2755726204"/>
+      </p:ext>
+    </p:extLst>
+  </p:cSld>
+  <p:clrMapOvr>
+    <a:masterClrMapping/>
+  </p:clrMapOvr>
+  <mc:AlternateContent xmlns:mc="http://schemas.openxmlformats.org/markup-compatibility/2006" xmlns:p14="http://schemas.microsoft.com/office/powerpoint/2010/main">
+    <mc:Choice Requires="p14">
+      <p:transition spd="med" p14:dur="700">
+        <p:fade/>
+      </p:transition>
+    </mc:Choice>
+    <mc:Fallback xmlns="">
+      <p:transition spd="med">
+        <p:fade/>
+      </p:transition>
+    </mc:Fallback>
+  </mc:AlternateContent>
+</p:sld>
+</file>
+
+<file path=ppt/slides/slide31.xml><?xml version="1.0" encoding="utf-8"?>
+<p:sld xmlns:a="http://schemas.openxmlformats.org/drawingml/2006/main" xmlns:r="http://schemas.openxmlformats.org/officeDocument/2006/relationships" xmlns:p="http://schemas.openxmlformats.org/presentationml/2006/main">
+  <p:cSld>
+    <p:spTree>
+      <p:nvGrpSpPr>
+        <p:cNvPr id="1" name=""/>
+        <p:cNvGrpSpPr/>
+        <p:nvPr/>
+      </p:nvGrpSpPr>
+      <p:grpSpPr>
+        <a:xfrm>
+          <a:off x="0" y="0"/>
+          <a:ext cx="0" cy="0"/>
+          <a:chOff x="0" y="0"/>
+          <a:chExt cx="0" cy="0"/>
+        </a:xfrm>
+      </p:grpSpPr>
+      <p:sp>
+        <p:nvSpPr>
+          <p:cNvPr id="2" name="Título 1"/>
+          <p:cNvSpPr>
+            <a:spLocks noGrp="1"/>
+          </p:cNvSpPr>
+          <p:nvPr>
+            <p:ph type="title"/>
+          </p:nvPr>
+        </p:nvSpPr>
+        <p:spPr/>
+        <p:txBody>
+          <a:bodyPr/>
+          <a:lstStyle/>
+          <a:p>
+            <a:r>
+              <a:rPr lang="pt-BR" dirty="0" smtClean="0"/>
+              <a:t>Exceções </a:t>
+            </a:r>
+            <a:r>
+              <a:rPr lang="pt-BR" dirty="0"/>
+              <a:t>- PyUnit </a:t>
+            </a:r>
+            <a:r>
+              <a:rPr lang="pt-BR" dirty="0" smtClean="0"/>
+              <a:t>Perf</a:t>
+            </a:r>
+            <a:endParaRPr lang="pt-BR" dirty="0"/>
+          </a:p>
+        </p:txBody>
+      </p:sp>
+      <p:sp>
+        <p:nvSpPr>
+          <p:cNvPr id="3" name="Espaço Reservado para Conteúdo 2"/>
+          <p:cNvSpPr>
+            <a:spLocks noGrp="1"/>
+          </p:cNvSpPr>
+          <p:nvPr>
+            <p:ph idx="1"/>
+          </p:nvPr>
+        </p:nvSpPr>
+        <p:spPr/>
+        <p:txBody>
+          <a:bodyPr>
+            <a:normAutofit/>
+          </a:bodyPr>
+          <a:lstStyle/>
+          <a:p>
+            <a:r>
+              <a:rPr lang="pt-BR" sz="4000" dirty="0" smtClean="0"/>
+              <a:t>Forma 3: Utilizando método do PyUnit.</a:t>
+            </a:r>
+          </a:p>
+          <a:p>
+            <a:endParaRPr lang="pt-BR" sz="4000" dirty="0" smtClean="0"/>
+          </a:p>
+          <a:p>
+            <a:endParaRPr lang="pt-BR" sz="4000" dirty="0" smtClean="0"/>
+          </a:p>
+          <a:p>
+            <a:endParaRPr lang="pt-BR" sz="4000" dirty="0" smtClean="0"/>
+          </a:p>
+        </p:txBody>
+      </p:sp>
+      <p:pic>
+        <p:nvPicPr>
+          <p:cNvPr id="5122" name="Picture 2" descr="C:\Users\Bruno\Desktop\Capturar.3PNG.PNG"/>
+          <p:cNvPicPr>
+            <a:picLocks noChangeAspect="1" noChangeArrowheads="1"/>
+          </p:cNvPicPr>
+          <p:nvPr/>
+        </p:nvPicPr>
+        <p:blipFill>
+          <a:blip r:embed="rId2">
+            <a:extLst>
+              <a:ext uri="{28A0092B-C50C-407E-A947-70E740481C1C}">
+                <a14:useLocalDpi xmlns:a14="http://schemas.microsoft.com/office/drawing/2010/main" val="0"/>
+              </a:ext>
+            </a:extLst>
+          </a:blip>
+          <a:srcRect/>
+          <a:stretch>
+            <a:fillRect/>
+          </a:stretch>
+        </p:blipFill>
+        <p:spPr bwMode="auto">
+          <a:xfrm>
+            <a:off x="1989956" y="3284984"/>
+            <a:ext cx="8612187" cy="1428750"/>
+          </a:xfrm>
+          <a:prstGeom prst="rect">
+            <a:avLst/>
+          </a:prstGeom>
+          <a:noFill/>
+          <a:extLst>
+            <a:ext uri="{909E8E84-426E-40DD-AFC4-6F175D3DCCD1}">
+              <a14:hiddenFill xmlns:a14="http://schemas.microsoft.com/office/drawing/2010/main">
+                <a:solidFill>
+                  <a:srgbClr val="FFFFFF"/>
+                </a:solidFill>
+              </a14:hiddenFill>
+            </a:ext>
+          </a:extLst>
+        </p:spPr>
+      </p:pic>
+    </p:spTree>
+    <p:extLst>
+      <p:ext uri="{BB962C8B-B14F-4D97-AF65-F5344CB8AC3E}">
+        <p14:creationId xmlns:p14="http://schemas.microsoft.com/office/powerpoint/2010/main" val="2501290408"/>
       </p:ext>
     </p:extLst>
   </p:cSld>
@@ -8866,7 +9920,7 @@
   <a:extraClrSchemeLst/>
   <a:extLst>
     <a:ext uri="{05A4C25C-085E-4340-85A3-A5531E510DB2}">
-      <thm15:themeFamily xmlns="" xmlns:thm15="http://schemas.microsoft.com/office/thememl/2012/main" name="TF02787990.potx" id="{BDB9CD5E-36EC-45F3-B87D-6D062B8A3823}" vid="{51682E2F-7C85-4D6F-AD40-072EFC83910D}"/>
+      <thm15:themeFamily xmlns:thm15="http://schemas.microsoft.com/office/thememl/2012/main" xmlns="" name="TF02787990.potx" id="{BDB9CD5E-36EC-45F3-B87D-6D062B8A3823}" vid="{51682E2F-7C85-4D6F-AD40-072EFC83910D}"/>
     </a:ext>
   </a:extLst>
 </a:theme>
@@ -9463,12 +10517,139 @@
 </file>
 
 <file path=customXml/item1.xml><?xml version="1.0" encoding="utf-8"?>
-<?mso-contentType ?>
-<FormTemplates xmlns="http://schemas.microsoft.com/sharepoint/v3/contenttype/forms">
-  <Display>DocumentLibraryForm</Display>
-  <Edit>AssetEditForm</Edit>
-  <New>DocumentLibraryForm</New>
-</FormTemplates>
+<p:properties xmlns:p="http://schemas.microsoft.com/office/2006/metadata/properties" xmlns:xsi="http://www.w3.org/2001/XMLSchema-instance" xmlns:pc="http://schemas.microsoft.com/office/infopath/2007/PartnerControls">
+  <documentManagement>
+    <LocPublishedLinkedAssetsLookup xmlns="4873beb7-5857-4685-be1f-d57550cc96cc" xsi:nil="true"/>
+    <ApprovalStatus xmlns="4873beb7-5857-4685-be1f-d57550cc96cc">InProgress</ApprovalStatus>
+    <MarketSpecific xmlns="4873beb7-5857-4685-be1f-d57550cc96cc">false</MarketSpecific>
+    <LocComments xmlns="4873beb7-5857-4685-be1f-d57550cc96cc" xsi:nil="true"/>
+    <LocLastLocAttemptVersionTypeLookup xmlns="4873beb7-5857-4685-be1f-d57550cc96cc" xsi:nil="true"/>
+    <DirectSourceMarket xmlns="4873beb7-5857-4685-be1f-d57550cc96cc" xsi:nil="true"/>
+    <ThumbnailAssetId xmlns="4873beb7-5857-4685-be1f-d57550cc96cc" xsi:nil="true"/>
+    <PrimaryImageGen xmlns="4873beb7-5857-4685-be1f-d57550cc96cc">false</PrimaryImageGen>
+    <LocNewPublishedVersionLookup xmlns="4873beb7-5857-4685-be1f-d57550cc96cc" xsi:nil="true"/>
+    <LegacyData xmlns="4873beb7-5857-4685-be1f-d57550cc96cc" xsi:nil="true"/>
+    <LocRecommendedHandoff xmlns="4873beb7-5857-4685-be1f-d57550cc96cc" xsi:nil="true"/>
+    <BusinessGroup xmlns="4873beb7-5857-4685-be1f-d57550cc96cc" xsi:nil="true"/>
+    <BlockPublish xmlns="4873beb7-5857-4685-be1f-d57550cc96cc">false</BlockPublish>
+    <TPFriendlyName xmlns="4873beb7-5857-4685-be1f-d57550cc96cc" xsi:nil="true"/>
+    <LocOverallPublishStatusLookup xmlns="4873beb7-5857-4685-be1f-d57550cc96cc" xsi:nil="true"/>
+    <NumericId xmlns="4873beb7-5857-4685-be1f-d57550cc96cc" xsi:nil="true"/>
+    <APEditor xmlns="4873beb7-5857-4685-be1f-d57550cc96cc">
+      <UserInfo>
+        <DisplayName/>
+        <AccountId xsi:nil="true"/>
+        <AccountType/>
+      </UserInfo>
+    </APEditor>
+    <SourceTitle xmlns="4873beb7-5857-4685-be1f-d57550cc96cc" xsi:nil="true"/>
+    <OpenTemplate xmlns="4873beb7-5857-4685-be1f-d57550cc96cc">true</OpenTemplate>
+    <LocOverallLocStatusLookup xmlns="4873beb7-5857-4685-be1f-d57550cc96cc" xsi:nil="true"/>
+    <UALocComments xmlns="4873beb7-5857-4685-be1f-d57550cc96cc" xsi:nil="true"/>
+    <ParentAssetId xmlns="4873beb7-5857-4685-be1f-d57550cc96cc" xsi:nil="true"/>
+    <IntlLangReviewDate xmlns="4873beb7-5857-4685-be1f-d57550cc96cc" xsi:nil="true"/>
+    <FeatureTagsTaxHTField0 xmlns="4873beb7-5857-4685-be1f-d57550cc96cc">
+      <Terms xmlns="http://schemas.microsoft.com/office/infopath/2007/PartnerControls"/>
+    </FeatureTagsTaxHTField0>
+    <PublishStatusLookup xmlns="4873beb7-5857-4685-be1f-d57550cc96cc">
+      <Value>1345093</Value>
+    </PublishStatusLookup>
+    <Providers xmlns="4873beb7-5857-4685-be1f-d57550cc96cc" xsi:nil="true"/>
+    <MachineTranslated xmlns="4873beb7-5857-4685-be1f-d57550cc96cc">false</MachineTranslated>
+    <OriginalSourceMarket xmlns="4873beb7-5857-4685-be1f-d57550cc96cc" xsi:nil="true"/>
+    <APDescription xmlns="4873beb7-5857-4685-be1f-d57550cc96cc">This simple template design works for technology and  businesses, but it's versatile enough to use in other contexts.  It features multiple slide layouts designed for widescreen (16x9 resolution) and includes a sample SmartArt list and chart that are easily editable.</APDescription>
+    <ClipArtFilename xmlns="4873beb7-5857-4685-be1f-d57550cc96cc" xsi:nil="true"/>
+    <ContentItem xmlns="4873beb7-5857-4685-be1f-d57550cc96cc" xsi:nil="true"/>
+    <TPInstallLocation xmlns="4873beb7-5857-4685-be1f-d57550cc96cc" xsi:nil="true"/>
+    <PublishTargets xmlns="4873beb7-5857-4685-be1f-d57550cc96cc">OfficeOnlineVNext</PublishTargets>
+    <TimesCloned xmlns="4873beb7-5857-4685-be1f-d57550cc96cc" xsi:nil="true"/>
+    <AssetStart xmlns="4873beb7-5857-4685-be1f-d57550cc96cc">2011-11-26T00:30:00+00:00</AssetStart>
+    <Provider xmlns="4873beb7-5857-4685-be1f-d57550cc96cc" xsi:nil="true"/>
+    <AcquiredFrom xmlns="4873beb7-5857-4685-be1f-d57550cc96cc">Internal MS</AcquiredFrom>
+    <FriendlyTitle xmlns="4873beb7-5857-4685-be1f-d57550cc96cc" xsi:nil="true"/>
+    <LastHandOff xmlns="4873beb7-5857-4685-be1f-d57550cc96cc" xsi:nil="true"/>
+    <TPClientViewer xmlns="4873beb7-5857-4685-be1f-d57550cc96cc" xsi:nil="true"/>
+    <TemplateStatus xmlns="4873beb7-5857-4685-be1f-d57550cc96cc">Complete</TemplateStatus>
+    <Downloads xmlns="4873beb7-5857-4685-be1f-d57550cc96cc">0</Downloads>
+    <OOCacheId xmlns="4873beb7-5857-4685-be1f-d57550cc96cc" xsi:nil="true"/>
+    <IsDeleted xmlns="4873beb7-5857-4685-be1f-d57550cc96cc">false</IsDeleted>
+    <LocPublishedDependentAssetsLookup xmlns="4873beb7-5857-4685-be1f-d57550cc96cc" xsi:nil="true"/>
+    <TPExecutable xmlns="4873beb7-5857-4685-be1f-d57550cc96cc" xsi:nil="true"/>
+    <EditorialTags xmlns="4873beb7-5857-4685-be1f-d57550cc96cc" xsi:nil="true"/>
+    <SubmitterId xmlns="4873beb7-5857-4685-be1f-d57550cc96cc" xsi:nil="true"/>
+    <ApprovalLog xmlns="4873beb7-5857-4685-be1f-d57550cc96cc" xsi:nil="true"/>
+    <AssetType xmlns="4873beb7-5857-4685-be1f-d57550cc96cc">TP</AssetType>
+    <BugNumber xmlns="4873beb7-5857-4685-be1f-d57550cc96cc" xsi:nil="true"/>
+    <CSXSubmissionDate xmlns="4873beb7-5857-4685-be1f-d57550cc96cc" xsi:nil="true"/>
+    <CSXUpdate xmlns="4873beb7-5857-4685-be1f-d57550cc96cc">false</CSXUpdate>
+    <Milestone xmlns="4873beb7-5857-4685-be1f-d57550cc96cc" xsi:nil="true"/>
+    <RecommendationsModifier xmlns="4873beb7-5857-4685-be1f-d57550cc96cc" xsi:nil="true"/>
+    <OriginAsset xmlns="4873beb7-5857-4685-be1f-d57550cc96cc" xsi:nil="true"/>
+    <TPComponent xmlns="4873beb7-5857-4685-be1f-d57550cc96cc" xsi:nil="true"/>
+    <AssetId xmlns="4873beb7-5857-4685-be1f-d57550cc96cc">TP102787989</AssetId>
+    <IntlLocPriority xmlns="4873beb7-5857-4685-be1f-d57550cc96cc" xsi:nil="true"/>
+    <PolicheckWords xmlns="4873beb7-5857-4685-be1f-d57550cc96cc" xsi:nil="true"/>
+    <TPLaunchHelpLink xmlns="4873beb7-5857-4685-be1f-d57550cc96cc" xsi:nil="true"/>
+    <TPApplication xmlns="4873beb7-5857-4685-be1f-d57550cc96cc" xsi:nil="true"/>
+    <CrawlForDependencies xmlns="4873beb7-5857-4685-be1f-d57550cc96cc">false</CrawlForDependencies>
+    <HandoffToMSDN xmlns="4873beb7-5857-4685-be1f-d57550cc96cc" xsi:nil="true"/>
+    <PlannedPubDate xmlns="4873beb7-5857-4685-be1f-d57550cc96cc" xsi:nil="true"/>
+    <IntlLangReviewer xmlns="4873beb7-5857-4685-be1f-d57550cc96cc" xsi:nil="true"/>
+    <TrustLevel xmlns="4873beb7-5857-4685-be1f-d57550cc96cc">1 Microsoft Managed Content</TrustLevel>
+    <LocLastLocAttemptVersionLookup xmlns="4873beb7-5857-4685-be1f-d57550cc96cc">694266</LocLastLocAttemptVersionLookup>
+    <LocProcessedForHandoffsLookup xmlns="4873beb7-5857-4685-be1f-d57550cc96cc" xsi:nil="true"/>
+    <IsSearchable xmlns="4873beb7-5857-4685-be1f-d57550cc96cc">true</IsSearchable>
+    <TemplateTemplateType xmlns="4873beb7-5857-4685-be1f-d57550cc96cc">PowerPoint Presentation Template</TemplateTemplateType>
+    <CampaignTagsTaxHTField0 xmlns="4873beb7-5857-4685-be1f-d57550cc96cc">
+      <Terms xmlns="http://schemas.microsoft.com/office/infopath/2007/PartnerControls"/>
+    </CampaignTagsTaxHTField0>
+    <TPNamespace xmlns="4873beb7-5857-4685-be1f-d57550cc96cc" xsi:nil="true"/>
+    <LocOverallPreviewStatusLookup xmlns="4873beb7-5857-4685-be1f-d57550cc96cc" xsi:nil="true"/>
+    <TaxCatchAll xmlns="4873beb7-5857-4685-be1f-d57550cc96cc"/>
+    <Markets xmlns="4873beb7-5857-4685-be1f-d57550cc96cc"/>
+    <UAProjectedTotalWords xmlns="4873beb7-5857-4685-be1f-d57550cc96cc" xsi:nil="true"/>
+    <IntlLangReview xmlns="4873beb7-5857-4685-be1f-d57550cc96cc" xsi:nil="true"/>
+    <OutputCachingOn xmlns="4873beb7-5857-4685-be1f-d57550cc96cc">false</OutputCachingOn>
+    <AverageRating xmlns="4873beb7-5857-4685-be1f-d57550cc96cc" xsi:nil="true"/>
+    <APAuthor xmlns="4873beb7-5857-4685-be1f-d57550cc96cc">
+      <UserInfo>
+        <DisplayName>REDMOND\kristaa</DisplayName>
+        <AccountId>136</AccountId>
+        <AccountType/>
+      </UserInfo>
+    </APAuthor>
+    <LocManualTestRequired xmlns="4873beb7-5857-4685-be1f-d57550cc96cc">false</LocManualTestRequired>
+    <TPCommandLine xmlns="4873beb7-5857-4685-be1f-d57550cc96cc" xsi:nil="true"/>
+    <TPAppVersion xmlns="4873beb7-5857-4685-be1f-d57550cc96cc" xsi:nil="true"/>
+    <EditorialStatus xmlns="4873beb7-5857-4685-be1f-d57550cc96cc">Complete</EditorialStatus>
+    <LastModifiedDateTime xmlns="4873beb7-5857-4685-be1f-d57550cc96cc" xsi:nil="true"/>
+    <ScenarioTagsTaxHTField0 xmlns="4873beb7-5857-4685-be1f-d57550cc96cc">
+      <Terms xmlns="http://schemas.microsoft.com/office/infopath/2007/PartnerControls"/>
+    </ScenarioTagsTaxHTField0>
+    <LocProcessedForMarketsLookup xmlns="4873beb7-5857-4685-be1f-d57550cc96cc" xsi:nil="true"/>
+    <TPLaunchHelpLinkType xmlns="4873beb7-5857-4685-be1f-d57550cc96cc">Template</TPLaunchHelpLinkType>
+    <OriginalRelease xmlns="4873beb7-5857-4685-be1f-d57550cc96cc">15</OriginalRelease>
+    <LocalizationTagsTaxHTField0 xmlns="4873beb7-5857-4685-be1f-d57550cc96cc">
+      <Terms xmlns="http://schemas.microsoft.com/office/infopath/2007/PartnerControls"/>
+    </LocalizationTagsTaxHTField0>
+    <UACurrentWords xmlns="4873beb7-5857-4685-be1f-d57550cc96cc" xsi:nil="true"/>
+    <ArtSampleDocs xmlns="4873beb7-5857-4685-be1f-d57550cc96cc" xsi:nil="true"/>
+    <UALocRecommendation xmlns="4873beb7-5857-4685-be1f-d57550cc96cc">Localize</UALocRecommendation>
+    <Manager xmlns="4873beb7-5857-4685-be1f-d57550cc96cc" xsi:nil="true"/>
+    <LocOverallHandbackStatusLookup xmlns="4873beb7-5857-4685-be1f-d57550cc96cc" xsi:nil="true"/>
+    <ShowIn xmlns="4873beb7-5857-4685-be1f-d57550cc96cc">Show everywhere</ShowIn>
+    <UANotes xmlns="4873beb7-5857-4685-be1f-d57550cc96cc" xsi:nil="true"/>
+    <InternalTagsTaxHTField0 xmlns="4873beb7-5857-4685-be1f-d57550cc96cc">
+      <Terms xmlns="http://schemas.microsoft.com/office/infopath/2007/PartnerControls"/>
+    </InternalTagsTaxHTField0>
+    <CSXHash xmlns="4873beb7-5857-4685-be1f-d57550cc96cc" xsi:nil="true"/>
+    <VoteCount xmlns="4873beb7-5857-4685-be1f-d57550cc96cc" xsi:nil="true"/>
+    <AssetExpire xmlns="4873beb7-5857-4685-be1f-d57550cc96cc">2029-05-12T07:00:00+00:00</AssetExpire>
+    <DSATActionTaken xmlns="4873beb7-5857-4685-be1f-d57550cc96cc" xsi:nil="true"/>
+    <CSXSubmissionMarket xmlns="4873beb7-5857-4685-be1f-d57550cc96cc" xsi:nil="true"/>
+    <LocMarketGroupTiers2 xmlns="4873beb7-5857-4685-be1f-d57550cc96cc" xsi:nil="true"/>
+  </documentManagement>
+</p:properties>
 </file>
 
 <file path=customXml/item2.xml><?xml version="1.0" encoding="utf-8"?>
@@ -10512,145 +11693,26 @@
 </file>
 
 <file path=customXml/item3.xml><?xml version="1.0" encoding="utf-8"?>
-<p:properties xmlns:p="http://schemas.microsoft.com/office/2006/metadata/properties" xmlns:xsi="http://www.w3.org/2001/XMLSchema-instance" xmlns:pc="http://schemas.microsoft.com/office/infopath/2007/PartnerControls">
-  <documentManagement>
-    <LocPublishedLinkedAssetsLookup xmlns="4873beb7-5857-4685-be1f-d57550cc96cc" xsi:nil="true"/>
-    <ApprovalStatus xmlns="4873beb7-5857-4685-be1f-d57550cc96cc">InProgress</ApprovalStatus>
-    <MarketSpecific xmlns="4873beb7-5857-4685-be1f-d57550cc96cc">false</MarketSpecific>
-    <LocComments xmlns="4873beb7-5857-4685-be1f-d57550cc96cc" xsi:nil="true"/>
-    <LocLastLocAttemptVersionTypeLookup xmlns="4873beb7-5857-4685-be1f-d57550cc96cc" xsi:nil="true"/>
-    <DirectSourceMarket xmlns="4873beb7-5857-4685-be1f-d57550cc96cc" xsi:nil="true"/>
-    <ThumbnailAssetId xmlns="4873beb7-5857-4685-be1f-d57550cc96cc" xsi:nil="true"/>
-    <PrimaryImageGen xmlns="4873beb7-5857-4685-be1f-d57550cc96cc">false</PrimaryImageGen>
-    <LocNewPublishedVersionLookup xmlns="4873beb7-5857-4685-be1f-d57550cc96cc" xsi:nil="true"/>
-    <LegacyData xmlns="4873beb7-5857-4685-be1f-d57550cc96cc" xsi:nil="true"/>
-    <LocRecommendedHandoff xmlns="4873beb7-5857-4685-be1f-d57550cc96cc" xsi:nil="true"/>
-    <BusinessGroup xmlns="4873beb7-5857-4685-be1f-d57550cc96cc" xsi:nil="true"/>
-    <BlockPublish xmlns="4873beb7-5857-4685-be1f-d57550cc96cc">false</BlockPublish>
-    <TPFriendlyName xmlns="4873beb7-5857-4685-be1f-d57550cc96cc" xsi:nil="true"/>
-    <LocOverallPublishStatusLookup xmlns="4873beb7-5857-4685-be1f-d57550cc96cc" xsi:nil="true"/>
-    <NumericId xmlns="4873beb7-5857-4685-be1f-d57550cc96cc" xsi:nil="true"/>
-    <APEditor xmlns="4873beb7-5857-4685-be1f-d57550cc96cc">
-      <UserInfo>
-        <DisplayName/>
-        <AccountId xsi:nil="true"/>
-        <AccountType/>
-      </UserInfo>
-    </APEditor>
-    <SourceTitle xmlns="4873beb7-5857-4685-be1f-d57550cc96cc" xsi:nil="true"/>
-    <OpenTemplate xmlns="4873beb7-5857-4685-be1f-d57550cc96cc">true</OpenTemplate>
-    <LocOverallLocStatusLookup xmlns="4873beb7-5857-4685-be1f-d57550cc96cc" xsi:nil="true"/>
-    <UALocComments xmlns="4873beb7-5857-4685-be1f-d57550cc96cc" xsi:nil="true"/>
-    <ParentAssetId xmlns="4873beb7-5857-4685-be1f-d57550cc96cc" xsi:nil="true"/>
-    <IntlLangReviewDate xmlns="4873beb7-5857-4685-be1f-d57550cc96cc" xsi:nil="true"/>
-    <FeatureTagsTaxHTField0 xmlns="4873beb7-5857-4685-be1f-d57550cc96cc">
-      <Terms xmlns="http://schemas.microsoft.com/office/infopath/2007/PartnerControls"/>
-    </FeatureTagsTaxHTField0>
-    <PublishStatusLookup xmlns="4873beb7-5857-4685-be1f-d57550cc96cc">
-      <Value>1345093</Value>
-    </PublishStatusLookup>
-    <Providers xmlns="4873beb7-5857-4685-be1f-d57550cc96cc" xsi:nil="true"/>
-    <MachineTranslated xmlns="4873beb7-5857-4685-be1f-d57550cc96cc">false</MachineTranslated>
-    <OriginalSourceMarket xmlns="4873beb7-5857-4685-be1f-d57550cc96cc" xsi:nil="true"/>
-    <APDescription xmlns="4873beb7-5857-4685-be1f-d57550cc96cc">This simple template design works for technology and  businesses, but it's versatile enough to use in other contexts.  It features multiple slide layouts designed for widescreen (16x9 resolution) and includes a sample SmartArt list and chart that are easily editable.</APDescription>
-    <ClipArtFilename xmlns="4873beb7-5857-4685-be1f-d57550cc96cc" xsi:nil="true"/>
-    <ContentItem xmlns="4873beb7-5857-4685-be1f-d57550cc96cc" xsi:nil="true"/>
-    <TPInstallLocation xmlns="4873beb7-5857-4685-be1f-d57550cc96cc" xsi:nil="true"/>
-    <PublishTargets xmlns="4873beb7-5857-4685-be1f-d57550cc96cc">OfficeOnlineVNext</PublishTargets>
-    <TimesCloned xmlns="4873beb7-5857-4685-be1f-d57550cc96cc" xsi:nil="true"/>
-    <AssetStart xmlns="4873beb7-5857-4685-be1f-d57550cc96cc">2011-11-26T00:30:00+00:00</AssetStart>
-    <Provider xmlns="4873beb7-5857-4685-be1f-d57550cc96cc" xsi:nil="true"/>
-    <AcquiredFrom xmlns="4873beb7-5857-4685-be1f-d57550cc96cc">Internal MS</AcquiredFrom>
-    <FriendlyTitle xmlns="4873beb7-5857-4685-be1f-d57550cc96cc" xsi:nil="true"/>
-    <LastHandOff xmlns="4873beb7-5857-4685-be1f-d57550cc96cc" xsi:nil="true"/>
-    <TPClientViewer xmlns="4873beb7-5857-4685-be1f-d57550cc96cc" xsi:nil="true"/>
-    <TemplateStatus xmlns="4873beb7-5857-4685-be1f-d57550cc96cc">Complete</TemplateStatus>
-    <Downloads xmlns="4873beb7-5857-4685-be1f-d57550cc96cc">0</Downloads>
-    <OOCacheId xmlns="4873beb7-5857-4685-be1f-d57550cc96cc" xsi:nil="true"/>
-    <IsDeleted xmlns="4873beb7-5857-4685-be1f-d57550cc96cc">false</IsDeleted>
-    <LocPublishedDependentAssetsLookup xmlns="4873beb7-5857-4685-be1f-d57550cc96cc" xsi:nil="true"/>
-    <TPExecutable xmlns="4873beb7-5857-4685-be1f-d57550cc96cc" xsi:nil="true"/>
-    <EditorialTags xmlns="4873beb7-5857-4685-be1f-d57550cc96cc" xsi:nil="true"/>
-    <SubmitterId xmlns="4873beb7-5857-4685-be1f-d57550cc96cc" xsi:nil="true"/>
-    <ApprovalLog xmlns="4873beb7-5857-4685-be1f-d57550cc96cc" xsi:nil="true"/>
-    <AssetType xmlns="4873beb7-5857-4685-be1f-d57550cc96cc">TP</AssetType>
-    <BugNumber xmlns="4873beb7-5857-4685-be1f-d57550cc96cc" xsi:nil="true"/>
-    <CSXSubmissionDate xmlns="4873beb7-5857-4685-be1f-d57550cc96cc" xsi:nil="true"/>
-    <CSXUpdate xmlns="4873beb7-5857-4685-be1f-d57550cc96cc">false</CSXUpdate>
-    <Milestone xmlns="4873beb7-5857-4685-be1f-d57550cc96cc" xsi:nil="true"/>
-    <RecommendationsModifier xmlns="4873beb7-5857-4685-be1f-d57550cc96cc" xsi:nil="true"/>
-    <OriginAsset xmlns="4873beb7-5857-4685-be1f-d57550cc96cc" xsi:nil="true"/>
-    <TPComponent xmlns="4873beb7-5857-4685-be1f-d57550cc96cc" xsi:nil="true"/>
-    <AssetId xmlns="4873beb7-5857-4685-be1f-d57550cc96cc">TP102787989</AssetId>
-    <IntlLocPriority xmlns="4873beb7-5857-4685-be1f-d57550cc96cc" xsi:nil="true"/>
-    <PolicheckWords xmlns="4873beb7-5857-4685-be1f-d57550cc96cc" xsi:nil="true"/>
-    <TPLaunchHelpLink xmlns="4873beb7-5857-4685-be1f-d57550cc96cc" xsi:nil="true"/>
-    <TPApplication xmlns="4873beb7-5857-4685-be1f-d57550cc96cc" xsi:nil="true"/>
-    <CrawlForDependencies xmlns="4873beb7-5857-4685-be1f-d57550cc96cc">false</CrawlForDependencies>
-    <HandoffToMSDN xmlns="4873beb7-5857-4685-be1f-d57550cc96cc" xsi:nil="true"/>
-    <PlannedPubDate xmlns="4873beb7-5857-4685-be1f-d57550cc96cc" xsi:nil="true"/>
-    <IntlLangReviewer xmlns="4873beb7-5857-4685-be1f-d57550cc96cc" xsi:nil="true"/>
-    <TrustLevel xmlns="4873beb7-5857-4685-be1f-d57550cc96cc">1 Microsoft Managed Content</TrustLevel>
-    <LocLastLocAttemptVersionLookup xmlns="4873beb7-5857-4685-be1f-d57550cc96cc">694266</LocLastLocAttemptVersionLookup>
-    <LocProcessedForHandoffsLookup xmlns="4873beb7-5857-4685-be1f-d57550cc96cc" xsi:nil="true"/>
-    <IsSearchable xmlns="4873beb7-5857-4685-be1f-d57550cc96cc">true</IsSearchable>
-    <TemplateTemplateType xmlns="4873beb7-5857-4685-be1f-d57550cc96cc">PowerPoint Presentation Template</TemplateTemplateType>
-    <CampaignTagsTaxHTField0 xmlns="4873beb7-5857-4685-be1f-d57550cc96cc">
-      <Terms xmlns="http://schemas.microsoft.com/office/infopath/2007/PartnerControls"/>
-    </CampaignTagsTaxHTField0>
-    <TPNamespace xmlns="4873beb7-5857-4685-be1f-d57550cc96cc" xsi:nil="true"/>
-    <LocOverallPreviewStatusLookup xmlns="4873beb7-5857-4685-be1f-d57550cc96cc" xsi:nil="true"/>
-    <TaxCatchAll xmlns="4873beb7-5857-4685-be1f-d57550cc96cc"/>
-    <Markets xmlns="4873beb7-5857-4685-be1f-d57550cc96cc"/>
-    <UAProjectedTotalWords xmlns="4873beb7-5857-4685-be1f-d57550cc96cc" xsi:nil="true"/>
-    <IntlLangReview xmlns="4873beb7-5857-4685-be1f-d57550cc96cc" xsi:nil="true"/>
-    <OutputCachingOn xmlns="4873beb7-5857-4685-be1f-d57550cc96cc">false</OutputCachingOn>
-    <AverageRating xmlns="4873beb7-5857-4685-be1f-d57550cc96cc" xsi:nil="true"/>
-    <APAuthor xmlns="4873beb7-5857-4685-be1f-d57550cc96cc">
-      <UserInfo>
-        <DisplayName>REDMOND\kristaa</DisplayName>
-        <AccountId>136</AccountId>
-        <AccountType/>
-      </UserInfo>
-    </APAuthor>
-    <LocManualTestRequired xmlns="4873beb7-5857-4685-be1f-d57550cc96cc">false</LocManualTestRequired>
-    <TPCommandLine xmlns="4873beb7-5857-4685-be1f-d57550cc96cc" xsi:nil="true"/>
-    <TPAppVersion xmlns="4873beb7-5857-4685-be1f-d57550cc96cc" xsi:nil="true"/>
-    <EditorialStatus xmlns="4873beb7-5857-4685-be1f-d57550cc96cc">Complete</EditorialStatus>
-    <LastModifiedDateTime xmlns="4873beb7-5857-4685-be1f-d57550cc96cc" xsi:nil="true"/>
-    <ScenarioTagsTaxHTField0 xmlns="4873beb7-5857-4685-be1f-d57550cc96cc">
-      <Terms xmlns="http://schemas.microsoft.com/office/infopath/2007/PartnerControls"/>
-    </ScenarioTagsTaxHTField0>
-    <LocProcessedForMarketsLookup xmlns="4873beb7-5857-4685-be1f-d57550cc96cc" xsi:nil="true"/>
-    <TPLaunchHelpLinkType xmlns="4873beb7-5857-4685-be1f-d57550cc96cc">Template</TPLaunchHelpLinkType>
-    <OriginalRelease xmlns="4873beb7-5857-4685-be1f-d57550cc96cc">15</OriginalRelease>
-    <LocalizationTagsTaxHTField0 xmlns="4873beb7-5857-4685-be1f-d57550cc96cc">
-      <Terms xmlns="http://schemas.microsoft.com/office/infopath/2007/PartnerControls"/>
-    </LocalizationTagsTaxHTField0>
-    <UACurrentWords xmlns="4873beb7-5857-4685-be1f-d57550cc96cc" xsi:nil="true"/>
-    <ArtSampleDocs xmlns="4873beb7-5857-4685-be1f-d57550cc96cc" xsi:nil="true"/>
-    <UALocRecommendation xmlns="4873beb7-5857-4685-be1f-d57550cc96cc">Localize</UALocRecommendation>
-    <Manager xmlns="4873beb7-5857-4685-be1f-d57550cc96cc" xsi:nil="true"/>
-    <LocOverallHandbackStatusLookup xmlns="4873beb7-5857-4685-be1f-d57550cc96cc" xsi:nil="true"/>
-    <ShowIn xmlns="4873beb7-5857-4685-be1f-d57550cc96cc">Show everywhere</ShowIn>
-    <UANotes xmlns="4873beb7-5857-4685-be1f-d57550cc96cc" xsi:nil="true"/>
-    <InternalTagsTaxHTField0 xmlns="4873beb7-5857-4685-be1f-d57550cc96cc">
-      <Terms xmlns="http://schemas.microsoft.com/office/infopath/2007/PartnerControls"/>
-    </InternalTagsTaxHTField0>
-    <CSXHash xmlns="4873beb7-5857-4685-be1f-d57550cc96cc" xsi:nil="true"/>
-    <VoteCount xmlns="4873beb7-5857-4685-be1f-d57550cc96cc" xsi:nil="true"/>
-    <AssetExpire xmlns="4873beb7-5857-4685-be1f-d57550cc96cc">2029-05-12T07:00:00+00:00</AssetExpire>
-    <DSATActionTaken xmlns="4873beb7-5857-4685-be1f-d57550cc96cc" xsi:nil="true"/>
-    <CSXSubmissionMarket xmlns="4873beb7-5857-4685-be1f-d57550cc96cc" xsi:nil="true"/>
-    <LocMarketGroupTiers2 xmlns="4873beb7-5857-4685-be1f-d57550cc96cc" xsi:nil="true"/>
-  </documentManagement>
-</p:properties>
+<?mso-contentType ?>
+<FormTemplates xmlns="http://schemas.microsoft.com/sharepoint/v3/contenttype/forms">
+  <Display>DocumentLibraryForm</Display>
+  <Edit>AssetEditForm</Edit>
+  <New>DocumentLibraryForm</New>
+</FormTemplates>
 </file>
 
 <file path=customXml/itemProps1.xml><?xml version="1.0" encoding="utf-8"?>
-<ds:datastoreItem xmlns:ds="http://schemas.openxmlformats.org/officeDocument/2006/customXml" ds:itemID="{3836F65B-1B07-41EE-A0E8-BC6EF3855225}">
+<ds:datastoreItem xmlns:ds="http://schemas.openxmlformats.org/officeDocument/2006/customXml" ds:itemID="{60C67BEE-D13F-4BD2-98A5-34D8A0977F68}">
   <ds:schemaRefs>
-    <ds:schemaRef ds:uri="http://schemas.microsoft.com/sharepoint/v3/contenttype/forms"/>
+    <ds:schemaRef ds:uri="http://schemas.microsoft.com/office/2006/documentManagement/types"/>
+    <ds:schemaRef ds:uri="http://schemas.openxmlformats.org/package/2006/metadata/core-properties"/>
+    <ds:schemaRef ds:uri="http://purl.org/dc/elements/1.1/"/>
+    <ds:schemaRef ds:uri="http://schemas.microsoft.com/office/2006/metadata/properties"/>
+    <ds:schemaRef ds:uri="http://schemas.microsoft.com/office/infopath/2007/PartnerControls"/>
+    <ds:schemaRef ds:uri="http://purl.org/dc/terms/"/>
+    <ds:schemaRef ds:uri="4873beb7-5857-4685-be1f-d57550cc96cc"/>
+    <ds:schemaRef ds:uri="http://www.w3.org/XML/1998/namespace"/>
+    <ds:schemaRef ds:uri="http://purl.org/dc/dcmitype/"/>
   </ds:schemaRefs>
 </ds:datastoreItem>
 </file>
@@ -10674,17 +11736,9 @@
 </file>
 
 <file path=customXml/itemProps3.xml><?xml version="1.0" encoding="utf-8"?>
-<ds:datastoreItem xmlns:ds="http://schemas.openxmlformats.org/officeDocument/2006/customXml" ds:itemID="{60C67BEE-D13F-4BD2-98A5-34D8A0977F68}">
+<ds:datastoreItem xmlns:ds="http://schemas.openxmlformats.org/officeDocument/2006/customXml" ds:itemID="{3836F65B-1B07-41EE-A0E8-BC6EF3855225}">
   <ds:schemaRefs>
-    <ds:schemaRef ds:uri="http://schemas.microsoft.com/office/2006/documentManagement/types"/>
-    <ds:schemaRef ds:uri="http://schemas.openxmlformats.org/package/2006/metadata/core-properties"/>
-    <ds:schemaRef ds:uri="http://purl.org/dc/elements/1.1/"/>
-    <ds:schemaRef ds:uri="http://schemas.microsoft.com/office/2006/metadata/properties"/>
-    <ds:schemaRef ds:uri="http://schemas.microsoft.com/office/infopath/2007/PartnerControls"/>
-    <ds:schemaRef ds:uri="http://purl.org/dc/terms/"/>
-    <ds:schemaRef ds:uri="4873beb7-5857-4685-be1f-d57550cc96cc"/>
-    <ds:schemaRef ds:uri="http://www.w3.org/XML/1998/namespace"/>
-    <ds:schemaRef ds:uri="http://purl.org/dc/dcmitype/"/>
+    <ds:schemaRef ds:uri="http://schemas.microsoft.com/sharepoint/v3/contenttype/forms"/>
   </ds:schemaRefs>
 </ds:datastoreItem>
 </file>
</xml_diff>